<commit_message>
started the presentation with a few slides and content that may be used in final presentation
</commit_message>
<xml_diff>
--- a/Research Methods in Computing Presentation.pptx
+++ b/Research Methods in Computing Presentation.pptx
@@ -7,9 +7,9 @@
   <p:sldIdLst>
     <p:sldId id="256" r:id="rId2"/>
     <p:sldId id="257" r:id="rId3"/>
-    <p:sldId id="258" r:id="rId4"/>
-    <p:sldId id="259" r:id="rId5"/>
-    <p:sldId id="260" r:id="rId6"/>
+    <p:sldId id="260" r:id="rId4"/>
+    <p:sldId id="258" r:id="rId5"/>
+    <p:sldId id="259" r:id="rId6"/>
   </p:sldIdLst>
   <p:sldSz cx="12192000" cy="6858000"/>
   <p:notesSz cx="6858000" cy="9144000"/>
@@ -108,6 +108,11 @@
       </a:defRPr>
     </a:lvl9pPr>
   </p:defaultTextStyle>
+  <p:extLst>
+    <p:ext uri="{EFAFB233-063F-42B5-8137-9DF3F51BA10A}">
+      <p15:sldGuideLst xmlns:p15="http://schemas.microsoft.com/office/powerpoint/2012/main"/>
+    </p:ext>
+  </p:extLst>
 </p:presentation>
 </file>
 
@@ -446,7 +451,7 @@
           <a:p>
             <a:fld id="{990B45B9-6F7B-4A1C-ABF2-9469D9125292}" type="datetimeFigureOut">
               <a:rPr lang="en-GB" smtClean="0"/>
-              <a:t>02/12/2020</a:t>
+              <a:t>03/12/2020</a:t>
             </a:fld>
             <a:endParaRPr lang="en-GB"/>
           </a:p>
@@ -1534,7 +1539,7 @@
           <a:p>
             <a:fld id="{990B45B9-6F7B-4A1C-ABF2-9469D9125292}" type="datetimeFigureOut">
               <a:rPr lang="en-GB" smtClean="0"/>
-              <a:t>02/12/2020</a:t>
+              <a:t>03/12/2020</a:t>
             </a:fld>
             <a:endParaRPr lang="en-GB"/>
           </a:p>
@@ -2514,7 +2519,7 @@
           <a:p>
             <a:fld id="{990B45B9-6F7B-4A1C-ABF2-9469D9125292}" type="datetimeFigureOut">
               <a:rPr lang="en-GB" smtClean="0"/>
-              <a:t>02/12/2020</a:t>
+              <a:t>03/12/2020</a:t>
             </a:fld>
             <a:endParaRPr lang="en-GB"/>
           </a:p>
@@ -3648,7 +3653,7 @@
           <a:p>
             <a:fld id="{990B45B9-6F7B-4A1C-ABF2-9469D9125292}" type="datetimeFigureOut">
               <a:rPr lang="en-GB" smtClean="0"/>
-              <a:t>02/12/2020</a:t>
+              <a:t>03/12/2020</a:t>
             </a:fld>
             <a:endParaRPr lang="en-GB"/>
           </a:p>
@@ -4681,7 +4686,7 @@
           <a:p>
             <a:fld id="{990B45B9-6F7B-4A1C-ABF2-9469D9125292}" type="datetimeFigureOut">
               <a:rPr lang="en-GB" smtClean="0"/>
-              <a:t>02/12/2020</a:t>
+              <a:t>03/12/2020</a:t>
             </a:fld>
             <a:endParaRPr lang="en-GB"/>
           </a:p>
@@ -5341,7 +5346,7 @@
           <a:p>
             <a:fld id="{990B45B9-6F7B-4A1C-ABF2-9469D9125292}" type="datetimeFigureOut">
               <a:rPr lang="en-GB" smtClean="0"/>
-              <a:t>02/12/2020</a:t>
+              <a:t>03/12/2020</a:t>
             </a:fld>
             <a:endParaRPr lang="en-GB"/>
           </a:p>
@@ -6202,7 +6207,7 @@
           <a:p>
             <a:fld id="{990B45B9-6F7B-4A1C-ABF2-9469D9125292}" type="datetimeFigureOut">
               <a:rPr lang="en-GB" smtClean="0"/>
-              <a:t>02/12/2020</a:t>
+              <a:t>03/12/2020</a:t>
             </a:fld>
             <a:endParaRPr lang="en-GB"/>
           </a:p>
@@ -6392,7 +6397,7 @@
           <a:p>
             <a:fld id="{990B45B9-6F7B-4A1C-ABF2-9469D9125292}" type="datetimeFigureOut">
               <a:rPr lang="en-GB" smtClean="0"/>
-              <a:t>02/12/2020</a:t>
+              <a:t>03/12/2020</a:t>
             </a:fld>
             <a:endParaRPr lang="en-GB"/>
           </a:p>
@@ -7364,7 +7369,7 @@
           <a:p>
             <a:fld id="{990B45B9-6F7B-4A1C-ABF2-9469D9125292}" type="datetimeFigureOut">
               <a:rPr lang="en-GB" smtClean="0"/>
-              <a:t>02/12/2020</a:t>
+              <a:t>03/12/2020</a:t>
             </a:fld>
             <a:endParaRPr lang="en-GB"/>
           </a:p>
@@ -7575,7 +7580,7 @@
           <a:p>
             <a:fld id="{990B45B9-6F7B-4A1C-ABF2-9469D9125292}" type="datetimeFigureOut">
               <a:rPr lang="en-GB" smtClean="0"/>
-              <a:t>02/12/2020</a:t>
+              <a:t>03/12/2020</a:t>
             </a:fld>
             <a:endParaRPr lang="en-GB"/>
           </a:p>
@@ -8609,7 +8614,7 @@
           <a:p>
             <a:fld id="{990B45B9-6F7B-4A1C-ABF2-9469D9125292}" type="datetimeFigureOut">
               <a:rPr lang="en-GB" smtClean="0"/>
-              <a:t>02/12/2020</a:t>
+              <a:t>03/12/2020</a:t>
             </a:fld>
             <a:endParaRPr lang="en-GB"/>
           </a:p>
@@ -8881,7 +8886,7 @@
           <a:p>
             <a:fld id="{990B45B9-6F7B-4A1C-ABF2-9469D9125292}" type="datetimeFigureOut">
               <a:rPr lang="en-GB" smtClean="0"/>
-              <a:t>02/12/2020</a:t>
+              <a:t>03/12/2020</a:t>
             </a:fld>
             <a:endParaRPr lang="en-GB"/>
           </a:p>
@@ -9291,7 +9296,7 @@
           <a:p>
             <a:fld id="{990B45B9-6F7B-4A1C-ABF2-9469D9125292}" type="datetimeFigureOut">
               <a:rPr lang="en-GB" smtClean="0"/>
-              <a:t>02/12/2020</a:t>
+              <a:t>03/12/2020</a:t>
             </a:fld>
             <a:endParaRPr lang="en-GB"/>
           </a:p>
@@ -9418,7 +9423,7 @@
           <a:p>
             <a:fld id="{990B45B9-6F7B-4A1C-ABF2-9469D9125292}" type="datetimeFigureOut">
               <a:rPr lang="en-GB" smtClean="0"/>
-              <a:t>02/12/2020</a:t>
+              <a:t>03/12/2020</a:t>
             </a:fld>
             <a:endParaRPr lang="en-GB"/>
           </a:p>
@@ -9513,7 +9518,7 @@
           <a:p>
             <a:fld id="{990B45B9-6F7B-4A1C-ABF2-9469D9125292}" type="datetimeFigureOut">
               <a:rPr lang="en-GB" smtClean="0"/>
-              <a:t>02/12/2020</a:t>
+              <a:t>03/12/2020</a:t>
             </a:fld>
             <a:endParaRPr lang="en-GB"/>
           </a:p>
@@ -10594,7 +10599,7 @@
           <a:p>
             <a:fld id="{990B45B9-6F7B-4A1C-ABF2-9469D9125292}" type="datetimeFigureOut">
               <a:rPr lang="en-GB" smtClean="0"/>
-              <a:t>02/12/2020</a:t>
+              <a:t>03/12/2020</a:t>
             </a:fld>
             <a:endParaRPr lang="en-GB"/>
           </a:p>
@@ -11702,7 +11707,7 @@
           <a:p>
             <a:fld id="{990B45B9-6F7B-4A1C-ABF2-9469D9125292}" type="datetimeFigureOut">
               <a:rPr lang="en-GB" smtClean="0"/>
-              <a:t>02/12/2020</a:t>
+              <a:t>03/12/2020</a:t>
             </a:fld>
             <a:endParaRPr lang="en-GB"/>
           </a:p>
@@ -12699,7 +12704,7 @@
           <a:p>
             <a:fld id="{990B45B9-6F7B-4A1C-ABF2-9469D9125292}" type="datetimeFigureOut">
               <a:rPr lang="en-GB" smtClean="0"/>
-              <a:t>02/12/2020</a:t>
+              <a:t>03/12/2020</a:t>
             </a:fld>
             <a:endParaRPr lang="en-GB"/>
           </a:p>
@@ -13268,10 +13273,10 @@
       </p:grpSpPr>
       <p:sp>
         <p:nvSpPr>
-          <p:cNvPr id="10" name="Freeform 5">
+          <p:cNvPr id="192" name="Rectangle 191">
             <a:extLst>
               <a:ext uri="{FF2B5EF4-FFF2-40B4-BE49-F238E27FC236}">
-                <a16:creationId xmlns:a16="http://schemas.microsoft.com/office/drawing/2014/main" id="{4E212B76-74CB-461F-90A3-EF4F2397A883}"/>
+                <a16:creationId xmlns:a16="http://schemas.microsoft.com/office/drawing/2014/main" id="{1B9CC3E5-EA42-4393-A2C0-5192B91BD745}"/>
               </a:ext>
               <a:ext uri="{C183D7F6-B498-43B3-948B-1728B52AA6E4}">
                 <adec:decorative xmlns:adec="http://schemas.microsoft.com/office/drawing/2017/decorative" val="1"/>
@@ -13289,153 +13294,101 @@
             </p:extLst>
           </p:nvPr>
         </p:nvSpPr>
-        <p:spPr bwMode="gray">
+        <p:spPr>
           <a:xfrm>
-            <a:off x="0" y="1587"/>
-            <a:ext cx="12192000" cy="6856413"/>
+            <a:off x="0" y="0"/>
+            <a:ext cx="12192000" cy="6858000"/>
           </a:xfrm>
-          <a:custGeom>
+          <a:prstGeom prst="rect">
             <a:avLst/>
-            <a:gdLst/>
-            <a:ahLst/>
-            <a:cxnLst/>
-            <a:rect l="0" t="0" r="r" b="b"/>
-            <a:pathLst>
-              <a:path w="15356" h="8638">
-                <a:moveTo>
-                  <a:pt x="0" y="0"/>
-                </a:moveTo>
-                <a:lnTo>
-                  <a:pt x="0" y="8638"/>
-                </a:lnTo>
-                <a:lnTo>
-                  <a:pt x="15356" y="8638"/>
-                </a:lnTo>
-                <a:lnTo>
-                  <a:pt x="15356" y="0"/>
-                </a:lnTo>
-                <a:lnTo>
-                  <a:pt x="0" y="0"/>
-                </a:lnTo>
-                <a:close/>
-                <a:moveTo>
-                  <a:pt x="14748" y="8038"/>
-                </a:moveTo>
-                <a:lnTo>
-                  <a:pt x="600" y="8038"/>
-                </a:lnTo>
-                <a:lnTo>
-                  <a:pt x="600" y="592"/>
-                </a:lnTo>
-                <a:lnTo>
-                  <a:pt x="14748" y="592"/>
-                </a:lnTo>
-                <a:lnTo>
-                  <a:pt x="14748" y="8038"/>
-                </a:lnTo>
-                <a:close/>
-              </a:path>
-            </a:pathLst>
-          </a:custGeom>
+          </a:prstGeom>
           <a:solidFill>
-            <a:schemeClr val="tx1"/>
+            <a:schemeClr val="bg1"/>
           </a:solidFill>
           <a:ln>
             <a:noFill/>
           </a:ln>
         </p:spPr>
+        <p:style>
+          <a:lnRef idx="2">
+            <a:schemeClr val="accent1">
+              <a:shade val="50000"/>
+            </a:schemeClr>
+          </a:lnRef>
+          <a:fillRef idx="1">
+            <a:schemeClr val="accent1"/>
+          </a:fillRef>
+          <a:effectRef idx="0">
+            <a:schemeClr val="accent1"/>
+          </a:effectRef>
+          <a:fontRef idx="minor">
+            <a:schemeClr val="lt1"/>
+          </a:fontRef>
+        </p:style>
+        <p:txBody>
+          <a:bodyPr rtlCol="0" anchor="ctr"/>
+          <a:lstStyle/>
+          <a:p>
+            <a:pPr algn="ctr"/>
+            <a:endParaRPr lang="en-US"/>
+          </a:p>
+        </p:txBody>
       </p:sp>
-      <p:sp>
-        <p:nvSpPr>
-          <p:cNvPr id="2" name="Title 1">
+      <p:pic>
+        <p:nvPicPr>
+          <p:cNvPr id="3074" name="Picture 2" descr="ACM'S Turing Award Prize Raised to $1 million">
             <a:extLst>
               <a:ext uri="{FF2B5EF4-FFF2-40B4-BE49-F238E27FC236}">
-                <a16:creationId xmlns:a16="http://schemas.microsoft.com/office/drawing/2014/main" id="{54D24013-EFB3-4702-B7EC-FE2BD69769EC}"/>
+                <a16:creationId xmlns:a16="http://schemas.microsoft.com/office/drawing/2014/main" id="{397E4FB3-0989-4B5F-9A8B-7EE1A5959C0E}"/>
               </a:ext>
             </a:extLst>
           </p:cNvPr>
-          <p:cNvSpPr>
-            <a:spLocks noGrp="1"/>
-          </p:cNvSpPr>
-          <p:nvPr>
-            <p:ph type="ctrTitle"/>
-          </p:nvPr>
-        </p:nvSpPr>
-        <p:spPr>
+          <p:cNvPicPr>
+            <a:picLocks noChangeAspect="1" noChangeArrowheads="1"/>
+          </p:cNvPicPr>
+          <p:nvPr/>
+        </p:nvPicPr>
+        <p:blipFill>
+          <a:blip r:embed="rId2">
+            <a:extLst>
+              <a:ext uri="{28A0092B-C50C-407E-A947-70E740481C1C}">
+                <a14:useLocalDpi xmlns:a14="http://schemas.microsoft.com/office/drawing/2010/main" val="0"/>
+              </a:ext>
+            </a:extLst>
+          </a:blip>
+          <a:stretch>
+            <a:fillRect/>
+          </a:stretch>
+        </p:blipFill>
+        <p:spPr bwMode="auto">
           <a:xfrm>
-            <a:off x="6744929" y="1241266"/>
-            <a:ext cx="4798142" cy="3153753"/>
+            <a:off x="6711281" y="1299229"/>
+            <a:ext cx="3599105" cy="2438394"/>
           </a:xfrm>
+          <a:prstGeom prst="roundRect">
+            <a:avLst>
+              <a:gd name="adj" fmla="val 0"/>
+            </a:avLst>
+          </a:prstGeom>
+          <a:noFill/>
+          <a:effectLst/>
+          <a:extLst>
+            <a:ext uri="{909E8E84-426E-40DD-AFC4-6F175D3DCCD1}">
+              <a14:hiddenFill xmlns:a14="http://schemas.microsoft.com/office/drawing/2010/main">
+                <a:solidFill>
+                  <a:srgbClr val="FFFFFF"/>
+                </a:solidFill>
+              </a14:hiddenFill>
+            </a:ext>
+          </a:extLst>
         </p:spPr>
-        <p:txBody>
-          <a:bodyPr>
-            <a:normAutofit/>
-          </a:bodyPr>
-          <a:lstStyle/>
-          <a:p>
-            <a:pPr>
-              <a:lnSpc>
-                <a:spcPct val="90000"/>
-              </a:lnSpc>
-            </a:pPr>
-            <a:r>
-              <a:rPr lang="en-GB">
-                <a:solidFill>
-                  <a:srgbClr val="EBEBEB"/>
-                </a:solidFill>
-              </a:rPr>
-              <a:t>Research Methods in Computing Presentation</a:t>
-            </a:r>
-          </a:p>
-        </p:txBody>
-      </p:sp>
+      </p:pic>
       <p:sp>
         <p:nvSpPr>
-          <p:cNvPr id="3" name="Subtitle 2">
+          <p:cNvPr id="193" name="Rectangle 192">
             <a:extLst>
               <a:ext uri="{FF2B5EF4-FFF2-40B4-BE49-F238E27FC236}">
-                <a16:creationId xmlns:a16="http://schemas.microsoft.com/office/drawing/2014/main" id="{8582CB59-CF4B-446A-9084-73434DB5F4CA}"/>
-              </a:ext>
-            </a:extLst>
-          </p:cNvPr>
-          <p:cNvSpPr>
-            <a:spLocks noGrp="1"/>
-          </p:cNvSpPr>
-          <p:nvPr>
-            <p:ph type="subTitle" idx="1"/>
-          </p:nvPr>
-        </p:nvSpPr>
-        <p:spPr>
-          <a:xfrm>
-            <a:off x="6744929" y="4591665"/>
-            <a:ext cx="4798142" cy="1622322"/>
-          </a:xfrm>
-        </p:spPr>
-        <p:txBody>
-          <a:bodyPr>
-            <a:normAutofit/>
-          </a:bodyPr>
-          <a:lstStyle/>
-          <a:p>
-            <a:r>
-              <a:rPr lang="en-GB" dirty="0"/>
-              <a:t>By Stephen Gallagher </a:t>
-            </a:r>
-          </a:p>
-          <a:p>
-            <a:r>
-              <a:rPr lang="en-GB" dirty="0"/>
-              <a:t>By Jack Haugh</a:t>
-            </a:r>
-          </a:p>
-        </p:txBody>
-      </p:sp>
-      <p:sp>
-        <p:nvSpPr>
-          <p:cNvPr id="12" name="Rectangle 11">
-            <a:extLst>
-              <a:ext uri="{FF2B5EF4-FFF2-40B4-BE49-F238E27FC236}">
-                <a16:creationId xmlns:a16="http://schemas.microsoft.com/office/drawing/2014/main" id="{81E746D0-4B37-4869-B2EF-79D5F0FFFBC9}"/>
+                <a16:creationId xmlns:a16="http://schemas.microsoft.com/office/drawing/2014/main" id="{FB8DBC8E-FBA7-466C-8D97-75B15FBE9048}"/>
               </a:ext>
               <a:ext uri="{C183D7F6-B498-43B3-948B-1728B52AA6E4}">
                 <adec:decorative xmlns:adec="http://schemas.microsoft.com/office/drawing/2017/decorative" val="1"/>
@@ -13498,13 +13451,13 @@
           <p:nvPr/>
         </p:nvPicPr>
         <p:blipFill>
-          <a:blip r:embed="rId2">
+          <a:blip r:embed="rId3">
             <a:extLst>
               <a:ext uri="{28A0092B-C50C-407E-A947-70E740481C1C}">
                 <a14:useLocalDpi xmlns:a14="http://schemas.microsoft.com/office/drawing/2010/main" val="0"/>
               </a:ext>
               <a:ext uri="{96DAC541-7B7A-43D3-8B79-37D633B846F1}">
-                <asvg:svgBlip xmlns:asvg="http://schemas.microsoft.com/office/drawing/2016/SVG/main" r:embed="rId3"/>
+                <asvg:svgBlip xmlns:asvg="http://schemas.microsoft.com/office/drawing/2016/SVG/main" r:embed="rId4"/>
               </a:ext>
             </a:extLst>
           </a:blip>
@@ -13514,23 +13467,729 @@
         </p:blipFill>
         <p:spPr>
           <a:xfrm>
-            <a:off x="1288503" y="1113063"/>
-            <a:ext cx="4628758" cy="4628758"/>
+            <a:off x="804039" y="-47037"/>
+            <a:ext cx="4676682" cy="4676682"/>
           </a:xfrm>
           <a:prstGeom prst="roundRect">
             <a:avLst>
-              <a:gd name="adj" fmla="val 1858"/>
+              <a:gd name="adj" fmla="val 0"/>
             </a:avLst>
           </a:prstGeom>
-          <a:effectLst>
-            <a:outerShdw blurRad="50800" dist="50800" dir="5400000" algn="tl" rotWithShape="0">
-              <a:srgbClr val="000000">
-                <a:alpha val="43000"/>
-              </a:srgbClr>
-            </a:outerShdw>
-          </a:effectLst>
+          <a:effectLst/>
         </p:spPr>
       </p:pic>
+      <p:sp>
+        <p:nvSpPr>
+          <p:cNvPr id="194" name="Freeform: Shape 193">
+            <a:extLst>
+              <a:ext uri="{FF2B5EF4-FFF2-40B4-BE49-F238E27FC236}">
+                <a16:creationId xmlns:a16="http://schemas.microsoft.com/office/drawing/2014/main" id="{E6FFF64E-1FE4-4AE0-9D62-567AA183C128}"/>
+              </a:ext>
+              <a:ext uri="{C183D7F6-B498-43B3-948B-1728B52AA6E4}">
+                <adec:decorative xmlns:adec="http://schemas.microsoft.com/office/drawing/2017/decorative" val="1"/>
+              </a:ext>
+            </a:extLst>
+          </p:cNvPr>
+          <p:cNvSpPr>
+            <a:spLocks noGrp="1" noRot="1" noChangeAspect="1" noMove="1" noResize="1" noEditPoints="1" noAdjustHandles="1" noChangeArrowheads="1" noChangeShapeType="1" noTextEdit="1"/>
+          </p:cNvSpPr>
+          <p:nvPr>
+            <p:extLst>
+              <p:ext uri="{386F3935-93C4-4BCD-93E2-E3B085C9AB24}">
+                <p16:designElem xmlns:p16="http://schemas.microsoft.com/office/powerpoint/2015/main" val="1"/>
+              </p:ext>
+            </p:extLst>
+          </p:nvPr>
+        </p:nvSpPr>
+        <p:spPr>
+          <a:xfrm>
+            <a:off x="457200" y="4133850"/>
+            <a:ext cx="11277600" cy="2250018"/>
+          </a:xfrm>
+          <a:custGeom>
+            <a:avLst/>
+            <a:gdLst>
+              <a:gd name="connsiteX0" fmla="*/ 5264150 w 11277600"/>
+              <a:gd name="connsiteY0" fmla="*/ 0 h 2250018"/>
+              <a:gd name="connsiteX1" fmla="*/ 5499100 w 11277600"/>
+              <a:gd name="connsiteY1" fmla="*/ 1588 h 2250018"/>
+              <a:gd name="connsiteX2" fmla="*/ 5730875 w 11277600"/>
+              <a:gd name="connsiteY2" fmla="*/ 1588 h 2250018"/>
+              <a:gd name="connsiteX3" fmla="*/ 5961063 w 11277600"/>
+              <a:gd name="connsiteY3" fmla="*/ 4763 h 2250018"/>
+              <a:gd name="connsiteX4" fmla="*/ 6186488 w 11277600"/>
+              <a:gd name="connsiteY4" fmla="*/ 9525 h 2250018"/>
+              <a:gd name="connsiteX5" fmla="*/ 6410325 w 11277600"/>
+              <a:gd name="connsiteY5" fmla="*/ 14288 h 2250018"/>
+              <a:gd name="connsiteX6" fmla="*/ 6629400 w 11277600"/>
+              <a:gd name="connsiteY6" fmla="*/ 19050 h 2250018"/>
+              <a:gd name="connsiteX7" fmla="*/ 6846888 w 11277600"/>
+              <a:gd name="connsiteY7" fmla="*/ 26988 h 2250018"/>
+              <a:gd name="connsiteX8" fmla="*/ 7061200 w 11277600"/>
+              <a:gd name="connsiteY8" fmla="*/ 34925 h 2250018"/>
+              <a:gd name="connsiteX9" fmla="*/ 7270750 w 11277600"/>
+              <a:gd name="connsiteY9" fmla="*/ 42863 h 2250018"/>
+              <a:gd name="connsiteX10" fmla="*/ 7680325 w 11277600"/>
+              <a:gd name="connsiteY10" fmla="*/ 63500 h 2250018"/>
+              <a:gd name="connsiteX11" fmla="*/ 8072438 w 11277600"/>
+              <a:gd name="connsiteY11" fmla="*/ 85725 h 2250018"/>
+              <a:gd name="connsiteX12" fmla="*/ 8448675 w 11277600"/>
+              <a:gd name="connsiteY12" fmla="*/ 109538 h 2250018"/>
+              <a:gd name="connsiteX13" fmla="*/ 8805862 w 11277600"/>
+              <a:gd name="connsiteY13" fmla="*/ 134938 h 2250018"/>
+              <a:gd name="connsiteX14" fmla="*/ 9145588 w 11277600"/>
+              <a:gd name="connsiteY14" fmla="*/ 161925 h 2250018"/>
+              <a:gd name="connsiteX15" fmla="*/ 9461500 w 11277600"/>
+              <a:gd name="connsiteY15" fmla="*/ 190500 h 2250018"/>
+              <a:gd name="connsiteX16" fmla="*/ 9758362 w 11277600"/>
+              <a:gd name="connsiteY16" fmla="*/ 219075 h 2250018"/>
+              <a:gd name="connsiteX17" fmla="*/ 10031412 w 11277600"/>
+              <a:gd name="connsiteY17" fmla="*/ 247650 h 2250018"/>
+              <a:gd name="connsiteX18" fmla="*/ 10282238 w 11277600"/>
+              <a:gd name="connsiteY18" fmla="*/ 274638 h 2250018"/>
+              <a:gd name="connsiteX19" fmla="*/ 10504488 w 11277600"/>
+              <a:gd name="connsiteY19" fmla="*/ 300038 h 2250018"/>
+              <a:gd name="connsiteX20" fmla="*/ 10704512 w 11277600"/>
+              <a:gd name="connsiteY20" fmla="*/ 323850 h 2250018"/>
+              <a:gd name="connsiteX21" fmla="*/ 10874375 w 11277600"/>
+              <a:gd name="connsiteY21" fmla="*/ 344488 h 2250018"/>
+              <a:gd name="connsiteX22" fmla="*/ 11015662 w 11277600"/>
+              <a:gd name="connsiteY22" fmla="*/ 363538 h 2250018"/>
+              <a:gd name="connsiteX23" fmla="*/ 11210925 w 11277600"/>
+              <a:gd name="connsiteY23" fmla="*/ 390525 h 2250018"/>
+              <a:gd name="connsiteX24" fmla="*/ 11277600 w 11277600"/>
+              <a:gd name="connsiteY24" fmla="*/ 400050 h 2250018"/>
+              <a:gd name="connsiteX25" fmla="*/ 11277600 w 11277600"/>
+              <a:gd name="connsiteY25" fmla="*/ 2250018 h 2250018"/>
+              <a:gd name="connsiteX26" fmla="*/ 0 w 11277600"/>
+              <a:gd name="connsiteY26" fmla="*/ 2250018 h 2250018"/>
+              <a:gd name="connsiteX27" fmla="*/ 0 w 11277600"/>
+              <a:gd name="connsiteY27" fmla="*/ 398463 h 2250018"/>
+              <a:gd name="connsiteX28" fmla="*/ 255588 w 11277600"/>
+              <a:gd name="connsiteY28" fmla="*/ 358775 h 2250018"/>
+              <a:gd name="connsiteX29" fmla="*/ 511175 w 11277600"/>
+              <a:gd name="connsiteY29" fmla="*/ 320675 h 2250018"/>
+              <a:gd name="connsiteX30" fmla="*/ 766762 w 11277600"/>
+              <a:gd name="connsiteY30" fmla="*/ 284163 h 2250018"/>
+              <a:gd name="connsiteX31" fmla="*/ 1023938 w 11277600"/>
+              <a:gd name="connsiteY31" fmla="*/ 252413 h 2250018"/>
+              <a:gd name="connsiteX32" fmla="*/ 1279525 w 11277600"/>
+              <a:gd name="connsiteY32" fmla="*/ 220663 h 2250018"/>
+              <a:gd name="connsiteX33" fmla="*/ 1536700 w 11277600"/>
+              <a:gd name="connsiteY33" fmla="*/ 190500 h 2250018"/>
+              <a:gd name="connsiteX34" fmla="*/ 1790700 w 11277600"/>
+              <a:gd name="connsiteY34" fmla="*/ 165100 h 2250018"/>
+              <a:gd name="connsiteX35" fmla="*/ 2047875 w 11277600"/>
+              <a:gd name="connsiteY35" fmla="*/ 141288 h 2250018"/>
+              <a:gd name="connsiteX36" fmla="*/ 2303462 w 11277600"/>
+              <a:gd name="connsiteY36" fmla="*/ 119063 h 2250018"/>
+              <a:gd name="connsiteX37" fmla="*/ 2555875 w 11277600"/>
+              <a:gd name="connsiteY37" fmla="*/ 100013 h 2250018"/>
+              <a:gd name="connsiteX38" fmla="*/ 2809875 w 11277600"/>
+              <a:gd name="connsiteY38" fmla="*/ 80963 h 2250018"/>
+              <a:gd name="connsiteX39" fmla="*/ 3062288 w 11277600"/>
+              <a:gd name="connsiteY39" fmla="*/ 65088 h 2250018"/>
+              <a:gd name="connsiteX40" fmla="*/ 3313113 w 11277600"/>
+              <a:gd name="connsiteY40" fmla="*/ 52388 h 2250018"/>
+              <a:gd name="connsiteX41" fmla="*/ 3563938 w 11277600"/>
+              <a:gd name="connsiteY41" fmla="*/ 39688 h 2250018"/>
+              <a:gd name="connsiteX42" fmla="*/ 3811588 w 11277600"/>
+              <a:gd name="connsiteY42" fmla="*/ 28575 h 2250018"/>
+              <a:gd name="connsiteX43" fmla="*/ 4057650 w 11277600"/>
+              <a:gd name="connsiteY43" fmla="*/ 20638 h 2250018"/>
+              <a:gd name="connsiteX44" fmla="*/ 4303713 w 11277600"/>
+              <a:gd name="connsiteY44" fmla="*/ 14288 h 2250018"/>
+              <a:gd name="connsiteX45" fmla="*/ 4546600 w 11277600"/>
+              <a:gd name="connsiteY45" fmla="*/ 7938 h 2250018"/>
+              <a:gd name="connsiteX46" fmla="*/ 4787900 w 11277600"/>
+              <a:gd name="connsiteY46" fmla="*/ 4763 h 2250018"/>
+              <a:gd name="connsiteX47" fmla="*/ 5027613 w 11277600"/>
+              <a:gd name="connsiteY47" fmla="*/ 1588 h 2250018"/>
+            </a:gdLst>
+            <a:ahLst/>
+            <a:cxnLst>
+              <a:cxn ang="0">
+                <a:pos x="connsiteX0" y="connsiteY0"/>
+              </a:cxn>
+              <a:cxn ang="0">
+                <a:pos x="connsiteX1" y="connsiteY1"/>
+              </a:cxn>
+              <a:cxn ang="0">
+                <a:pos x="connsiteX2" y="connsiteY2"/>
+              </a:cxn>
+              <a:cxn ang="0">
+                <a:pos x="connsiteX3" y="connsiteY3"/>
+              </a:cxn>
+              <a:cxn ang="0">
+                <a:pos x="connsiteX4" y="connsiteY4"/>
+              </a:cxn>
+              <a:cxn ang="0">
+                <a:pos x="connsiteX5" y="connsiteY5"/>
+              </a:cxn>
+              <a:cxn ang="0">
+                <a:pos x="connsiteX6" y="connsiteY6"/>
+              </a:cxn>
+              <a:cxn ang="0">
+                <a:pos x="connsiteX7" y="connsiteY7"/>
+              </a:cxn>
+              <a:cxn ang="0">
+                <a:pos x="connsiteX8" y="connsiteY8"/>
+              </a:cxn>
+              <a:cxn ang="0">
+                <a:pos x="connsiteX9" y="connsiteY9"/>
+              </a:cxn>
+              <a:cxn ang="0">
+                <a:pos x="connsiteX10" y="connsiteY10"/>
+              </a:cxn>
+              <a:cxn ang="0">
+                <a:pos x="connsiteX11" y="connsiteY11"/>
+              </a:cxn>
+              <a:cxn ang="0">
+                <a:pos x="connsiteX12" y="connsiteY12"/>
+              </a:cxn>
+              <a:cxn ang="0">
+                <a:pos x="connsiteX13" y="connsiteY13"/>
+              </a:cxn>
+              <a:cxn ang="0">
+                <a:pos x="connsiteX14" y="connsiteY14"/>
+              </a:cxn>
+              <a:cxn ang="0">
+                <a:pos x="connsiteX15" y="connsiteY15"/>
+              </a:cxn>
+              <a:cxn ang="0">
+                <a:pos x="connsiteX16" y="connsiteY16"/>
+              </a:cxn>
+              <a:cxn ang="0">
+                <a:pos x="connsiteX17" y="connsiteY17"/>
+              </a:cxn>
+              <a:cxn ang="0">
+                <a:pos x="connsiteX18" y="connsiteY18"/>
+              </a:cxn>
+              <a:cxn ang="0">
+                <a:pos x="connsiteX19" y="connsiteY19"/>
+              </a:cxn>
+              <a:cxn ang="0">
+                <a:pos x="connsiteX20" y="connsiteY20"/>
+              </a:cxn>
+              <a:cxn ang="0">
+                <a:pos x="connsiteX21" y="connsiteY21"/>
+              </a:cxn>
+              <a:cxn ang="0">
+                <a:pos x="connsiteX22" y="connsiteY22"/>
+              </a:cxn>
+              <a:cxn ang="0">
+                <a:pos x="connsiteX23" y="connsiteY23"/>
+              </a:cxn>
+              <a:cxn ang="0">
+                <a:pos x="connsiteX24" y="connsiteY24"/>
+              </a:cxn>
+              <a:cxn ang="0">
+                <a:pos x="connsiteX25" y="connsiteY25"/>
+              </a:cxn>
+              <a:cxn ang="0">
+                <a:pos x="connsiteX26" y="connsiteY26"/>
+              </a:cxn>
+              <a:cxn ang="0">
+                <a:pos x="connsiteX27" y="connsiteY27"/>
+              </a:cxn>
+              <a:cxn ang="0">
+                <a:pos x="connsiteX28" y="connsiteY28"/>
+              </a:cxn>
+              <a:cxn ang="0">
+                <a:pos x="connsiteX29" y="connsiteY29"/>
+              </a:cxn>
+              <a:cxn ang="0">
+                <a:pos x="connsiteX30" y="connsiteY30"/>
+              </a:cxn>
+              <a:cxn ang="0">
+                <a:pos x="connsiteX31" y="connsiteY31"/>
+              </a:cxn>
+              <a:cxn ang="0">
+                <a:pos x="connsiteX32" y="connsiteY32"/>
+              </a:cxn>
+              <a:cxn ang="0">
+                <a:pos x="connsiteX33" y="connsiteY33"/>
+              </a:cxn>
+              <a:cxn ang="0">
+                <a:pos x="connsiteX34" y="connsiteY34"/>
+              </a:cxn>
+              <a:cxn ang="0">
+                <a:pos x="connsiteX35" y="connsiteY35"/>
+              </a:cxn>
+              <a:cxn ang="0">
+                <a:pos x="connsiteX36" y="connsiteY36"/>
+              </a:cxn>
+              <a:cxn ang="0">
+                <a:pos x="connsiteX37" y="connsiteY37"/>
+              </a:cxn>
+              <a:cxn ang="0">
+                <a:pos x="connsiteX38" y="connsiteY38"/>
+              </a:cxn>
+              <a:cxn ang="0">
+                <a:pos x="connsiteX39" y="connsiteY39"/>
+              </a:cxn>
+              <a:cxn ang="0">
+                <a:pos x="connsiteX40" y="connsiteY40"/>
+              </a:cxn>
+              <a:cxn ang="0">
+                <a:pos x="connsiteX41" y="connsiteY41"/>
+              </a:cxn>
+              <a:cxn ang="0">
+                <a:pos x="connsiteX42" y="connsiteY42"/>
+              </a:cxn>
+              <a:cxn ang="0">
+                <a:pos x="connsiteX43" y="connsiteY43"/>
+              </a:cxn>
+              <a:cxn ang="0">
+                <a:pos x="connsiteX44" y="connsiteY44"/>
+              </a:cxn>
+              <a:cxn ang="0">
+                <a:pos x="connsiteX45" y="connsiteY45"/>
+              </a:cxn>
+              <a:cxn ang="0">
+                <a:pos x="connsiteX46" y="connsiteY46"/>
+              </a:cxn>
+              <a:cxn ang="0">
+                <a:pos x="connsiteX47" y="connsiteY47"/>
+              </a:cxn>
+            </a:cxnLst>
+            <a:rect l="l" t="t" r="r" b="b"/>
+            <a:pathLst>
+              <a:path w="11277600" h="2250018">
+                <a:moveTo>
+                  <a:pt x="5264150" y="0"/>
+                </a:moveTo>
+                <a:lnTo>
+                  <a:pt x="5499100" y="1588"/>
+                </a:lnTo>
+                <a:lnTo>
+                  <a:pt x="5730875" y="1588"/>
+                </a:lnTo>
+                <a:lnTo>
+                  <a:pt x="5961063" y="4763"/>
+                </a:lnTo>
+                <a:lnTo>
+                  <a:pt x="6186488" y="9525"/>
+                </a:lnTo>
+                <a:lnTo>
+                  <a:pt x="6410325" y="14288"/>
+                </a:lnTo>
+                <a:lnTo>
+                  <a:pt x="6629400" y="19050"/>
+                </a:lnTo>
+                <a:lnTo>
+                  <a:pt x="6846888" y="26988"/>
+                </a:lnTo>
+                <a:lnTo>
+                  <a:pt x="7061200" y="34925"/>
+                </a:lnTo>
+                <a:lnTo>
+                  <a:pt x="7270750" y="42863"/>
+                </a:lnTo>
+                <a:lnTo>
+                  <a:pt x="7680325" y="63500"/>
+                </a:lnTo>
+                <a:lnTo>
+                  <a:pt x="8072438" y="85725"/>
+                </a:lnTo>
+                <a:lnTo>
+                  <a:pt x="8448675" y="109538"/>
+                </a:lnTo>
+                <a:lnTo>
+                  <a:pt x="8805862" y="134938"/>
+                </a:lnTo>
+                <a:lnTo>
+                  <a:pt x="9145588" y="161925"/>
+                </a:lnTo>
+                <a:lnTo>
+                  <a:pt x="9461500" y="190500"/>
+                </a:lnTo>
+                <a:lnTo>
+                  <a:pt x="9758362" y="219075"/>
+                </a:lnTo>
+                <a:lnTo>
+                  <a:pt x="10031412" y="247650"/>
+                </a:lnTo>
+                <a:lnTo>
+                  <a:pt x="10282238" y="274638"/>
+                </a:lnTo>
+                <a:lnTo>
+                  <a:pt x="10504488" y="300038"/>
+                </a:lnTo>
+                <a:lnTo>
+                  <a:pt x="10704512" y="323850"/>
+                </a:lnTo>
+                <a:lnTo>
+                  <a:pt x="10874375" y="344488"/>
+                </a:lnTo>
+                <a:lnTo>
+                  <a:pt x="11015662" y="363538"/>
+                </a:lnTo>
+                <a:lnTo>
+                  <a:pt x="11210925" y="390525"/>
+                </a:lnTo>
+                <a:lnTo>
+                  <a:pt x="11277600" y="400050"/>
+                </a:lnTo>
+                <a:lnTo>
+                  <a:pt x="11277600" y="2250018"/>
+                </a:lnTo>
+                <a:lnTo>
+                  <a:pt x="0" y="2250018"/>
+                </a:lnTo>
+                <a:lnTo>
+                  <a:pt x="0" y="398463"/>
+                </a:lnTo>
+                <a:lnTo>
+                  <a:pt x="255588" y="358775"/>
+                </a:lnTo>
+                <a:lnTo>
+                  <a:pt x="511175" y="320675"/>
+                </a:lnTo>
+                <a:lnTo>
+                  <a:pt x="766762" y="284163"/>
+                </a:lnTo>
+                <a:lnTo>
+                  <a:pt x="1023938" y="252413"/>
+                </a:lnTo>
+                <a:lnTo>
+                  <a:pt x="1279525" y="220663"/>
+                </a:lnTo>
+                <a:lnTo>
+                  <a:pt x="1536700" y="190500"/>
+                </a:lnTo>
+                <a:lnTo>
+                  <a:pt x="1790700" y="165100"/>
+                </a:lnTo>
+                <a:lnTo>
+                  <a:pt x="2047875" y="141288"/>
+                </a:lnTo>
+                <a:lnTo>
+                  <a:pt x="2303462" y="119063"/>
+                </a:lnTo>
+                <a:lnTo>
+                  <a:pt x="2555875" y="100013"/>
+                </a:lnTo>
+                <a:lnTo>
+                  <a:pt x="2809875" y="80963"/>
+                </a:lnTo>
+                <a:lnTo>
+                  <a:pt x="3062288" y="65088"/>
+                </a:lnTo>
+                <a:lnTo>
+                  <a:pt x="3313113" y="52388"/>
+                </a:lnTo>
+                <a:lnTo>
+                  <a:pt x="3563938" y="39688"/>
+                </a:lnTo>
+                <a:lnTo>
+                  <a:pt x="3811588" y="28575"/>
+                </a:lnTo>
+                <a:lnTo>
+                  <a:pt x="4057650" y="20638"/>
+                </a:lnTo>
+                <a:lnTo>
+                  <a:pt x="4303713" y="14288"/>
+                </a:lnTo>
+                <a:lnTo>
+                  <a:pt x="4546600" y="7938"/>
+                </a:lnTo>
+                <a:lnTo>
+                  <a:pt x="4787900" y="4763"/>
+                </a:lnTo>
+                <a:lnTo>
+                  <a:pt x="5027613" y="1588"/>
+                </a:lnTo>
+                <a:close/>
+              </a:path>
+            </a:pathLst>
+          </a:custGeom>
+          <a:ln>
+            <a:noFill/>
+          </a:ln>
+        </p:spPr>
+        <p:style>
+          <a:lnRef idx="2">
+            <a:schemeClr val="accent1">
+              <a:shade val="50000"/>
+            </a:schemeClr>
+          </a:lnRef>
+          <a:fillRef idx="1003">
+            <a:schemeClr val="dk2"/>
+          </a:fillRef>
+          <a:effectRef idx="0">
+            <a:schemeClr val="accent1"/>
+          </a:effectRef>
+          <a:fontRef idx="minor">
+            <a:schemeClr val="lt1"/>
+          </a:fontRef>
+        </p:style>
+        <p:txBody>
+          <a:bodyPr wrap="square" rtlCol="0" anchor="ctr">
+            <a:noAutofit/>
+          </a:bodyPr>
+          <a:lstStyle/>
+          <a:p>
+            <a:pPr algn="ctr"/>
+            <a:endParaRPr lang="en-US"/>
+          </a:p>
+        </p:txBody>
+      </p:sp>
+      <p:sp>
+        <p:nvSpPr>
+          <p:cNvPr id="195" name="Freeform 5">
+            <a:extLst>
+              <a:ext uri="{FF2B5EF4-FFF2-40B4-BE49-F238E27FC236}">
+                <a16:creationId xmlns:a16="http://schemas.microsoft.com/office/drawing/2014/main" id="{9C80E52D-DE5C-4267-9C99-8741F2E42E36}"/>
+              </a:ext>
+              <a:ext uri="{C183D7F6-B498-43B3-948B-1728B52AA6E4}">
+                <adec:decorative xmlns:adec="http://schemas.microsoft.com/office/drawing/2017/decorative" val="1"/>
+              </a:ext>
+            </a:extLst>
+          </p:cNvPr>
+          <p:cNvSpPr>
+            <a:spLocks noGrp="1" noRot="1" noChangeAspect="1" noMove="1" noResize="1" noEditPoints="1" noAdjustHandles="1" noChangeArrowheads="1" noChangeShapeType="1" noTextEdit="1"/>
+          </p:cNvSpPr>
+          <p:nvPr>
+            <p:extLst>
+              <p:ext uri="{386F3935-93C4-4BCD-93E2-E3B085C9AB24}">
+                <p16:designElem xmlns:p16="http://schemas.microsoft.com/office/powerpoint/2015/main" val="1"/>
+              </p:ext>
+            </p:extLst>
+          </p:nvPr>
+        </p:nvSpPr>
+        <p:spPr bwMode="gray">
+          <a:xfrm rot="10371525">
+            <a:off x="263767" y="4117124"/>
+            <a:ext cx="3299407" cy="440924"/>
+          </a:xfrm>
+          <a:custGeom>
+            <a:avLst/>
+            <a:gdLst/>
+            <a:ahLst/>
+            <a:cxnLst/>
+            <a:rect l="l" t="t" r="r" b="b"/>
+            <a:pathLst>
+              <a:path w="10000" h="5291">
+                <a:moveTo>
+                  <a:pt x="85" y="2532"/>
+                </a:moveTo>
+                <a:cubicBezTo>
+                  <a:pt x="1736" y="3911"/>
+                  <a:pt x="7524" y="5298"/>
+                  <a:pt x="9958" y="5291"/>
+                </a:cubicBezTo>
+                <a:cubicBezTo>
+                  <a:pt x="9989" y="1958"/>
+                  <a:pt x="9969" y="3333"/>
+                  <a:pt x="10000" y="0"/>
+                </a:cubicBezTo>
+                <a:lnTo>
+                  <a:pt x="10000" y="0"/>
+                </a:lnTo>
+                <a:lnTo>
+                  <a:pt x="9667" y="204"/>
+                </a:lnTo>
+                <a:lnTo>
+                  <a:pt x="9334" y="400"/>
+                </a:lnTo>
+                <a:lnTo>
+                  <a:pt x="9001" y="590"/>
+                </a:lnTo>
+                <a:lnTo>
+                  <a:pt x="8667" y="753"/>
+                </a:lnTo>
+                <a:lnTo>
+                  <a:pt x="8333" y="917"/>
+                </a:lnTo>
+                <a:lnTo>
+                  <a:pt x="7999" y="1071"/>
+                </a:lnTo>
+                <a:lnTo>
+                  <a:pt x="7669" y="1202"/>
+                </a:lnTo>
+                <a:lnTo>
+                  <a:pt x="7333" y="1325"/>
+                </a:lnTo>
+                <a:lnTo>
+                  <a:pt x="7000" y="1440"/>
+                </a:lnTo>
+                <a:lnTo>
+                  <a:pt x="6673" y="1538"/>
+                </a:lnTo>
+                <a:lnTo>
+                  <a:pt x="6340" y="1636"/>
+                </a:lnTo>
+                <a:lnTo>
+                  <a:pt x="6013" y="1719"/>
+                </a:lnTo>
+                <a:lnTo>
+                  <a:pt x="5686" y="1784"/>
+                </a:lnTo>
+                <a:lnTo>
+                  <a:pt x="5359" y="1850"/>
+                </a:lnTo>
+                <a:lnTo>
+                  <a:pt x="5036" y="1906"/>
+                </a:lnTo>
+                <a:lnTo>
+                  <a:pt x="4717" y="1948"/>
+                </a:lnTo>
+                <a:lnTo>
+                  <a:pt x="4396" y="1980"/>
+                </a:lnTo>
+                <a:lnTo>
+                  <a:pt x="4079" y="2013"/>
+                </a:lnTo>
+                <a:lnTo>
+                  <a:pt x="3766" y="2029"/>
+                </a:lnTo>
+                <a:lnTo>
+                  <a:pt x="3454" y="2046"/>
+                </a:lnTo>
+                <a:lnTo>
+                  <a:pt x="3145" y="2053"/>
+                </a:lnTo>
+                <a:lnTo>
+                  <a:pt x="2839" y="2046"/>
+                </a:lnTo>
+                <a:lnTo>
+                  <a:pt x="2537" y="2046"/>
+                </a:lnTo>
+                <a:lnTo>
+                  <a:pt x="2238" y="2029"/>
+                </a:lnTo>
+                <a:lnTo>
+                  <a:pt x="1943" y="2004"/>
+                </a:lnTo>
+                <a:lnTo>
+                  <a:pt x="1653" y="1980"/>
+                </a:lnTo>
+                <a:lnTo>
+                  <a:pt x="1368" y="1955"/>
+                </a:lnTo>
+                <a:lnTo>
+                  <a:pt x="1085" y="1915"/>
+                </a:lnTo>
+                <a:lnTo>
+                  <a:pt x="806" y="1873"/>
+                </a:lnTo>
+                <a:lnTo>
+                  <a:pt x="533" y="1833"/>
+                </a:lnTo>
+                <a:lnTo>
+                  <a:pt x="0" y="1726"/>
+                </a:lnTo>
+                <a:cubicBezTo>
+                  <a:pt x="28" y="1995"/>
+                  <a:pt x="57" y="2263"/>
+                  <a:pt x="85" y="2532"/>
+                </a:cubicBezTo>
+                <a:close/>
+              </a:path>
+            </a:pathLst>
+          </a:custGeom>
+          <a:solidFill>
+            <a:schemeClr val="bg1">
+              <a:alpha val="20000"/>
+            </a:schemeClr>
+          </a:solidFill>
+          <a:ln>
+            <a:noFill/>
+          </a:ln>
+        </p:spPr>
+      </p:sp>
+      <p:sp>
+        <p:nvSpPr>
+          <p:cNvPr id="3" name="Subtitle 2">
+            <a:extLst>
+              <a:ext uri="{FF2B5EF4-FFF2-40B4-BE49-F238E27FC236}">
+                <a16:creationId xmlns:a16="http://schemas.microsoft.com/office/drawing/2014/main" id="{8582CB59-CF4B-446A-9084-73434DB5F4CA}"/>
+              </a:ext>
+            </a:extLst>
+          </p:cNvPr>
+          <p:cNvSpPr>
+            <a:spLocks noGrp="1"/>
+          </p:cNvSpPr>
+          <p:nvPr>
+            <p:ph type="subTitle" idx="1"/>
+          </p:nvPr>
+        </p:nvSpPr>
+        <p:spPr>
+          <a:xfrm>
+            <a:off x="649976" y="5692877"/>
+            <a:ext cx="10893095" cy="535304"/>
+          </a:xfrm>
+        </p:spPr>
+        <p:txBody>
+          <a:bodyPr>
+            <a:normAutofit/>
+          </a:bodyPr>
+          <a:lstStyle/>
+          <a:p>
+            <a:pPr>
+              <a:lnSpc>
+                <a:spcPct val="90000"/>
+              </a:lnSpc>
+            </a:pPr>
+            <a:r>
+              <a:rPr lang="en-GB" sz="1100"/>
+              <a:t>By Stephen Gallagher </a:t>
+            </a:r>
+          </a:p>
+          <a:p>
+            <a:pPr>
+              <a:lnSpc>
+                <a:spcPct val="90000"/>
+              </a:lnSpc>
+            </a:pPr>
+            <a:r>
+              <a:rPr lang="en-GB" sz="1100"/>
+              <a:t>By Jack Haugh</a:t>
+            </a:r>
+          </a:p>
+        </p:txBody>
+      </p:sp>
+      <p:sp>
+        <p:nvSpPr>
+          <p:cNvPr id="2" name="Title 1">
+            <a:extLst>
+              <a:ext uri="{FF2B5EF4-FFF2-40B4-BE49-F238E27FC236}">
+                <a16:creationId xmlns:a16="http://schemas.microsoft.com/office/drawing/2014/main" id="{54D24013-EFB3-4702-B7EC-FE2BD69769EC}"/>
+              </a:ext>
+            </a:extLst>
+          </p:cNvPr>
+          <p:cNvSpPr>
+            <a:spLocks noGrp="1"/>
+          </p:cNvSpPr>
+          <p:nvPr>
+            <p:ph type="ctrTitle"/>
+          </p:nvPr>
+        </p:nvSpPr>
+        <p:spPr>
+          <a:xfrm>
+            <a:off x="649975" y="4517136"/>
+            <a:ext cx="10893095" cy="1174947"/>
+          </a:xfrm>
+        </p:spPr>
+        <p:txBody>
+          <a:bodyPr>
+            <a:normAutofit/>
+          </a:bodyPr>
+          <a:lstStyle/>
+          <a:p>
+            <a:pPr>
+              <a:lnSpc>
+                <a:spcPct val="90000"/>
+              </a:lnSpc>
+            </a:pPr>
+            <a:r>
+              <a:rPr lang="en-GB" sz="3800"/>
+              <a:t>Research Methods in Computing Presentation</a:t>
+            </a:r>
+          </a:p>
+        </p:txBody>
+      </p:sp>
     </p:spTree>
     <p:extLst>
       <p:ext uri="{BB962C8B-B14F-4D97-AF65-F5344CB8AC3E}">
@@ -13539,7 +14198,7 @@
     </p:extLst>
   </p:cSld>
   <p:clrMapOvr>
-    <a:overrideClrMapping bg1="dk1" tx1="lt1" bg2="dk2" tx2="lt2" accent1="accent1" accent2="accent2" accent3="accent3" accent4="accent4" accent5="accent5" accent6="accent6" hlink="hlink" folHlink="folHlink"/>
+    <a:masterClrMapping/>
   </p:clrMapOvr>
 </p:sld>
 </file>
@@ -13900,8 +14559,8 @@
         </p:nvSpPr>
         <p:spPr>
           <a:xfrm>
-            <a:off x="4498669" y="219290"/>
-            <a:ext cx="4798142" cy="3153753"/>
+            <a:off x="1454958" y="1089212"/>
+            <a:ext cx="4716276" cy="2980270"/>
           </a:xfrm>
         </p:spPr>
         <p:txBody>
@@ -13919,8 +14578,24 @@
                 <a:ea typeface="+mj-ea"/>
                 <a:cs typeface="+mj-cs"/>
               </a:rPr>
-              <a:t>Turing award Winners..</a:t>
+              <a:t>Turing award Winners</a:t>
             </a:r>
+            <a:r>
+              <a:rPr lang="en-US" sz="5400" dirty="0">
+                <a:solidFill>
+                  <a:srgbClr val="EBEBEB"/>
+                </a:solidFill>
+              </a:rPr>
+              <a:t> 2019</a:t>
+            </a:r>
+            <a:endParaRPr lang="en-US" sz="5400" b="0" i="0" kern="1200" dirty="0">
+              <a:solidFill>
+                <a:srgbClr val="EBEBEB"/>
+              </a:solidFill>
+              <a:latin typeface="+mj-lt"/>
+              <a:ea typeface="+mj-ea"/>
+              <a:cs typeface="+mj-cs"/>
+            </a:endParaRPr>
           </a:p>
         </p:txBody>
       </p:sp>
@@ -14008,8 +14683,8 @@
         </p:blipFill>
         <p:spPr>
           <a:xfrm>
-            <a:off x="1288503" y="1113063"/>
-            <a:ext cx="3210166" cy="3210166"/>
+            <a:off x="727836" y="537973"/>
+            <a:ext cx="2304476" cy="2304476"/>
           </a:xfrm>
           <a:prstGeom prst="roundRect">
             <a:avLst>
@@ -14023,6 +14698,150 @@
               </a:srgbClr>
             </a:outerShdw>
           </a:effectLst>
+        </p:spPr>
+      </p:pic>
+      <p:pic>
+        <p:nvPicPr>
+          <p:cNvPr id="1026" name="Picture 2">
+            <a:extLst>
+              <a:ext uri="{FF2B5EF4-FFF2-40B4-BE49-F238E27FC236}">
+                <a16:creationId xmlns:a16="http://schemas.microsoft.com/office/drawing/2014/main" id="{455671EF-BCB8-435D-9DAE-50D71325565F}"/>
+              </a:ext>
+            </a:extLst>
+          </p:cNvPr>
+          <p:cNvPicPr>
+            <a:picLocks noChangeAspect="1" noChangeArrowheads="1"/>
+          </p:cNvPicPr>
+          <p:nvPr/>
+        </p:nvPicPr>
+        <p:blipFill>
+          <a:blip r:embed="rId5">
+            <a:extLst>
+              <a:ext uri="{28A0092B-C50C-407E-A947-70E740481C1C}">
+                <a14:useLocalDpi xmlns:a14="http://schemas.microsoft.com/office/drawing/2010/main" val="0"/>
+              </a:ext>
+            </a:extLst>
+          </a:blip>
+          <a:srcRect/>
+          <a:stretch>
+            <a:fillRect/>
+          </a:stretch>
+        </p:blipFill>
+        <p:spPr bwMode="auto">
+          <a:xfrm>
+            <a:off x="6319139" y="2260853"/>
+            <a:ext cx="4716276" cy="2564389"/>
+          </a:xfrm>
+          <a:prstGeom prst="roundRect">
+            <a:avLst>
+              <a:gd name="adj" fmla="val 4167"/>
+            </a:avLst>
+          </a:prstGeom>
+          <a:solidFill>
+            <a:srgbClr val="FFFFFF"/>
+          </a:solidFill>
+          <a:ln w="76200" cap="sq">
+            <a:solidFill>
+              <a:srgbClr val="EAEAEA"/>
+            </a:solidFill>
+            <a:miter lim="800000"/>
+          </a:ln>
+          <a:effectLst>
+            <a:reflection blurRad="12700" stA="33000" endPos="28000" dist="5000" dir="5400000" sy="-100000" algn="bl" rotWithShape="0"/>
+          </a:effectLst>
+          <a:scene3d>
+            <a:camera prst="orthographicFront"/>
+            <a:lightRig rig="threePt" dir="t">
+              <a:rot lat="0" lon="0" rev="2700000"/>
+            </a:lightRig>
+          </a:scene3d>
+          <a:sp3d contourW="6350">
+            <a:bevelT h="38100"/>
+            <a:contourClr>
+              <a:srgbClr val="C0C0C0"/>
+            </a:contourClr>
+          </a:sp3d>
+          <a:extLst>
+            <a:ext uri="{909E8E84-426E-40DD-AFC4-6F175D3DCCD1}">
+              <a14:hiddenFill xmlns:a14="http://schemas.microsoft.com/office/drawing/2010/main">
+                <a:solidFill>
+                  <a:srgbClr val="FFFFFF"/>
+                </a:solidFill>
+              </a14:hiddenFill>
+            </a:ext>
+          </a:extLst>
+        </p:spPr>
+      </p:pic>
+      <p:pic>
+        <p:nvPicPr>
+          <p:cNvPr id="1028" name="Picture 4">
+            <a:extLst>
+              <a:ext uri="{FF2B5EF4-FFF2-40B4-BE49-F238E27FC236}">
+                <a16:creationId xmlns:a16="http://schemas.microsoft.com/office/drawing/2014/main" id="{D6208AB6-6D8A-4107-8D1E-BEBFA08105D5}"/>
+              </a:ext>
+            </a:extLst>
+          </p:cNvPr>
+          <p:cNvPicPr>
+            <a:picLocks noChangeAspect="1" noChangeArrowheads="1"/>
+          </p:cNvPicPr>
+          <p:nvPr/>
+        </p:nvPicPr>
+        <p:blipFill>
+          <a:blip r:embed="rId6">
+            <a:extLst>
+              <a:ext uri="{28A0092B-C50C-407E-A947-70E740481C1C}">
+                <a14:useLocalDpi xmlns:a14="http://schemas.microsoft.com/office/drawing/2010/main" val="0"/>
+              </a:ext>
+            </a:extLst>
+          </a:blip>
+          <a:srcRect/>
+          <a:stretch>
+            <a:fillRect/>
+          </a:stretch>
+        </p:blipFill>
+        <p:spPr bwMode="auto">
+          <a:xfrm>
+            <a:off x="2295529" y="4385411"/>
+            <a:ext cx="2867025" cy="247650"/>
+          </a:xfrm>
+          <a:prstGeom prst="roundRect">
+            <a:avLst>
+              <a:gd name="adj" fmla="val 4167"/>
+            </a:avLst>
+          </a:prstGeom>
+          <a:solidFill>
+            <a:srgbClr val="FFFFFF"/>
+          </a:solidFill>
+          <a:ln w="76200" cap="sq">
+            <a:solidFill>
+              <a:srgbClr val="EAEAEA"/>
+            </a:solidFill>
+            <a:miter lim="800000"/>
+          </a:ln>
+          <a:effectLst>
+            <a:reflection blurRad="12700" stA="33000" endPos="28000" dist="5000" dir="5400000" sy="-100000" algn="bl" rotWithShape="0"/>
+          </a:effectLst>
+          <a:scene3d>
+            <a:camera prst="orthographicFront"/>
+            <a:lightRig rig="threePt" dir="t">
+              <a:rot lat="0" lon="0" rev="2700000"/>
+            </a:lightRig>
+          </a:scene3d>
+          <a:sp3d contourW="6350">
+            <a:bevelT h="38100"/>
+            <a:contourClr>
+              <a:srgbClr val="C0C0C0"/>
+            </a:contourClr>
+          </a:sp3d>
+          <a:extLst>
+            <a:ext uri="{909E8E84-426E-40DD-AFC4-6F175D3DCCD1}">
+              <a14:hiddenFill xmlns:a14="http://schemas.microsoft.com/office/drawing/2010/main">
+                <a:solidFill>
+                  <a:srgbClr val="FFFFFF"/>
+                </a:solidFill>
+              </a14:hiddenFill>
+            </a:ext>
+          </a:extLst>
         </p:spPr>
       </p:pic>
     </p:spTree>
@@ -14039,6 +14858,601 @@
 </file>
 
 <file path=ppt/slides/slide3.xml><?xml version="1.0" encoding="utf-8"?>
+<p:sld xmlns:a="http://schemas.openxmlformats.org/drawingml/2006/main" xmlns:r="http://schemas.openxmlformats.org/officeDocument/2006/relationships" xmlns:p="http://schemas.openxmlformats.org/presentationml/2006/main">
+  <p:cSld>
+    <p:bg>
+      <p:bgPr>
+        <a:solidFill>
+          <a:schemeClr val="bg1"/>
+        </a:solidFill>
+        <a:effectLst/>
+      </p:bgPr>
+    </p:bg>
+    <p:spTree>
+      <p:nvGrpSpPr>
+        <p:cNvPr id="1" name=""/>
+        <p:cNvGrpSpPr/>
+        <p:nvPr/>
+      </p:nvGrpSpPr>
+      <p:grpSpPr>
+        <a:xfrm>
+          <a:off x="0" y="0"/>
+          <a:ext cx="0" cy="0"/>
+          <a:chOff x="0" y="0"/>
+          <a:chExt cx="0" cy="0"/>
+        </a:xfrm>
+      </p:grpSpPr>
+      <p:grpSp>
+        <p:nvGrpSpPr>
+          <p:cNvPr id="10" name="Group 9">
+            <a:extLst>
+              <a:ext uri="{FF2B5EF4-FFF2-40B4-BE49-F238E27FC236}">
+                <a16:creationId xmlns:a16="http://schemas.microsoft.com/office/drawing/2014/main" id="{4091D54B-59AB-4A5E-8E9E-0421BD66D4FB}"/>
+              </a:ext>
+              <a:ext uri="{C183D7F6-B498-43B3-948B-1728B52AA6E4}">
+                <adec:decorative xmlns:adec="http://schemas.microsoft.com/office/drawing/2017/decorative" val="1"/>
+              </a:ext>
+            </a:extLst>
+          </p:cNvPr>
+          <p:cNvGrpSpPr>
+            <a:grpSpLocks noGrp="1" noUngrp="1" noRot="1" noChangeAspect="1" noMove="1" noResize="1"/>
+          </p:cNvGrpSpPr>
+          <p:nvPr>
+            <p:extLst>
+              <p:ext uri="{386F3935-93C4-4BCD-93E2-E3B085C9AB24}">
+                <p16:designElem xmlns:p16="http://schemas.microsoft.com/office/powerpoint/2015/main" val="1"/>
+              </p:ext>
+            </p:extLst>
+          </p:nvPr>
+        </p:nvGrpSpPr>
+        <p:grpSpPr>
+          <a:xfrm>
+            <a:off x="0" y="0"/>
+            <a:ext cx="12192000" cy="6858000"/>
+            <a:chOff x="0" y="0"/>
+            <a:chExt cx="12192000" cy="6858000"/>
+          </a:xfrm>
+        </p:grpSpPr>
+        <p:sp>
+          <p:nvSpPr>
+            <p:cNvPr id="11" name="Rectangle 10">
+              <a:extLst>
+                <a:ext uri="{FF2B5EF4-FFF2-40B4-BE49-F238E27FC236}">
+                  <a16:creationId xmlns:a16="http://schemas.microsoft.com/office/drawing/2014/main" id="{547CE62E-FFFD-4A1F-BA78-C3B89C36FCA5}"/>
+                </a:ext>
+                <a:ext uri="{C183D7F6-B498-43B3-948B-1728B52AA6E4}">
+                  <adec:decorative xmlns:adec="http://schemas.microsoft.com/office/drawing/2017/decorative" val="1"/>
+                </a:ext>
+              </a:extLst>
+            </p:cNvPr>
+            <p:cNvSpPr/>
+            <p:nvPr>
+              <p:extLst>
+                <p:ext uri="{386F3935-93C4-4BCD-93E2-E3B085C9AB24}">
+                  <p16:designElem xmlns:p16="http://schemas.microsoft.com/office/powerpoint/2015/main" val="1"/>
+                </p:ext>
+              </p:extLst>
+            </p:nvPr>
+          </p:nvSpPr>
+          <p:spPr>
+            <a:xfrm>
+              <a:off x="0" y="0"/>
+              <a:ext cx="12192000" cy="6858000"/>
+            </a:xfrm>
+            <a:prstGeom prst="rect">
+              <a:avLst/>
+            </a:prstGeom>
+            <a:blipFill>
+              <a:blip r:embed="rId2">
+                <a:duotone>
+                  <a:schemeClr val="dk2">
+                    <a:shade val="69000"/>
+                    <a:hueMod val="91000"/>
+                    <a:satMod val="164000"/>
+                    <a:lumMod val="74000"/>
+                  </a:schemeClr>
+                  <a:schemeClr val="dk2">
+                    <a:hueMod val="124000"/>
+                    <a:satMod val="140000"/>
+                    <a:lumMod val="142000"/>
+                  </a:schemeClr>
+                </a:duotone>
+              </a:blip>
+              <a:stretch>
+                <a:fillRect/>
+              </a:stretch>
+            </a:blipFill>
+            <a:ln>
+              <a:noFill/>
+            </a:ln>
+          </p:spPr>
+          <p:style>
+            <a:lnRef idx="2">
+              <a:schemeClr val="accent1">
+                <a:shade val="50000"/>
+              </a:schemeClr>
+            </a:lnRef>
+            <a:fillRef idx="1">
+              <a:schemeClr val="accent1"/>
+            </a:fillRef>
+            <a:effectRef idx="0">
+              <a:schemeClr val="accent1"/>
+            </a:effectRef>
+            <a:fontRef idx="minor">
+              <a:schemeClr val="lt1"/>
+            </a:fontRef>
+          </p:style>
+        </p:sp>
+        <p:sp>
+          <p:nvSpPr>
+            <p:cNvPr id="12" name="Freeform 5">
+              <a:extLst>
+                <a:ext uri="{FF2B5EF4-FFF2-40B4-BE49-F238E27FC236}">
+                  <a16:creationId xmlns:a16="http://schemas.microsoft.com/office/drawing/2014/main" id="{AE51FD27-6B6A-4D21-BF22-245DA9BD0B3E}"/>
+                </a:ext>
+                <a:ext uri="{C183D7F6-B498-43B3-948B-1728B52AA6E4}">
+                  <adec:decorative xmlns:adec="http://schemas.microsoft.com/office/drawing/2017/decorative" val="1"/>
+                </a:ext>
+              </a:extLst>
+            </p:cNvPr>
+            <p:cNvSpPr>
+              <a:spLocks noEditPoints="1"/>
+            </p:cNvSpPr>
+            <p:nvPr>
+              <p:extLst>
+                <p:ext uri="{386F3935-93C4-4BCD-93E2-E3B085C9AB24}">
+                  <p16:designElem xmlns:p16="http://schemas.microsoft.com/office/powerpoint/2015/main" val="1"/>
+                </p:ext>
+              </p:extLst>
+            </p:nvPr>
+          </p:nvSpPr>
+          <p:spPr bwMode="gray">
+            <a:xfrm>
+              <a:off x="0" y="1587"/>
+              <a:ext cx="12192000" cy="6856413"/>
+            </a:xfrm>
+            <a:custGeom>
+              <a:avLst/>
+              <a:gdLst/>
+              <a:ahLst/>
+              <a:cxnLst/>
+              <a:rect l="0" t="0" r="r" b="b"/>
+              <a:pathLst>
+                <a:path w="15356" h="8638">
+                  <a:moveTo>
+                    <a:pt x="0" y="0"/>
+                  </a:moveTo>
+                  <a:lnTo>
+                    <a:pt x="0" y="8638"/>
+                  </a:lnTo>
+                  <a:lnTo>
+                    <a:pt x="15356" y="8638"/>
+                  </a:lnTo>
+                  <a:lnTo>
+                    <a:pt x="15356" y="0"/>
+                  </a:lnTo>
+                  <a:lnTo>
+                    <a:pt x="0" y="0"/>
+                  </a:lnTo>
+                  <a:close/>
+                  <a:moveTo>
+                    <a:pt x="14748" y="8038"/>
+                  </a:moveTo>
+                  <a:lnTo>
+                    <a:pt x="600" y="8038"/>
+                  </a:lnTo>
+                  <a:lnTo>
+                    <a:pt x="600" y="592"/>
+                  </a:lnTo>
+                  <a:lnTo>
+                    <a:pt x="14748" y="592"/>
+                  </a:lnTo>
+                  <a:lnTo>
+                    <a:pt x="14748" y="8038"/>
+                  </a:lnTo>
+                  <a:close/>
+                </a:path>
+              </a:pathLst>
+            </a:custGeom>
+            <a:solidFill>
+              <a:schemeClr val="bg1"/>
+            </a:solidFill>
+            <a:ln>
+              <a:noFill/>
+            </a:ln>
+          </p:spPr>
+        </p:sp>
+      </p:grpSp>
+      <p:sp>
+        <p:nvSpPr>
+          <p:cNvPr id="14" name="Rectangle 13">
+            <a:extLst>
+              <a:ext uri="{FF2B5EF4-FFF2-40B4-BE49-F238E27FC236}">
+                <a16:creationId xmlns:a16="http://schemas.microsoft.com/office/drawing/2014/main" id="{B8144315-1C5A-4185-A952-25D98D303D46}"/>
+              </a:ext>
+              <a:ext uri="{C183D7F6-B498-43B3-948B-1728B52AA6E4}">
+                <adec:decorative xmlns:adec="http://schemas.microsoft.com/office/drawing/2017/decorative" val="1"/>
+              </a:ext>
+            </a:extLst>
+          </p:cNvPr>
+          <p:cNvSpPr>
+            <a:spLocks noGrp="1" noRot="1" noChangeAspect="1" noMove="1" noResize="1" noEditPoints="1" noAdjustHandles="1" noChangeArrowheads="1" noChangeShapeType="1" noTextEdit="1"/>
+          </p:cNvSpPr>
+          <p:nvPr>
+            <p:extLst>
+              <p:ext uri="{386F3935-93C4-4BCD-93E2-E3B085C9AB24}">
+                <p16:designElem xmlns:p16="http://schemas.microsoft.com/office/powerpoint/2015/main" val="1"/>
+              </p:ext>
+            </p:extLst>
+          </p:nvPr>
+        </p:nvSpPr>
+        <p:spPr>
+          <a:xfrm>
+            <a:off x="10437812" y="0"/>
+            <a:ext cx="685800" cy="1143000"/>
+          </a:xfrm>
+          <a:prstGeom prst="rect">
+            <a:avLst/>
+          </a:prstGeom>
+          <a:solidFill>
+            <a:schemeClr val="accent1"/>
+          </a:solidFill>
+          <a:ln>
+            <a:noFill/>
+          </a:ln>
+        </p:spPr>
+        <p:style>
+          <a:lnRef idx="1">
+            <a:schemeClr val="accent1"/>
+          </a:lnRef>
+          <a:fillRef idx="3">
+            <a:schemeClr val="accent1"/>
+          </a:fillRef>
+          <a:effectRef idx="2">
+            <a:schemeClr val="accent1"/>
+          </a:effectRef>
+          <a:fontRef idx="minor">
+            <a:schemeClr val="lt1"/>
+          </a:fontRef>
+        </p:style>
+      </p:sp>
+      <p:sp>
+        <p:nvSpPr>
+          <p:cNvPr id="16" name="Freeform 5">
+            <a:extLst>
+              <a:ext uri="{FF2B5EF4-FFF2-40B4-BE49-F238E27FC236}">
+                <a16:creationId xmlns:a16="http://schemas.microsoft.com/office/drawing/2014/main" id="{4E212B76-74CB-461F-90A3-EF4F2397A883}"/>
+              </a:ext>
+              <a:ext uri="{C183D7F6-B498-43B3-948B-1728B52AA6E4}">
+                <adec:decorative xmlns:adec="http://schemas.microsoft.com/office/drawing/2017/decorative" val="1"/>
+              </a:ext>
+            </a:extLst>
+          </p:cNvPr>
+          <p:cNvSpPr>
+            <a:spLocks noGrp="1" noRot="1" noChangeAspect="1" noMove="1" noResize="1" noEditPoints="1" noAdjustHandles="1" noChangeArrowheads="1" noChangeShapeType="1" noTextEdit="1"/>
+          </p:cNvSpPr>
+          <p:nvPr>
+            <p:extLst>
+              <p:ext uri="{386F3935-93C4-4BCD-93E2-E3B085C9AB24}">
+                <p16:designElem xmlns:p16="http://schemas.microsoft.com/office/powerpoint/2015/main" val="1"/>
+              </p:ext>
+            </p:extLst>
+          </p:nvPr>
+        </p:nvSpPr>
+        <p:spPr bwMode="gray">
+          <a:xfrm>
+            <a:off x="0" y="1587"/>
+            <a:ext cx="12192000" cy="6856413"/>
+          </a:xfrm>
+          <a:custGeom>
+            <a:avLst/>
+            <a:gdLst/>
+            <a:ahLst/>
+            <a:cxnLst/>
+            <a:rect l="0" t="0" r="r" b="b"/>
+            <a:pathLst>
+              <a:path w="15356" h="8638">
+                <a:moveTo>
+                  <a:pt x="0" y="0"/>
+                </a:moveTo>
+                <a:lnTo>
+                  <a:pt x="0" y="8638"/>
+                </a:lnTo>
+                <a:lnTo>
+                  <a:pt x="15356" y="8638"/>
+                </a:lnTo>
+                <a:lnTo>
+                  <a:pt x="15356" y="0"/>
+                </a:lnTo>
+                <a:lnTo>
+                  <a:pt x="0" y="0"/>
+                </a:lnTo>
+                <a:close/>
+                <a:moveTo>
+                  <a:pt x="14748" y="8038"/>
+                </a:moveTo>
+                <a:lnTo>
+                  <a:pt x="600" y="8038"/>
+                </a:lnTo>
+                <a:lnTo>
+                  <a:pt x="600" y="592"/>
+                </a:lnTo>
+                <a:lnTo>
+                  <a:pt x="14748" y="592"/>
+                </a:lnTo>
+                <a:lnTo>
+                  <a:pt x="14748" y="8038"/>
+                </a:lnTo>
+                <a:close/>
+              </a:path>
+            </a:pathLst>
+          </a:custGeom>
+          <a:solidFill>
+            <a:schemeClr val="tx1"/>
+          </a:solidFill>
+          <a:ln>
+            <a:noFill/>
+          </a:ln>
+        </p:spPr>
+      </p:sp>
+      <p:sp>
+        <p:nvSpPr>
+          <p:cNvPr id="2" name="Title 1">
+            <a:extLst>
+              <a:ext uri="{FF2B5EF4-FFF2-40B4-BE49-F238E27FC236}">
+                <a16:creationId xmlns:a16="http://schemas.microsoft.com/office/drawing/2014/main" id="{F183CAE4-7C82-4E04-92ED-D9D59B768BFE}"/>
+              </a:ext>
+            </a:extLst>
+          </p:cNvPr>
+          <p:cNvSpPr>
+            <a:spLocks noGrp="1"/>
+          </p:cNvSpPr>
+          <p:nvPr>
+            <p:ph type="title"/>
+          </p:nvPr>
+        </p:nvSpPr>
+        <p:spPr>
+          <a:xfrm>
+            <a:off x="2775899" y="-653714"/>
+            <a:ext cx="4798142" cy="3153753"/>
+          </a:xfrm>
+        </p:spPr>
+        <p:txBody>
+          <a:bodyPr vert="horz" lIns="91440" tIns="45720" rIns="91440" bIns="45720" rtlCol="0" anchor="b">
+            <a:normAutofit/>
+          </a:bodyPr>
+          <a:lstStyle/>
+          <a:p>
+            <a:br>
+              <a:rPr lang="en-US" sz="5400" dirty="0">
+                <a:solidFill>
+                  <a:srgbClr val="EBEBEB"/>
+                </a:solidFill>
+              </a:rPr>
+            </a:br>
+            <a:r>
+              <a:rPr lang="en-US" sz="5400" dirty="0">
+                <a:solidFill>
+                  <a:srgbClr val="EBEBEB"/>
+                </a:solidFill>
+              </a:rPr>
+              <a:t>Their hard work</a:t>
+            </a:r>
+            <a:r>
+              <a:rPr lang="en-US" sz="5400" b="0" i="0" kern="1200" dirty="0">
+                <a:solidFill>
+                  <a:srgbClr val="EBEBEB"/>
+                </a:solidFill>
+                <a:latin typeface="+mj-lt"/>
+                <a:ea typeface="+mj-ea"/>
+                <a:cs typeface="+mj-cs"/>
+              </a:rPr>
+              <a:t> …</a:t>
+            </a:r>
+          </a:p>
+        </p:txBody>
+      </p:sp>
+      <p:sp>
+        <p:nvSpPr>
+          <p:cNvPr id="18" name="Rectangle 17">
+            <a:extLst>
+              <a:ext uri="{FF2B5EF4-FFF2-40B4-BE49-F238E27FC236}">
+                <a16:creationId xmlns:a16="http://schemas.microsoft.com/office/drawing/2014/main" id="{81E746D0-4B37-4869-B2EF-79D5F0FFFBC9}"/>
+              </a:ext>
+              <a:ext uri="{C183D7F6-B498-43B3-948B-1728B52AA6E4}">
+                <adec:decorative xmlns:adec="http://schemas.microsoft.com/office/drawing/2017/decorative" val="1"/>
+              </a:ext>
+            </a:extLst>
+          </p:cNvPr>
+          <p:cNvSpPr>
+            <a:spLocks noGrp="1" noRot="1" noChangeAspect="1" noMove="1" noResize="1" noEditPoints="1" noAdjustHandles="1" noChangeArrowheads="1" noChangeShapeType="1" noTextEdit="1"/>
+          </p:cNvSpPr>
+          <p:nvPr>
+            <p:extLst>
+              <p:ext uri="{386F3935-93C4-4BCD-93E2-E3B085C9AB24}">
+                <p16:designElem xmlns:p16="http://schemas.microsoft.com/office/powerpoint/2015/main" val="1"/>
+              </p:ext>
+            </p:extLst>
+          </p:nvPr>
+        </p:nvSpPr>
+        <p:spPr>
+          <a:xfrm>
+            <a:off x="10437812" y="0"/>
+            <a:ext cx="685800" cy="1143000"/>
+          </a:xfrm>
+          <a:prstGeom prst="rect">
+            <a:avLst/>
+          </a:prstGeom>
+          <a:solidFill>
+            <a:schemeClr val="accent1"/>
+          </a:solidFill>
+          <a:ln>
+            <a:noFill/>
+          </a:ln>
+        </p:spPr>
+        <p:style>
+          <a:lnRef idx="1">
+            <a:schemeClr val="accent1"/>
+          </a:lnRef>
+          <a:fillRef idx="3">
+            <a:schemeClr val="accent1"/>
+          </a:fillRef>
+          <a:effectRef idx="2">
+            <a:schemeClr val="accent1"/>
+          </a:effectRef>
+          <a:fontRef idx="minor">
+            <a:schemeClr val="lt1"/>
+          </a:fontRef>
+        </p:style>
+      </p:sp>
+      <p:pic>
+        <p:nvPicPr>
+          <p:cNvPr id="7" name="Graphic 6" descr="Tools">
+            <a:extLst>
+              <a:ext uri="{FF2B5EF4-FFF2-40B4-BE49-F238E27FC236}">
+                <a16:creationId xmlns:a16="http://schemas.microsoft.com/office/drawing/2014/main" id="{F2F511E8-9942-4DAA-8B7D-84884A062AF4}"/>
+              </a:ext>
+            </a:extLst>
+          </p:cNvPr>
+          <p:cNvPicPr>
+            <a:picLocks noChangeAspect="1"/>
+          </p:cNvPicPr>
+          <p:nvPr/>
+        </p:nvPicPr>
+        <p:blipFill>
+          <a:blip r:embed="rId3">
+            <a:extLst>
+              <a:ext uri="{28A0092B-C50C-407E-A947-70E740481C1C}">
+                <a14:useLocalDpi xmlns:a14="http://schemas.microsoft.com/office/drawing/2010/main" val="0"/>
+              </a:ext>
+              <a:ext uri="{96DAC541-7B7A-43D3-8B79-37D633B846F1}">
+                <asvg:svgBlip xmlns:asvg="http://schemas.microsoft.com/office/drawing/2016/SVG/main" r:embed="rId4"/>
+              </a:ext>
+            </a:extLst>
+          </a:blip>
+          <a:stretch>
+            <a:fillRect/>
+          </a:stretch>
+        </p:blipFill>
+        <p:spPr>
+          <a:xfrm>
+            <a:off x="770791" y="561734"/>
+            <a:ext cx="2053719" cy="2053719"/>
+          </a:xfrm>
+          <a:prstGeom prst="roundRect">
+            <a:avLst>
+              <a:gd name="adj" fmla="val 1858"/>
+            </a:avLst>
+          </a:prstGeom>
+          <a:effectLst>
+            <a:outerShdw blurRad="50800" dist="50800" dir="5400000" algn="tl" rotWithShape="0">
+              <a:srgbClr val="000000">
+                <a:alpha val="43000"/>
+              </a:srgbClr>
+            </a:outerShdw>
+          </a:effectLst>
+        </p:spPr>
+      </p:pic>
+      <p:sp>
+        <p:nvSpPr>
+          <p:cNvPr id="3" name="TextBox 2">
+            <a:extLst>
+              <a:ext uri="{FF2B5EF4-FFF2-40B4-BE49-F238E27FC236}">
+                <a16:creationId xmlns:a16="http://schemas.microsoft.com/office/drawing/2014/main" id="{B6A36904-43CD-4AD1-ABB7-0451E148CD3E}"/>
+              </a:ext>
+            </a:extLst>
+          </p:cNvPr>
+          <p:cNvSpPr txBox="1"/>
+          <p:nvPr/>
+        </p:nvSpPr>
+        <p:spPr>
+          <a:xfrm>
+            <a:off x="2499756" y="2939143"/>
+            <a:ext cx="6187044" cy="2031325"/>
+          </a:xfrm>
+          <a:prstGeom prst="rect">
+            <a:avLst/>
+          </a:prstGeom>
+          <a:noFill/>
+        </p:spPr>
+        <p:txBody>
+          <a:bodyPr wrap="square" rtlCol="0">
+            <a:spAutoFit/>
+          </a:bodyPr>
+          <a:lstStyle/>
+          <a:p>
+            <a:pPr marL="285750" indent="-285750">
+              <a:buFont typeface="Arial" panose="020B0604020202020204" pitchFamily="34" charset="0"/>
+              <a:buChar char="•"/>
+            </a:pPr>
+            <a:r>
+              <a:rPr lang="en-GB" dirty="0"/>
+              <a:t>Invented the techniques underpinning today’s AI breakthroughs</a:t>
+            </a:r>
+          </a:p>
+          <a:p>
+            <a:pPr marL="285750" indent="-285750">
+              <a:buFont typeface="Arial" panose="020B0604020202020204" pitchFamily="34" charset="0"/>
+              <a:buChar char="•"/>
+            </a:pPr>
+            <a:r>
+              <a:rPr lang="en-GB" dirty="0"/>
+              <a:t>.</a:t>
+            </a:r>
+          </a:p>
+          <a:p>
+            <a:pPr marL="285750" indent="-285750">
+              <a:buFont typeface="Arial" panose="020B0604020202020204" pitchFamily="34" charset="0"/>
+              <a:buChar char="•"/>
+            </a:pPr>
+            <a:r>
+              <a:rPr lang="en-GB" dirty="0"/>
+              <a:t>.</a:t>
+            </a:r>
+          </a:p>
+          <a:p>
+            <a:pPr marL="285750" indent="-285750">
+              <a:buFont typeface="Arial" panose="020B0604020202020204" pitchFamily="34" charset="0"/>
+              <a:buChar char="•"/>
+            </a:pPr>
+            <a:r>
+              <a:rPr lang="en-GB" dirty="0"/>
+              <a:t>.</a:t>
+            </a:r>
+          </a:p>
+          <a:p>
+            <a:pPr marL="285750" indent="-285750">
+              <a:buFont typeface="Arial" panose="020B0604020202020204" pitchFamily="34" charset="0"/>
+              <a:buChar char="•"/>
+            </a:pPr>
+            <a:r>
+              <a:rPr lang="en-GB" dirty="0"/>
+              <a:t>.</a:t>
+            </a:r>
+          </a:p>
+          <a:p>
+            <a:pPr marL="285750" indent="-285750">
+              <a:buFont typeface="Arial" panose="020B0604020202020204" pitchFamily="34" charset="0"/>
+              <a:buChar char="•"/>
+            </a:pPr>
+            <a:endParaRPr lang="en-GB" dirty="0"/>
+          </a:p>
+        </p:txBody>
+      </p:sp>
+    </p:spTree>
+    <p:extLst>
+      <p:ext uri="{BB962C8B-B14F-4D97-AF65-F5344CB8AC3E}">
+        <p14:creationId xmlns:p14="http://schemas.microsoft.com/office/powerpoint/2010/main" val="1234941119"/>
+      </p:ext>
+    </p:extLst>
+  </p:cSld>
+  <p:clrMapOvr>
+    <a:overrideClrMapping bg1="dk1" tx1="lt1" bg2="dk2" tx2="lt2" accent1="accent1" accent2="accent2" accent3="accent3" accent4="accent4" accent5="accent5" accent6="accent6" hlink="hlink" folHlink="folHlink"/>
+  </p:clrMapOvr>
+</p:sld>
+</file>
+
+<file path=ppt/slides/slide4.xml><?xml version="1.0" encoding="utf-8"?>
 <p:sld xmlns:a="http://schemas.openxmlformats.org/drawingml/2006/main" xmlns:r="http://schemas.openxmlformats.org/officeDocument/2006/relationships" xmlns:p="http://schemas.openxmlformats.org/presentationml/2006/main">
   <p:cSld>
     <p:bg>
@@ -14394,18 +15808,18 @@
         </p:nvSpPr>
         <p:spPr>
           <a:xfrm>
-            <a:off x="6744929" y="1241266"/>
-            <a:ext cx="4798142" cy="3153753"/>
+            <a:off x="1167208" y="3501598"/>
+            <a:ext cx="6762642" cy="611061"/>
           </a:xfrm>
         </p:spPr>
         <p:txBody>
           <a:bodyPr vert="horz" lIns="91440" tIns="45720" rIns="91440" bIns="45720" rtlCol="0" anchor="b">
-            <a:normAutofit/>
+            <a:normAutofit fontScale="90000"/>
           </a:bodyPr>
           <a:lstStyle/>
           <a:p>
             <a:r>
-              <a:rPr lang="en-US" sz="5400" b="0" i="0" kern="1200">
+              <a:rPr lang="en-US" sz="5400" b="0" i="0" kern="1200" dirty="0">
                 <a:solidFill>
                   <a:srgbClr val="EBEBEB"/>
                 </a:solidFill>
@@ -14413,7 +15827,7 @@
                 <a:ea typeface="+mj-ea"/>
                 <a:cs typeface="+mj-cs"/>
               </a:rPr>
-              <a:t>They came up with ..</a:t>
+              <a:t>The Turing award winners Timeline ..</a:t>
             </a:r>
           </a:p>
         </p:txBody>
@@ -14502,8 +15916,8 @@
         </p:blipFill>
         <p:spPr>
           <a:xfrm>
-            <a:off x="1288503" y="1113063"/>
-            <a:ext cx="4628758" cy="4628758"/>
+            <a:off x="3020123" y="802695"/>
+            <a:ext cx="1804321" cy="1804321"/>
           </a:xfrm>
           <a:prstGeom prst="roundRect">
             <a:avLst>
@@ -14519,6 +15933,62 @@
           </a:effectLst>
         </p:spPr>
       </p:pic>
+      <p:pic>
+        <p:nvPicPr>
+          <p:cNvPr id="2050" name="Picture 2">
+            <a:extLst>
+              <a:ext uri="{FF2B5EF4-FFF2-40B4-BE49-F238E27FC236}">
+                <a16:creationId xmlns:a16="http://schemas.microsoft.com/office/drawing/2014/main" id="{A975A1DE-D819-430C-BBB3-37384E85C155}"/>
+              </a:ext>
+            </a:extLst>
+          </p:cNvPr>
+          <p:cNvPicPr>
+            <a:picLocks noChangeAspect="1" noChangeArrowheads="1"/>
+          </p:cNvPicPr>
+          <p:nvPr/>
+        </p:nvPicPr>
+        <p:blipFill>
+          <a:blip r:embed="rId5">
+            <a:extLst>
+              <a:ext uri="{28A0092B-C50C-407E-A947-70E740481C1C}">
+                <a14:useLocalDpi xmlns:a14="http://schemas.microsoft.com/office/drawing/2010/main" val="0"/>
+              </a:ext>
+            </a:extLst>
+          </a:blip>
+          <a:srcRect/>
+          <a:stretch>
+            <a:fillRect/>
+          </a:stretch>
+        </p:blipFill>
+        <p:spPr bwMode="auto">
+          <a:xfrm>
+            <a:off x="7469578" y="2262249"/>
+            <a:ext cx="3956341" cy="3700821"/>
+          </a:xfrm>
+          <a:prstGeom prst="rect">
+            <a:avLst/>
+          </a:prstGeom>
+          <a:ln>
+            <a:noFill/>
+          </a:ln>
+          <a:effectLst>
+            <a:outerShdw blurRad="190500" algn="tl" rotWithShape="0">
+              <a:srgbClr val="000000">
+                <a:alpha val="70000"/>
+              </a:srgbClr>
+            </a:outerShdw>
+          </a:effectLst>
+          <a:extLst>
+            <a:ext uri="{909E8E84-426E-40DD-AFC4-6F175D3DCCD1}">
+              <a14:hiddenFill xmlns:a14="http://schemas.microsoft.com/office/drawing/2010/main">
+                <a:solidFill>
+                  <a:srgbClr val="FFFFFF"/>
+                </a:solidFill>
+              </a14:hiddenFill>
+            </a:ext>
+          </a:extLst>
+        </p:spPr>
+      </p:pic>
     </p:spTree>
     <p:extLst>
       <p:ext uri="{BB962C8B-B14F-4D97-AF65-F5344CB8AC3E}">
@@ -14532,7 +16002,7 @@
 </p:sld>
 </file>
 
-<file path=ppt/slides/slide4.xml><?xml version="1.0" encoding="utf-8"?>
+<file path=ppt/slides/slide5.xml><?xml version="1.0" encoding="utf-8"?>
 <p:sld xmlns:a="http://schemas.openxmlformats.org/drawingml/2006/main" xmlns:r="http://schemas.openxmlformats.org/officeDocument/2006/relationships" xmlns:p="http://schemas.openxmlformats.org/presentationml/2006/main">
   <p:cSld>
     <p:bg>
@@ -14993,7 +16463,7 @@
         </p:nvSpPr>
         <p:spPr>
           <a:xfrm>
-            <a:off x="5274825" y="1143000"/>
+            <a:off x="2602876" y="-355041"/>
             <a:ext cx="6268246" cy="3134032"/>
           </a:xfrm>
         </p:spPr>
@@ -15004,7 +16474,7 @@
           <a:lstStyle/>
           <a:p>
             <a:r>
-              <a:rPr lang="en-US" sz="6600" b="0" i="0" kern="1200">
+              <a:rPr lang="en-US" sz="6600" b="0" i="0" kern="1200" dirty="0">
                 <a:solidFill>
                   <a:srgbClr val="EBEBEB"/>
                 </a:solidFill>
@@ -15012,7 +16482,7 @@
                 <a:ea typeface="+mj-ea"/>
                 <a:cs typeface="+mj-cs"/>
               </a:rPr>
-              <a:t>Studied in ..</a:t>
+              <a:t>Their current jobs ..</a:t>
             </a:r>
           </a:p>
         </p:txBody>
@@ -15048,8 +16518,8 @@
         </p:blipFill>
         <p:spPr>
           <a:xfrm>
-            <a:off x="1109764" y="1661911"/>
-            <a:ext cx="3531062" cy="3531062"/>
+            <a:off x="477753" y="571500"/>
+            <a:ext cx="2523732" cy="2523732"/>
           </a:xfrm>
           <a:prstGeom prst="roundRect">
             <a:avLst>
@@ -15065,504 +16535,137 @@
           </a:effectLst>
         </p:spPr>
       </p:pic>
+      <p:sp>
+        <p:nvSpPr>
+          <p:cNvPr id="3" name="TextBox 2">
+            <a:extLst>
+              <a:ext uri="{FF2B5EF4-FFF2-40B4-BE49-F238E27FC236}">
+                <a16:creationId xmlns:a16="http://schemas.microsoft.com/office/drawing/2014/main" id="{EE9DF9C2-649E-44C4-9165-B4AF0C7A9034}"/>
+              </a:ext>
+            </a:extLst>
+          </p:cNvPr>
+          <p:cNvSpPr txBox="1"/>
+          <p:nvPr/>
+        </p:nvSpPr>
+        <p:spPr>
+          <a:xfrm>
+            <a:off x="2422566" y="3095232"/>
+            <a:ext cx="5967351" cy="2862322"/>
+          </a:xfrm>
+          <a:prstGeom prst="rect">
+            <a:avLst/>
+          </a:prstGeom>
+          <a:noFill/>
+        </p:spPr>
+        <p:txBody>
+          <a:bodyPr wrap="square" rtlCol="0">
+            <a:spAutoFit/>
+          </a:bodyPr>
+          <a:lstStyle/>
+          <a:p>
+            <a:pPr marL="285750" indent="-285750" fontAlgn="base">
+              <a:buFont typeface="Arial" panose="020B0604020202020204" pitchFamily="34" charset="0"/>
+              <a:buChar char="•"/>
+            </a:pPr>
+            <a:r>
+              <a:rPr lang="en-GB" dirty="0">
+                <a:hlinkClick r:id="rId5" tooltip="Meet the Godfather of AI in this Episode of Hello World (Video)"/>
+              </a:rPr>
+              <a:t>Geoff Hinton</a:t>
+            </a:r>
+            <a:r>
+              <a:rPr lang="en-GB" dirty="0"/>
+              <a:t>, an emeritus professor at the University of Toronto and a senior researcher at </a:t>
+            </a:r>
+            <a:r>
+              <a:rPr lang="en-GB" dirty="0">
+                <a:hlinkClick r:id="rId6" tooltip="Company Overview"/>
+              </a:rPr>
+              <a:t>Alphabet Inc.</a:t>
+            </a:r>
+            <a:r>
+              <a:rPr lang="en-GB" dirty="0"/>
+              <a:t>’s Google Brain. </a:t>
+            </a:r>
+          </a:p>
+          <a:p>
+            <a:pPr fontAlgn="base"/>
+            <a:endParaRPr lang="en-GB" dirty="0"/>
+          </a:p>
+          <a:p>
+            <a:pPr marL="285750" indent="-285750" fontAlgn="base">
+              <a:buFont typeface="Arial" panose="020B0604020202020204" pitchFamily="34" charset="0"/>
+              <a:buChar char="•"/>
+            </a:pPr>
+            <a:r>
+              <a:rPr lang="en-GB" dirty="0"/>
+              <a:t>Yann </a:t>
+            </a:r>
+            <a:r>
+              <a:rPr lang="en-GB" dirty="0" err="1"/>
+              <a:t>LeCun</a:t>
+            </a:r>
+            <a:r>
+              <a:rPr lang="en-GB" dirty="0"/>
+              <a:t>, a professor at New York University and the chief AI scientist at </a:t>
+            </a:r>
+            <a:r>
+              <a:rPr lang="en-GB" dirty="0">
+                <a:hlinkClick r:id="rId7" tooltip="Company Overview"/>
+              </a:rPr>
+              <a:t>Facebook Inc.</a:t>
+            </a:r>
+            <a:r>
+              <a:rPr lang="en-GB" dirty="0"/>
+              <a:t> </a:t>
+            </a:r>
+          </a:p>
+          <a:p>
+            <a:pPr fontAlgn="base"/>
+            <a:endParaRPr lang="en-GB" dirty="0"/>
+          </a:p>
+          <a:p>
+            <a:pPr marL="285750" indent="-285750" fontAlgn="base">
+              <a:buFont typeface="Arial" panose="020B0604020202020204" pitchFamily="34" charset="0"/>
+              <a:buChar char="•"/>
+            </a:pPr>
+            <a:r>
+              <a:rPr lang="en-GB" dirty="0"/>
+              <a:t> </a:t>
+            </a:r>
+            <a:r>
+              <a:rPr lang="en-GB" dirty="0" err="1"/>
+              <a:t>Yoshua</a:t>
+            </a:r>
+            <a:r>
+              <a:rPr lang="en-GB" dirty="0"/>
+              <a:t> </a:t>
+            </a:r>
+            <a:r>
+              <a:rPr lang="en-GB" dirty="0" err="1"/>
+              <a:t>Bengio</a:t>
+            </a:r>
+            <a:r>
+              <a:rPr lang="en-GB" dirty="0"/>
+              <a:t>, a professor at the University of Montreal as well as co-founder of AI company </a:t>
+            </a:r>
+            <a:r>
+              <a:rPr lang="en-GB" dirty="0">
+                <a:hlinkClick r:id="rId8" tooltip="Company Overview"/>
+              </a:rPr>
+              <a:t>Element AI Inc.</a:t>
+            </a:r>
+            <a:r>
+              <a:rPr lang="en-GB" dirty="0"/>
+              <a:t> </a:t>
+            </a:r>
+          </a:p>
+        </p:txBody>
+      </p:sp>
     </p:spTree>
     <p:extLst>
       <p:ext uri="{BB962C8B-B14F-4D97-AF65-F5344CB8AC3E}">
         <p14:creationId xmlns:p14="http://schemas.microsoft.com/office/powerpoint/2010/main" val="1008068401"/>
-      </p:ext>
-    </p:extLst>
-  </p:cSld>
-  <p:clrMapOvr>
-    <a:overrideClrMapping bg1="dk1" tx1="lt1" bg2="dk2" tx2="lt2" accent1="accent1" accent2="accent2" accent3="accent3" accent4="accent4" accent5="accent5" accent6="accent6" hlink="hlink" folHlink="folHlink"/>
-  </p:clrMapOvr>
-</p:sld>
-</file>
-
-<file path=ppt/slides/slide5.xml><?xml version="1.0" encoding="utf-8"?>
-<p:sld xmlns:a="http://schemas.openxmlformats.org/drawingml/2006/main" xmlns:r="http://schemas.openxmlformats.org/officeDocument/2006/relationships" xmlns:p="http://schemas.openxmlformats.org/presentationml/2006/main">
-  <p:cSld>
-    <p:bg>
-      <p:bgPr>
-        <a:solidFill>
-          <a:schemeClr val="bg1"/>
-        </a:solidFill>
-        <a:effectLst/>
-      </p:bgPr>
-    </p:bg>
-    <p:spTree>
-      <p:nvGrpSpPr>
-        <p:cNvPr id="1" name=""/>
-        <p:cNvGrpSpPr/>
-        <p:nvPr/>
-      </p:nvGrpSpPr>
-      <p:grpSpPr>
-        <a:xfrm>
-          <a:off x="0" y="0"/>
-          <a:ext cx="0" cy="0"/>
-          <a:chOff x="0" y="0"/>
-          <a:chExt cx="0" cy="0"/>
-        </a:xfrm>
-      </p:grpSpPr>
-      <p:grpSp>
-        <p:nvGrpSpPr>
-          <p:cNvPr id="10" name="Group 9">
-            <a:extLst>
-              <a:ext uri="{FF2B5EF4-FFF2-40B4-BE49-F238E27FC236}">
-                <a16:creationId xmlns:a16="http://schemas.microsoft.com/office/drawing/2014/main" id="{4091D54B-59AB-4A5E-8E9E-0421BD66D4FB}"/>
-              </a:ext>
-              <a:ext uri="{C183D7F6-B498-43B3-948B-1728B52AA6E4}">
-                <adec:decorative xmlns:adec="http://schemas.microsoft.com/office/drawing/2017/decorative" val="1"/>
-              </a:ext>
-            </a:extLst>
-          </p:cNvPr>
-          <p:cNvGrpSpPr>
-            <a:grpSpLocks noGrp="1" noUngrp="1" noRot="1" noChangeAspect="1" noMove="1" noResize="1"/>
-          </p:cNvGrpSpPr>
-          <p:nvPr>
-            <p:extLst>
-              <p:ext uri="{386F3935-93C4-4BCD-93E2-E3B085C9AB24}">
-                <p16:designElem xmlns:p16="http://schemas.microsoft.com/office/powerpoint/2015/main" val="1"/>
-              </p:ext>
-            </p:extLst>
-          </p:nvPr>
-        </p:nvGrpSpPr>
-        <p:grpSpPr>
-          <a:xfrm>
-            <a:off x="0" y="0"/>
-            <a:ext cx="12192000" cy="6858000"/>
-            <a:chOff x="0" y="0"/>
-            <a:chExt cx="12192000" cy="6858000"/>
-          </a:xfrm>
-        </p:grpSpPr>
-        <p:sp>
-          <p:nvSpPr>
-            <p:cNvPr id="11" name="Rectangle 10">
-              <a:extLst>
-                <a:ext uri="{FF2B5EF4-FFF2-40B4-BE49-F238E27FC236}">
-                  <a16:creationId xmlns:a16="http://schemas.microsoft.com/office/drawing/2014/main" id="{547CE62E-FFFD-4A1F-BA78-C3B89C36FCA5}"/>
-                </a:ext>
-                <a:ext uri="{C183D7F6-B498-43B3-948B-1728B52AA6E4}">
-                  <adec:decorative xmlns:adec="http://schemas.microsoft.com/office/drawing/2017/decorative" val="1"/>
-                </a:ext>
-              </a:extLst>
-            </p:cNvPr>
-            <p:cNvSpPr/>
-            <p:nvPr>
-              <p:extLst>
-                <p:ext uri="{386F3935-93C4-4BCD-93E2-E3B085C9AB24}">
-                  <p16:designElem xmlns:p16="http://schemas.microsoft.com/office/powerpoint/2015/main" val="1"/>
-                </p:ext>
-              </p:extLst>
-            </p:nvPr>
-          </p:nvSpPr>
-          <p:spPr>
-            <a:xfrm>
-              <a:off x="0" y="0"/>
-              <a:ext cx="12192000" cy="6858000"/>
-            </a:xfrm>
-            <a:prstGeom prst="rect">
-              <a:avLst/>
-            </a:prstGeom>
-            <a:blipFill>
-              <a:blip r:embed="rId2">
-                <a:duotone>
-                  <a:schemeClr val="dk2">
-                    <a:shade val="69000"/>
-                    <a:hueMod val="91000"/>
-                    <a:satMod val="164000"/>
-                    <a:lumMod val="74000"/>
-                  </a:schemeClr>
-                  <a:schemeClr val="dk2">
-                    <a:hueMod val="124000"/>
-                    <a:satMod val="140000"/>
-                    <a:lumMod val="142000"/>
-                  </a:schemeClr>
-                </a:duotone>
-              </a:blip>
-              <a:stretch>
-                <a:fillRect/>
-              </a:stretch>
-            </a:blipFill>
-            <a:ln>
-              <a:noFill/>
-            </a:ln>
-          </p:spPr>
-          <p:style>
-            <a:lnRef idx="2">
-              <a:schemeClr val="accent1">
-                <a:shade val="50000"/>
-              </a:schemeClr>
-            </a:lnRef>
-            <a:fillRef idx="1">
-              <a:schemeClr val="accent1"/>
-            </a:fillRef>
-            <a:effectRef idx="0">
-              <a:schemeClr val="accent1"/>
-            </a:effectRef>
-            <a:fontRef idx="minor">
-              <a:schemeClr val="lt1"/>
-            </a:fontRef>
-          </p:style>
-        </p:sp>
-        <p:sp>
-          <p:nvSpPr>
-            <p:cNvPr id="12" name="Freeform 5">
-              <a:extLst>
-                <a:ext uri="{FF2B5EF4-FFF2-40B4-BE49-F238E27FC236}">
-                  <a16:creationId xmlns:a16="http://schemas.microsoft.com/office/drawing/2014/main" id="{AE51FD27-6B6A-4D21-BF22-245DA9BD0B3E}"/>
-                </a:ext>
-                <a:ext uri="{C183D7F6-B498-43B3-948B-1728B52AA6E4}">
-                  <adec:decorative xmlns:adec="http://schemas.microsoft.com/office/drawing/2017/decorative" val="1"/>
-                </a:ext>
-              </a:extLst>
-            </p:cNvPr>
-            <p:cNvSpPr>
-              <a:spLocks noEditPoints="1"/>
-            </p:cNvSpPr>
-            <p:nvPr>
-              <p:extLst>
-                <p:ext uri="{386F3935-93C4-4BCD-93E2-E3B085C9AB24}">
-                  <p16:designElem xmlns:p16="http://schemas.microsoft.com/office/powerpoint/2015/main" val="1"/>
-                </p:ext>
-              </p:extLst>
-            </p:nvPr>
-          </p:nvSpPr>
-          <p:spPr bwMode="gray">
-            <a:xfrm>
-              <a:off x="0" y="1587"/>
-              <a:ext cx="12192000" cy="6856413"/>
-            </a:xfrm>
-            <a:custGeom>
-              <a:avLst/>
-              <a:gdLst/>
-              <a:ahLst/>
-              <a:cxnLst/>
-              <a:rect l="0" t="0" r="r" b="b"/>
-              <a:pathLst>
-                <a:path w="15356" h="8638">
-                  <a:moveTo>
-                    <a:pt x="0" y="0"/>
-                  </a:moveTo>
-                  <a:lnTo>
-                    <a:pt x="0" y="8638"/>
-                  </a:lnTo>
-                  <a:lnTo>
-                    <a:pt x="15356" y="8638"/>
-                  </a:lnTo>
-                  <a:lnTo>
-                    <a:pt x="15356" y="0"/>
-                  </a:lnTo>
-                  <a:lnTo>
-                    <a:pt x="0" y="0"/>
-                  </a:lnTo>
-                  <a:close/>
-                  <a:moveTo>
-                    <a:pt x="14748" y="8038"/>
-                  </a:moveTo>
-                  <a:lnTo>
-                    <a:pt x="600" y="8038"/>
-                  </a:lnTo>
-                  <a:lnTo>
-                    <a:pt x="600" y="592"/>
-                  </a:lnTo>
-                  <a:lnTo>
-                    <a:pt x="14748" y="592"/>
-                  </a:lnTo>
-                  <a:lnTo>
-                    <a:pt x="14748" y="8038"/>
-                  </a:lnTo>
-                  <a:close/>
-                </a:path>
-              </a:pathLst>
-            </a:custGeom>
-            <a:solidFill>
-              <a:schemeClr val="bg1"/>
-            </a:solidFill>
-            <a:ln>
-              <a:noFill/>
-            </a:ln>
-          </p:spPr>
-        </p:sp>
-      </p:grpSp>
-      <p:sp>
-        <p:nvSpPr>
-          <p:cNvPr id="14" name="Rectangle 13">
-            <a:extLst>
-              <a:ext uri="{FF2B5EF4-FFF2-40B4-BE49-F238E27FC236}">
-                <a16:creationId xmlns:a16="http://schemas.microsoft.com/office/drawing/2014/main" id="{B8144315-1C5A-4185-A952-25D98D303D46}"/>
-              </a:ext>
-              <a:ext uri="{C183D7F6-B498-43B3-948B-1728B52AA6E4}">
-                <adec:decorative xmlns:adec="http://schemas.microsoft.com/office/drawing/2017/decorative" val="1"/>
-              </a:ext>
-            </a:extLst>
-          </p:cNvPr>
-          <p:cNvSpPr>
-            <a:spLocks noGrp="1" noRot="1" noChangeAspect="1" noMove="1" noResize="1" noEditPoints="1" noAdjustHandles="1" noChangeArrowheads="1" noChangeShapeType="1" noTextEdit="1"/>
-          </p:cNvSpPr>
-          <p:nvPr>
-            <p:extLst>
-              <p:ext uri="{386F3935-93C4-4BCD-93E2-E3B085C9AB24}">
-                <p16:designElem xmlns:p16="http://schemas.microsoft.com/office/powerpoint/2015/main" val="1"/>
-              </p:ext>
-            </p:extLst>
-          </p:nvPr>
-        </p:nvSpPr>
-        <p:spPr>
-          <a:xfrm>
-            <a:off x="10437812" y="0"/>
-            <a:ext cx="685800" cy="1143000"/>
-          </a:xfrm>
-          <a:prstGeom prst="rect">
-            <a:avLst/>
-          </a:prstGeom>
-          <a:solidFill>
-            <a:schemeClr val="accent1"/>
-          </a:solidFill>
-          <a:ln>
-            <a:noFill/>
-          </a:ln>
-        </p:spPr>
-        <p:style>
-          <a:lnRef idx="1">
-            <a:schemeClr val="accent1"/>
-          </a:lnRef>
-          <a:fillRef idx="3">
-            <a:schemeClr val="accent1"/>
-          </a:fillRef>
-          <a:effectRef idx="2">
-            <a:schemeClr val="accent1"/>
-          </a:effectRef>
-          <a:fontRef idx="minor">
-            <a:schemeClr val="lt1"/>
-          </a:fontRef>
-        </p:style>
-      </p:sp>
-      <p:sp>
-        <p:nvSpPr>
-          <p:cNvPr id="16" name="Freeform 5">
-            <a:extLst>
-              <a:ext uri="{FF2B5EF4-FFF2-40B4-BE49-F238E27FC236}">
-                <a16:creationId xmlns:a16="http://schemas.microsoft.com/office/drawing/2014/main" id="{4E212B76-74CB-461F-90A3-EF4F2397A883}"/>
-              </a:ext>
-              <a:ext uri="{C183D7F6-B498-43B3-948B-1728B52AA6E4}">
-                <adec:decorative xmlns:adec="http://schemas.microsoft.com/office/drawing/2017/decorative" val="1"/>
-              </a:ext>
-            </a:extLst>
-          </p:cNvPr>
-          <p:cNvSpPr>
-            <a:spLocks noGrp="1" noRot="1" noChangeAspect="1" noMove="1" noResize="1" noEditPoints="1" noAdjustHandles="1" noChangeArrowheads="1" noChangeShapeType="1" noTextEdit="1"/>
-          </p:cNvSpPr>
-          <p:nvPr>
-            <p:extLst>
-              <p:ext uri="{386F3935-93C4-4BCD-93E2-E3B085C9AB24}">
-                <p16:designElem xmlns:p16="http://schemas.microsoft.com/office/powerpoint/2015/main" val="1"/>
-              </p:ext>
-            </p:extLst>
-          </p:nvPr>
-        </p:nvSpPr>
-        <p:spPr bwMode="gray">
-          <a:xfrm>
-            <a:off x="0" y="1587"/>
-            <a:ext cx="12192000" cy="6856413"/>
-          </a:xfrm>
-          <a:custGeom>
-            <a:avLst/>
-            <a:gdLst/>
-            <a:ahLst/>
-            <a:cxnLst/>
-            <a:rect l="0" t="0" r="r" b="b"/>
-            <a:pathLst>
-              <a:path w="15356" h="8638">
-                <a:moveTo>
-                  <a:pt x="0" y="0"/>
-                </a:moveTo>
-                <a:lnTo>
-                  <a:pt x="0" y="8638"/>
-                </a:lnTo>
-                <a:lnTo>
-                  <a:pt x="15356" y="8638"/>
-                </a:lnTo>
-                <a:lnTo>
-                  <a:pt x="15356" y="0"/>
-                </a:lnTo>
-                <a:lnTo>
-                  <a:pt x="0" y="0"/>
-                </a:lnTo>
-                <a:close/>
-                <a:moveTo>
-                  <a:pt x="14748" y="8038"/>
-                </a:moveTo>
-                <a:lnTo>
-                  <a:pt x="600" y="8038"/>
-                </a:lnTo>
-                <a:lnTo>
-                  <a:pt x="600" y="592"/>
-                </a:lnTo>
-                <a:lnTo>
-                  <a:pt x="14748" y="592"/>
-                </a:lnTo>
-                <a:lnTo>
-                  <a:pt x="14748" y="8038"/>
-                </a:lnTo>
-                <a:close/>
-              </a:path>
-            </a:pathLst>
-          </a:custGeom>
-          <a:solidFill>
-            <a:schemeClr val="tx1"/>
-          </a:solidFill>
-          <a:ln>
-            <a:noFill/>
-          </a:ln>
-        </p:spPr>
-      </p:sp>
-      <p:sp>
-        <p:nvSpPr>
-          <p:cNvPr id="2" name="Title 1">
-            <a:extLst>
-              <a:ext uri="{FF2B5EF4-FFF2-40B4-BE49-F238E27FC236}">
-                <a16:creationId xmlns:a16="http://schemas.microsoft.com/office/drawing/2014/main" id="{F183CAE4-7C82-4E04-92ED-D9D59B768BFE}"/>
-              </a:ext>
-            </a:extLst>
-          </p:cNvPr>
-          <p:cNvSpPr>
-            <a:spLocks noGrp="1"/>
-          </p:cNvSpPr>
-          <p:nvPr>
-            <p:ph type="title"/>
-          </p:nvPr>
-        </p:nvSpPr>
-        <p:spPr>
-          <a:xfrm>
-            <a:off x="6744929" y="1241266"/>
-            <a:ext cx="4798142" cy="3153753"/>
-          </a:xfrm>
-        </p:spPr>
-        <p:txBody>
-          <a:bodyPr vert="horz" lIns="91440" tIns="45720" rIns="91440" bIns="45720" rtlCol="0" anchor="b">
-            <a:normAutofit/>
-          </a:bodyPr>
-          <a:lstStyle/>
-          <a:p>
-            <a:r>
-              <a:rPr lang="en-US" sz="5400" b="0" i="0" kern="1200">
-                <a:solidFill>
-                  <a:srgbClr val="EBEBEB"/>
-                </a:solidFill>
-                <a:latin typeface="+mj-lt"/>
-                <a:ea typeface="+mj-ea"/>
-                <a:cs typeface="+mj-cs"/>
-              </a:rPr>
-              <a:t>Worked on project …</a:t>
-            </a:r>
-          </a:p>
-        </p:txBody>
-      </p:sp>
-      <p:sp>
-        <p:nvSpPr>
-          <p:cNvPr id="18" name="Rectangle 17">
-            <a:extLst>
-              <a:ext uri="{FF2B5EF4-FFF2-40B4-BE49-F238E27FC236}">
-                <a16:creationId xmlns:a16="http://schemas.microsoft.com/office/drawing/2014/main" id="{81E746D0-4B37-4869-B2EF-79D5F0FFFBC9}"/>
-              </a:ext>
-              <a:ext uri="{C183D7F6-B498-43B3-948B-1728B52AA6E4}">
-                <adec:decorative xmlns:adec="http://schemas.microsoft.com/office/drawing/2017/decorative" val="1"/>
-              </a:ext>
-            </a:extLst>
-          </p:cNvPr>
-          <p:cNvSpPr>
-            <a:spLocks noGrp="1" noRot="1" noChangeAspect="1" noMove="1" noResize="1" noEditPoints="1" noAdjustHandles="1" noChangeArrowheads="1" noChangeShapeType="1" noTextEdit="1"/>
-          </p:cNvSpPr>
-          <p:nvPr>
-            <p:extLst>
-              <p:ext uri="{386F3935-93C4-4BCD-93E2-E3B085C9AB24}">
-                <p16:designElem xmlns:p16="http://schemas.microsoft.com/office/powerpoint/2015/main" val="1"/>
-              </p:ext>
-            </p:extLst>
-          </p:nvPr>
-        </p:nvSpPr>
-        <p:spPr>
-          <a:xfrm>
-            <a:off x="10437812" y="0"/>
-            <a:ext cx="685800" cy="1143000"/>
-          </a:xfrm>
-          <a:prstGeom prst="rect">
-            <a:avLst/>
-          </a:prstGeom>
-          <a:solidFill>
-            <a:schemeClr val="accent1"/>
-          </a:solidFill>
-          <a:ln>
-            <a:noFill/>
-          </a:ln>
-        </p:spPr>
-        <p:style>
-          <a:lnRef idx="1">
-            <a:schemeClr val="accent1"/>
-          </a:lnRef>
-          <a:fillRef idx="3">
-            <a:schemeClr val="accent1"/>
-          </a:fillRef>
-          <a:effectRef idx="2">
-            <a:schemeClr val="accent1"/>
-          </a:effectRef>
-          <a:fontRef idx="minor">
-            <a:schemeClr val="lt1"/>
-          </a:fontRef>
-        </p:style>
-      </p:sp>
-      <p:pic>
-        <p:nvPicPr>
-          <p:cNvPr id="7" name="Graphic 6" descr="Tools">
-            <a:extLst>
-              <a:ext uri="{FF2B5EF4-FFF2-40B4-BE49-F238E27FC236}">
-                <a16:creationId xmlns:a16="http://schemas.microsoft.com/office/drawing/2014/main" id="{F2F511E8-9942-4DAA-8B7D-84884A062AF4}"/>
-              </a:ext>
-            </a:extLst>
-          </p:cNvPr>
-          <p:cNvPicPr>
-            <a:picLocks noChangeAspect="1"/>
-          </p:cNvPicPr>
-          <p:nvPr/>
-        </p:nvPicPr>
-        <p:blipFill>
-          <a:blip r:embed="rId3">
-            <a:extLst>
-              <a:ext uri="{28A0092B-C50C-407E-A947-70E740481C1C}">
-                <a14:useLocalDpi xmlns:a14="http://schemas.microsoft.com/office/drawing/2010/main" val="0"/>
-              </a:ext>
-              <a:ext uri="{96DAC541-7B7A-43D3-8B79-37D633B846F1}">
-                <asvg:svgBlip xmlns:asvg="http://schemas.microsoft.com/office/drawing/2016/SVG/main" r:embed="rId4"/>
-              </a:ext>
-            </a:extLst>
-          </a:blip>
-          <a:stretch>
-            <a:fillRect/>
-          </a:stretch>
-        </p:blipFill>
-        <p:spPr>
-          <a:xfrm>
-            <a:off x="1288503" y="1113063"/>
-            <a:ext cx="4628758" cy="4628758"/>
-          </a:xfrm>
-          <a:prstGeom prst="roundRect">
-            <a:avLst>
-              <a:gd name="adj" fmla="val 1858"/>
-            </a:avLst>
-          </a:prstGeom>
-          <a:effectLst>
-            <a:outerShdw blurRad="50800" dist="50800" dir="5400000" algn="tl" rotWithShape="0">
-              <a:srgbClr val="000000">
-                <a:alpha val="43000"/>
-              </a:srgbClr>
-            </a:outerShdw>
-          </a:effectLst>
-        </p:spPr>
-      </p:pic>
-    </p:spTree>
-    <p:extLst>
-      <p:ext uri="{BB962C8B-B14F-4D97-AF65-F5344CB8AC3E}">
-        <p14:creationId xmlns:p14="http://schemas.microsoft.com/office/powerpoint/2010/main" val="1234941119"/>
       </p:ext>
     </p:extLst>
   </p:cSld>

</xml_diff>

<commit_message>
added and changed slides
</commit_message>
<xml_diff>
--- a/Research Methods in Computing Presentation.pptx
+++ b/Research Methods in Computing Presentation.pptx
@@ -10,6 +10,7 @@
     <p:sldId id="260" r:id="rId4"/>
     <p:sldId id="258" r:id="rId5"/>
     <p:sldId id="259" r:id="rId6"/>
+    <p:sldId id="261" r:id="rId7"/>
   </p:sldIdLst>
   <p:sldSz cx="12192000" cy="6858000"/>
   <p:notesSz cx="6858000" cy="9144000"/>
@@ -451,7 +452,7 @@
           <a:p>
             <a:fld id="{990B45B9-6F7B-4A1C-ABF2-9469D9125292}" type="datetimeFigureOut">
               <a:rPr lang="en-GB" smtClean="0"/>
-              <a:t>03/12/2020</a:t>
+              <a:t>05/12/2020</a:t>
             </a:fld>
             <a:endParaRPr lang="en-GB"/>
           </a:p>
@@ -1539,7 +1540,7 @@
           <a:p>
             <a:fld id="{990B45B9-6F7B-4A1C-ABF2-9469D9125292}" type="datetimeFigureOut">
               <a:rPr lang="en-GB" smtClean="0"/>
-              <a:t>03/12/2020</a:t>
+              <a:t>05/12/2020</a:t>
             </a:fld>
             <a:endParaRPr lang="en-GB"/>
           </a:p>
@@ -2519,7 +2520,7 @@
           <a:p>
             <a:fld id="{990B45B9-6F7B-4A1C-ABF2-9469D9125292}" type="datetimeFigureOut">
               <a:rPr lang="en-GB" smtClean="0"/>
-              <a:t>03/12/2020</a:t>
+              <a:t>05/12/2020</a:t>
             </a:fld>
             <a:endParaRPr lang="en-GB"/>
           </a:p>
@@ -3653,7 +3654,7 @@
           <a:p>
             <a:fld id="{990B45B9-6F7B-4A1C-ABF2-9469D9125292}" type="datetimeFigureOut">
               <a:rPr lang="en-GB" smtClean="0"/>
-              <a:t>03/12/2020</a:t>
+              <a:t>05/12/2020</a:t>
             </a:fld>
             <a:endParaRPr lang="en-GB"/>
           </a:p>
@@ -4686,7 +4687,7 @@
           <a:p>
             <a:fld id="{990B45B9-6F7B-4A1C-ABF2-9469D9125292}" type="datetimeFigureOut">
               <a:rPr lang="en-GB" smtClean="0"/>
-              <a:t>03/12/2020</a:t>
+              <a:t>05/12/2020</a:t>
             </a:fld>
             <a:endParaRPr lang="en-GB"/>
           </a:p>
@@ -5346,7 +5347,7 @@
           <a:p>
             <a:fld id="{990B45B9-6F7B-4A1C-ABF2-9469D9125292}" type="datetimeFigureOut">
               <a:rPr lang="en-GB" smtClean="0"/>
-              <a:t>03/12/2020</a:t>
+              <a:t>05/12/2020</a:t>
             </a:fld>
             <a:endParaRPr lang="en-GB"/>
           </a:p>
@@ -6207,7 +6208,7 @@
           <a:p>
             <a:fld id="{990B45B9-6F7B-4A1C-ABF2-9469D9125292}" type="datetimeFigureOut">
               <a:rPr lang="en-GB" smtClean="0"/>
-              <a:t>03/12/2020</a:t>
+              <a:t>05/12/2020</a:t>
             </a:fld>
             <a:endParaRPr lang="en-GB"/>
           </a:p>
@@ -6397,7 +6398,7 @@
           <a:p>
             <a:fld id="{990B45B9-6F7B-4A1C-ABF2-9469D9125292}" type="datetimeFigureOut">
               <a:rPr lang="en-GB" smtClean="0"/>
-              <a:t>03/12/2020</a:t>
+              <a:t>05/12/2020</a:t>
             </a:fld>
             <a:endParaRPr lang="en-GB"/>
           </a:p>
@@ -7369,7 +7370,7 @@
           <a:p>
             <a:fld id="{990B45B9-6F7B-4A1C-ABF2-9469D9125292}" type="datetimeFigureOut">
               <a:rPr lang="en-GB" smtClean="0"/>
-              <a:t>03/12/2020</a:t>
+              <a:t>05/12/2020</a:t>
             </a:fld>
             <a:endParaRPr lang="en-GB"/>
           </a:p>
@@ -7580,7 +7581,7 @@
           <a:p>
             <a:fld id="{990B45B9-6F7B-4A1C-ABF2-9469D9125292}" type="datetimeFigureOut">
               <a:rPr lang="en-GB" smtClean="0"/>
-              <a:t>03/12/2020</a:t>
+              <a:t>05/12/2020</a:t>
             </a:fld>
             <a:endParaRPr lang="en-GB"/>
           </a:p>
@@ -8614,7 +8615,7 @@
           <a:p>
             <a:fld id="{990B45B9-6F7B-4A1C-ABF2-9469D9125292}" type="datetimeFigureOut">
               <a:rPr lang="en-GB" smtClean="0"/>
-              <a:t>03/12/2020</a:t>
+              <a:t>05/12/2020</a:t>
             </a:fld>
             <a:endParaRPr lang="en-GB"/>
           </a:p>
@@ -8886,7 +8887,7 @@
           <a:p>
             <a:fld id="{990B45B9-6F7B-4A1C-ABF2-9469D9125292}" type="datetimeFigureOut">
               <a:rPr lang="en-GB" smtClean="0"/>
-              <a:t>03/12/2020</a:t>
+              <a:t>05/12/2020</a:t>
             </a:fld>
             <a:endParaRPr lang="en-GB"/>
           </a:p>
@@ -9296,7 +9297,7 @@
           <a:p>
             <a:fld id="{990B45B9-6F7B-4A1C-ABF2-9469D9125292}" type="datetimeFigureOut">
               <a:rPr lang="en-GB" smtClean="0"/>
-              <a:t>03/12/2020</a:t>
+              <a:t>05/12/2020</a:t>
             </a:fld>
             <a:endParaRPr lang="en-GB"/>
           </a:p>
@@ -9423,7 +9424,7 @@
           <a:p>
             <a:fld id="{990B45B9-6F7B-4A1C-ABF2-9469D9125292}" type="datetimeFigureOut">
               <a:rPr lang="en-GB" smtClean="0"/>
-              <a:t>03/12/2020</a:t>
+              <a:t>05/12/2020</a:t>
             </a:fld>
             <a:endParaRPr lang="en-GB"/>
           </a:p>
@@ -9518,7 +9519,7 @@
           <a:p>
             <a:fld id="{990B45B9-6F7B-4A1C-ABF2-9469D9125292}" type="datetimeFigureOut">
               <a:rPr lang="en-GB" smtClean="0"/>
-              <a:t>03/12/2020</a:t>
+              <a:t>05/12/2020</a:t>
             </a:fld>
             <a:endParaRPr lang="en-GB"/>
           </a:p>
@@ -10599,7 +10600,7 @@
           <a:p>
             <a:fld id="{990B45B9-6F7B-4A1C-ABF2-9469D9125292}" type="datetimeFigureOut">
               <a:rPr lang="en-GB" smtClean="0"/>
-              <a:t>03/12/2020</a:t>
+              <a:t>05/12/2020</a:t>
             </a:fld>
             <a:endParaRPr lang="en-GB"/>
           </a:p>
@@ -11707,7 +11708,7 @@
           <a:p>
             <a:fld id="{990B45B9-6F7B-4A1C-ABF2-9469D9125292}" type="datetimeFigureOut">
               <a:rPr lang="en-GB" smtClean="0"/>
-              <a:t>03/12/2020</a:t>
+              <a:t>05/12/2020</a:t>
             </a:fld>
             <a:endParaRPr lang="en-GB"/>
           </a:p>
@@ -12704,7 +12705,7 @@
           <a:p>
             <a:fld id="{990B45B9-6F7B-4A1C-ABF2-9469D9125292}" type="datetimeFigureOut">
               <a:rPr lang="en-GB" smtClean="0"/>
-              <a:t>03/12/2020</a:t>
+              <a:t>05/12/2020</a:t>
             </a:fld>
             <a:endParaRPr lang="en-GB"/>
           </a:p>
@@ -14761,15 +14762,6 @@
               <a:srgbClr val="C0C0C0"/>
             </a:contourClr>
           </a:sp3d>
-          <a:extLst>
-            <a:ext uri="{909E8E84-426E-40DD-AFC4-6F175D3DCCD1}">
-              <a14:hiddenFill xmlns:a14="http://schemas.microsoft.com/office/drawing/2010/main">
-                <a:solidFill>
-                  <a:srgbClr val="FFFFFF"/>
-                </a:solidFill>
-              </a14:hiddenFill>
-            </a:ext>
-          </a:extLst>
         </p:spPr>
       </p:pic>
       <p:pic>
@@ -14833,15 +14825,6 @@
               <a:srgbClr val="C0C0C0"/>
             </a:contourClr>
           </a:sp3d>
-          <a:extLst>
-            <a:ext uri="{909E8E84-426E-40DD-AFC4-6F175D3DCCD1}">
-              <a14:hiddenFill xmlns:a14="http://schemas.microsoft.com/office/drawing/2010/main">
-                <a:solidFill>
-                  <a:srgbClr val="FFFFFF"/>
-                </a:solidFill>
-              </a14:hiddenFill>
-            </a:ext>
-          </a:extLst>
         </p:spPr>
       </p:pic>
     </p:spTree>
@@ -15219,7 +15202,7 @@
         </p:spPr>
         <p:txBody>
           <a:bodyPr vert="horz" lIns="91440" tIns="45720" rIns="91440" bIns="45720" rtlCol="0" anchor="b">
-            <a:normAutofit/>
+            <a:normAutofit fontScale="90000"/>
           </a:bodyPr>
           <a:lstStyle/>
           <a:p>
@@ -15236,19 +15219,16 @@
                   <a:srgbClr val="EBEBEB"/>
                 </a:solidFill>
               </a:rPr>
-              <a:t>Their hard work</a:t>
+              <a:t>Their hard work achievements</a:t>
             </a:r>
-            <a:r>
-              <a:rPr lang="en-US" sz="5400" b="0" i="0" kern="1200" dirty="0">
-                <a:solidFill>
-                  <a:srgbClr val="EBEBEB"/>
-                </a:solidFill>
-                <a:latin typeface="+mj-lt"/>
-                <a:ea typeface="+mj-ea"/>
-                <a:cs typeface="+mj-cs"/>
-              </a:rPr>
-              <a:t> …</a:t>
-            </a:r>
+            <a:endParaRPr lang="en-US" sz="5400" b="0" i="0" kern="1200" dirty="0">
+              <a:solidFill>
+                <a:srgbClr val="EBEBEB"/>
+              </a:solidFill>
+              <a:latin typeface="+mj-lt"/>
+              <a:ea typeface="+mj-ea"/>
+              <a:cs typeface="+mj-cs"/>
+            </a:endParaRPr>
           </a:p>
         </p:txBody>
       </p:sp>
@@ -15808,8 +15788,8 @@
         </p:nvSpPr>
         <p:spPr>
           <a:xfrm>
-            <a:off x="1167208" y="3501598"/>
-            <a:ext cx="6762642" cy="611061"/>
+            <a:off x="788339" y="1585540"/>
+            <a:ext cx="4839256" cy="2998694"/>
           </a:xfrm>
         </p:spPr>
         <p:txBody>
@@ -15827,7 +15807,7 @@
                 <a:ea typeface="+mj-ea"/>
                 <a:cs typeface="+mj-cs"/>
               </a:rPr>
-              <a:t>The Turing award winners Timeline ..</a:t>
+              <a:t>The Turing award winners Timeline </a:t>
             </a:r>
           </a:p>
         </p:txBody>
@@ -15916,8 +15896,8 @@
         </p:blipFill>
         <p:spPr>
           <a:xfrm>
-            <a:off x="3020123" y="802695"/>
-            <a:ext cx="1804321" cy="1804321"/>
+            <a:off x="-1912169" y="-1225661"/>
+            <a:ext cx="1179340" cy="1179340"/>
           </a:xfrm>
           <a:prstGeom prst="roundRect">
             <a:avLst>
@@ -15962,7 +15942,7 @@
         </p:blipFill>
         <p:spPr bwMode="auto">
           <a:xfrm>
-            <a:off x="7469578" y="2262249"/>
+            <a:off x="6202123" y="1943373"/>
             <a:ext cx="3956341" cy="3700821"/>
           </a:xfrm>
           <a:prstGeom prst="rect">
@@ -15978,6 +15958,69 @@
               </a:srgbClr>
             </a:outerShdw>
           </a:effectLst>
+          <a:extLst>
+            <a:ext uri="{909E8E84-426E-40DD-AFC4-6F175D3DCCD1}">
+              <a14:hiddenFill xmlns:a14="http://schemas.microsoft.com/office/drawing/2010/main">
+                <a:solidFill>
+                  <a:srgbClr val="FFFFFF"/>
+                </a:solidFill>
+              </a14:hiddenFill>
+            </a:ext>
+          </a:extLst>
+        </p:spPr>
+      </p:pic>
+      <p:pic>
+        <p:nvPicPr>
+          <p:cNvPr id="2054" name="Picture 6" descr="Timeline logo - The Aleppo Project">
+            <a:extLst>
+              <a:ext uri="{FF2B5EF4-FFF2-40B4-BE49-F238E27FC236}">
+                <a16:creationId xmlns:a16="http://schemas.microsoft.com/office/drawing/2014/main" id="{7E10271D-1EFF-4D9D-B4E8-817F101D3A5A}"/>
+              </a:ext>
+            </a:extLst>
+          </p:cNvPr>
+          <p:cNvPicPr>
+            <a:picLocks noChangeAspect="1" noChangeArrowheads="1"/>
+          </p:cNvPicPr>
+          <p:nvPr/>
+        </p:nvPicPr>
+        <p:blipFill>
+          <a:blip r:embed="rId6">
+            <a:extLst>
+              <a:ext uri="{28A0092B-C50C-407E-A947-70E740481C1C}">
+                <a14:useLocalDpi xmlns:a14="http://schemas.microsoft.com/office/drawing/2010/main" val="0"/>
+              </a:ext>
+            </a:extLst>
+          </a:blip>
+          <a:srcRect/>
+          <a:stretch>
+            <a:fillRect/>
+          </a:stretch>
+        </p:blipFill>
+        <p:spPr bwMode="auto">
+          <a:xfrm>
+            <a:off x="593887" y="694952"/>
+            <a:ext cx="2162760" cy="769564"/>
+          </a:xfrm>
+          <a:prstGeom prst="rect">
+            <a:avLst/>
+          </a:prstGeom>
+          <a:ln>
+            <a:noFill/>
+          </a:ln>
+          <a:effectLst>
+            <a:reflection blurRad="12700" stA="30000" endPos="30000" dist="5000" dir="5400000" sy="-100000" algn="bl" rotWithShape="0"/>
+          </a:effectLst>
+          <a:scene3d>
+            <a:camera prst="perspectiveContrastingLeftFacing">
+              <a:rot lat="300000" lon="19800000" rev="0"/>
+            </a:camera>
+            <a:lightRig rig="threePt" dir="t">
+              <a:rot lat="0" lon="0" rev="2700000"/>
+            </a:lightRig>
+          </a:scene3d>
+          <a:sp3d>
+            <a:bevelT w="63500" h="50800"/>
+          </a:sp3d>
           <a:extLst>
             <a:ext uri="{909E8E84-426E-40DD-AFC4-6F175D3DCCD1}">
               <a14:hiddenFill xmlns:a14="http://schemas.microsoft.com/office/drawing/2010/main">
@@ -16088,7 +16131,7 @@
               <a:avLst/>
             </a:prstGeom>
             <a:blipFill>
-              <a:blip r:embed="rId2">
+              <a:blip r:embed="rId4">
                 <a:duotone>
                   <a:schemeClr val="dk2">
                     <a:shade val="69000"/>
@@ -16463,7 +16506,7 @@
         </p:nvSpPr>
         <p:spPr>
           <a:xfrm>
-            <a:off x="2602876" y="-355041"/>
+            <a:off x="2509390" y="-1341062"/>
             <a:ext cx="6268246" cy="3134032"/>
           </a:xfrm>
         </p:spPr>
@@ -16482,7 +16525,7 @@
                 <a:ea typeface="+mj-ea"/>
                 <a:cs typeface="+mj-cs"/>
               </a:rPr>
-              <a:t>Their current jobs ..</a:t>
+              <a:t>AI EXAMPLE</a:t>
             </a:r>
           </a:p>
         </p:txBody>
@@ -16502,13 +16545,13 @@
           <p:nvPr/>
         </p:nvPicPr>
         <p:blipFill>
-          <a:blip r:embed="rId3">
+          <a:blip r:embed="rId5">
             <a:extLst>
               <a:ext uri="{28A0092B-C50C-407E-A947-70E740481C1C}">
                 <a14:useLocalDpi xmlns:a14="http://schemas.microsoft.com/office/drawing/2010/main" val="0"/>
               </a:ext>
               <a:ext uri="{96DAC541-7B7A-43D3-8B79-37D633B846F1}">
-                <asvg:svgBlip xmlns:asvg="http://schemas.microsoft.com/office/drawing/2016/SVG/main" r:embed="rId4"/>
+                <asvg:svgBlip xmlns:asvg="http://schemas.microsoft.com/office/drawing/2016/SVG/main" r:embed="rId6"/>
               </a:ext>
             </a:extLst>
           </a:blip>
@@ -16518,8 +16561,8 @@
         </p:blipFill>
         <p:spPr>
           <a:xfrm>
-            <a:off x="477753" y="571500"/>
-            <a:ext cx="2523732" cy="2523732"/>
+            <a:off x="50462" y="450320"/>
+            <a:ext cx="3134031" cy="3134031"/>
           </a:xfrm>
           <a:prstGeom prst="roundRect">
             <a:avLst>
@@ -16535,137 +16578,1286 @@
           </a:effectLst>
         </p:spPr>
       </p:pic>
-      <p:sp>
-        <p:nvSpPr>
-          <p:cNvPr id="3" name="TextBox 2">
+      <p:pic>
+        <p:nvPicPr>
+          <p:cNvPr id="4" name="AI EXAMPLE">
+            <a:hlinkClick r:id="" action="ppaction://media"/>
             <a:extLst>
               <a:ext uri="{FF2B5EF4-FFF2-40B4-BE49-F238E27FC236}">
-                <a16:creationId xmlns:a16="http://schemas.microsoft.com/office/drawing/2014/main" id="{EE9DF9C2-649E-44C4-9165-B4AF0C7A9034}"/>
+                <a16:creationId xmlns:a16="http://schemas.microsoft.com/office/drawing/2014/main" id="{224EC0EA-8E49-4346-895F-89B8AA369EDF}"/>
               </a:ext>
             </a:extLst>
           </p:cNvPr>
-          <p:cNvSpPr txBox="1"/>
-          <p:nvPr/>
+          <p:cNvPicPr>
+            <a:picLocks noChangeAspect="1"/>
+          </p:cNvPicPr>
+          <p:nvPr>
+            <a:videoFile r:link="rId2"/>
+            <p:extLst>
+              <p:ext uri="{DAA4B4D4-6D71-4841-9C94-3DE7FCFB9230}">
+                <p14:media xmlns:p14="http://schemas.microsoft.com/office/powerpoint/2010/main" r:embed="rId1"/>
+              </p:ext>
+            </p:extLst>
+          </p:nvPr>
+        </p:nvPicPr>
+        <p:blipFill>
+          <a:blip r:embed="rId7"/>
+          <a:stretch>
+            <a:fillRect/>
+          </a:stretch>
+        </p:blipFill>
+        <p:spPr>
+          <a:xfrm>
+            <a:off x="3440785" y="1774114"/>
+            <a:ext cx="7328946" cy="4122532"/>
+          </a:xfrm>
+          <a:prstGeom prst="rect">
+            <a:avLst/>
+          </a:prstGeom>
+          <a:ln w="38100" cap="sq">
+            <a:solidFill>
+              <a:srgbClr val="000000"/>
+            </a:solidFill>
+            <a:prstDash val="solid"/>
+            <a:miter lim="800000"/>
+          </a:ln>
+          <a:effectLst>
+            <a:outerShdw blurRad="50800" dist="38100" dir="2700000" algn="tl" rotWithShape="0">
+              <a:srgbClr val="000000">
+                <a:alpha val="43000"/>
+              </a:srgbClr>
+            </a:outerShdw>
+          </a:effectLst>
+        </p:spPr>
+      </p:pic>
+    </p:spTree>
+    <p:extLst>
+      <p:ext uri="{BB962C8B-B14F-4D97-AF65-F5344CB8AC3E}">
+        <p14:creationId xmlns:p14="http://schemas.microsoft.com/office/powerpoint/2010/main" val="1008068401"/>
+      </p:ext>
+    </p:extLst>
+  </p:cSld>
+  <p:clrMapOvr>
+    <a:overrideClrMapping bg1="dk1" tx1="lt1" bg2="dk2" tx2="lt2" accent1="accent1" accent2="accent2" accent3="accent3" accent4="accent4" accent5="accent5" accent6="accent6" hlink="hlink" folHlink="folHlink"/>
+  </p:clrMapOvr>
+  <p:timing>
+    <p:tnLst>
+      <p:par>
+        <p:cTn id="1" dur="indefinite" restart="never" nodeType="tmRoot">
+          <p:childTnLst>
+            <p:seq concurrent="1" nextAc="seek">
+              <p:cTn id="2" dur="indefinite" nodeType="mainSeq">
+                <p:childTnLst>
+                  <p:par>
+                    <p:cTn id="3" fill="hold">
+                      <p:stCondLst>
+                        <p:cond delay="indefinite"/>
+                      </p:stCondLst>
+                      <p:childTnLst>
+                        <p:par>
+                          <p:cTn id="4" fill="hold">
+                            <p:stCondLst>
+                              <p:cond delay="0"/>
+                            </p:stCondLst>
+                            <p:childTnLst>
+                              <p:par>
+                                <p:cTn id="5" presetID="1" presetClass="mediacall" presetSubtype="0" fill="hold" nodeType="clickEffect">
+                                  <p:stCondLst>
+                                    <p:cond delay="0"/>
+                                  </p:stCondLst>
+                                  <p:childTnLst>
+                                    <p:cmd type="call" cmd="playFrom(0.0)">
+                                      <p:cBhvr>
+                                        <p:cTn id="6" dur="39551" fill="hold"/>
+                                        <p:tgtEl>
+                                          <p:spTgt spid="4"/>
+                                        </p:tgtEl>
+                                      </p:cBhvr>
+                                    </p:cmd>
+                                  </p:childTnLst>
+                                </p:cTn>
+                              </p:par>
+                            </p:childTnLst>
+                          </p:cTn>
+                        </p:par>
+                      </p:childTnLst>
+                    </p:cTn>
+                  </p:par>
+                </p:childTnLst>
+              </p:cTn>
+              <p:prevCondLst>
+                <p:cond evt="onPrev" delay="0">
+                  <p:tgtEl>
+                    <p:sldTgt/>
+                  </p:tgtEl>
+                </p:cond>
+              </p:prevCondLst>
+              <p:nextCondLst>
+                <p:cond evt="onNext" delay="0">
+                  <p:tgtEl>
+                    <p:sldTgt/>
+                  </p:tgtEl>
+                </p:cond>
+              </p:nextCondLst>
+            </p:seq>
+            <p:video>
+              <p:cMediaNode vol="80000">
+                <p:cTn id="7" fill="hold" display="0">
+                  <p:stCondLst>
+                    <p:cond delay="indefinite"/>
+                  </p:stCondLst>
+                </p:cTn>
+                <p:tgtEl>
+                  <p:spTgt spid="4"/>
+                </p:tgtEl>
+              </p:cMediaNode>
+            </p:video>
+            <p:seq concurrent="1" nextAc="seek">
+              <p:cTn id="8" restart="whenNotActive" fill="hold" evtFilter="cancelBubble" nodeType="interactiveSeq">
+                <p:stCondLst>
+                  <p:cond evt="onClick" delay="0">
+                    <p:tgtEl>
+                      <p:spTgt spid="4"/>
+                    </p:tgtEl>
+                  </p:cond>
+                </p:stCondLst>
+                <p:endSync evt="end" delay="0">
+                  <p:rtn val="all"/>
+                </p:endSync>
+                <p:childTnLst>
+                  <p:par>
+                    <p:cTn id="9" fill="hold">
+                      <p:stCondLst>
+                        <p:cond delay="0"/>
+                      </p:stCondLst>
+                      <p:childTnLst>
+                        <p:par>
+                          <p:cTn id="10" fill="hold">
+                            <p:stCondLst>
+                              <p:cond delay="0"/>
+                            </p:stCondLst>
+                            <p:childTnLst>
+                              <p:par>
+                                <p:cTn id="11" presetID="2" presetClass="mediacall" presetSubtype="0" fill="hold" nodeType="clickEffect">
+                                  <p:stCondLst>
+                                    <p:cond delay="0"/>
+                                  </p:stCondLst>
+                                  <p:childTnLst>
+                                    <p:cmd type="call" cmd="togglePause">
+                                      <p:cBhvr>
+                                        <p:cTn id="12" dur="1" fill="hold"/>
+                                        <p:tgtEl>
+                                          <p:spTgt spid="4"/>
+                                        </p:tgtEl>
+                                      </p:cBhvr>
+                                    </p:cmd>
+                                  </p:childTnLst>
+                                </p:cTn>
+                              </p:par>
+                            </p:childTnLst>
+                          </p:cTn>
+                        </p:par>
+                      </p:childTnLst>
+                    </p:cTn>
+                  </p:par>
+                </p:childTnLst>
+              </p:cTn>
+              <p:nextCondLst>
+                <p:cond evt="onClick" delay="0">
+                  <p:tgtEl>
+                    <p:spTgt spid="4"/>
+                  </p:tgtEl>
+                </p:cond>
+              </p:nextCondLst>
+            </p:seq>
+          </p:childTnLst>
+        </p:cTn>
+      </p:par>
+    </p:tnLst>
+  </p:timing>
+</p:sld>
+</file>
+
+<file path=ppt/slides/slide6.xml><?xml version="1.0" encoding="utf-8"?>
+<p:sld xmlns:a="http://schemas.openxmlformats.org/drawingml/2006/main" xmlns:r="http://schemas.openxmlformats.org/officeDocument/2006/relationships" xmlns:p="http://schemas.openxmlformats.org/presentationml/2006/main">
+  <p:cSld>
+    <p:bg>
+      <p:bgPr>
+        <a:solidFill>
+          <a:schemeClr val="bg1"/>
+        </a:solidFill>
+        <a:effectLst/>
+      </p:bgPr>
+    </p:bg>
+    <p:spTree>
+      <p:nvGrpSpPr>
+        <p:cNvPr id="1" name=""/>
+        <p:cNvGrpSpPr/>
+        <p:nvPr/>
+      </p:nvGrpSpPr>
+      <p:grpSpPr>
+        <a:xfrm>
+          <a:off x="0" y="0"/>
+          <a:ext cx="0" cy="0"/>
+          <a:chOff x="0" y="0"/>
+          <a:chExt cx="0" cy="0"/>
+        </a:xfrm>
+      </p:grpSpPr>
+      <p:sp>
+        <p:nvSpPr>
+          <p:cNvPr id="9" name="Rectangle 8">
+            <a:extLst>
+              <a:ext uri="{FF2B5EF4-FFF2-40B4-BE49-F238E27FC236}">
+                <a16:creationId xmlns:a16="http://schemas.microsoft.com/office/drawing/2014/main" id="{38ABDB68-E3D5-448E-97D3-06FFEF680193}"/>
+              </a:ext>
+              <a:ext uri="{C183D7F6-B498-43B3-948B-1728B52AA6E4}">
+                <adec:decorative xmlns:adec="http://schemas.microsoft.com/office/drawing/2017/decorative" val="1"/>
+              </a:ext>
+            </a:extLst>
+          </p:cNvPr>
+          <p:cNvSpPr>
+            <a:spLocks noGrp="1" noRot="1" noChangeAspect="1" noMove="1" noResize="1" noEditPoints="1" noAdjustHandles="1" noChangeArrowheads="1" noChangeShapeType="1" noTextEdit="1"/>
+          </p:cNvSpPr>
+          <p:nvPr>
+            <p:extLst>
+              <p:ext uri="{386F3935-93C4-4BCD-93E2-E3B085C9AB24}">
+                <p16:designElem xmlns:p16="http://schemas.microsoft.com/office/powerpoint/2015/main" val="1"/>
+              </p:ext>
+            </p:extLst>
+          </p:nvPr>
         </p:nvSpPr>
         <p:spPr>
           <a:xfrm>
-            <a:off x="2422566" y="3095232"/>
-            <a:ext cx="5967351" cy="2862322"/>
+            <a:off x="0" y="0"/>
+            <a:ext cx="12192000" cy="6858000"/>
+          </a:xfrm>
+          <a:prstGeom prst="rect">
+            <a:avLst/>
+          </a:prstGeom>
+          <a:ln>
+            <a:noFill/>
+          </a:ln>
+        </p:spPr>
+        <p:style>
+          <a:lnRef idx="2">
+            <a:schemeClr val="accent1">
+              <a:shade val="50000"/>
+            </a:schemeClr>
+          </a:lnRef>
+          <a:fillRef idx="1003">
+            <a:schemeClr val="dk2"/>
+          </a:fillRef>
+          <a:effectRef idx="0">
+            <a:schemeClr val="accent1"/>
+          </a:effectRef>
+          <a:fontRef idx="minor">
+            <a:schemeClr val="lt1"/>
+          </a:fontRef>
+        </p:style>
+      </p:sp>
+      <p:sp>
+        <p:nvSpPr>
+          <p:cNvPr id="11" name="Freeform 5">
+            <a:extLst>
+              <a:ext uri="{FF2B5EF4-FFF2-40B4-BE49-F238E27FC236}">
+                <a16:creationId xmlns:a16="http://schemas.microsoft.com/office/drawing/2014/main" id="{B8DD7FEB-D9F3-4F5B-982C-36B0664D0205}"/>
+              </a:ext>
+              <a:ext uri="{C183D7F6-B498-43B3-948B-1728B52AA6E4}">
+                <adec:decorative xmlns:adec="http://schemas.microsoft.com/office/drawing/2017/decorative" val="1"/>
+              </a:ext>
+            </a:extLst>
+          </p:cNvPr>
+          <p:cNvSpPr>
+            <a:spLocks noGrp="1" noRot="1" noChangeAspect="1" noMove="1" noResize="1" noEditPoints="1" noAdjustHandles="1" noChangeArrowheads="1" noChangeShapeType="1" noTextEdit="1"/>
+          </p:cNvSpPr>
+          <p:nvPr>
+            <p:extLst>
+              <p:ext uri="{386F3935-93C4-4BCD-93E2-E3B085C9AB24}">
+                <p16:designElem xmlns:p16="http://schemas.microsoft.com/office/powerpoint/2015/main" val="1"/>
+              </p:ext>
+            </p:extLst>
+          </p:nvPr>
+        </p:nvSpPr>
+        <p:spPr bwMode="gray">
+          <a:xfrm rot="15922489">
+            <a:off x="5376762" y="1826078"/>
+            <a:ext cx="3299407" cy="440924"/>
+          </a:xfrm>
+          <a:custGeom>
+            <a:avLst/>
+            <a:gdLst/>
+            <a:ahLst/>
+            <a:cxnLst/>
+            <a:rect l="l" t="t" r="r" b="b"/>
+            <a:pathLst>
+              <a:path w="10000" h="5291">
+                <a:moveTo>
+                  <a:pt x="85" y="2532"/>
+                </a:moveTo>
+                <a:cubicBezTo>
+                  <a:pt x="1736" y="3911"/>
+                  <a:pt x="7524" y="5298"/>
+                  <a:pt x="9958" y="5291"/>
+                </a:cubicBezTo>
+                <a:cubicBezTo>
+                  <a:pt x="9989" y="1958"/>
+                  <a:pt x="9969" y="3333"/>
+                  <a:pt x="10000" y="0"/>
+                </a:cubicBezTo>
+                <a:lnTo>
+                  <a:pt x="10000" y="0"/>
+                </a:lnTo>
+                <a:lnTo>
+                  <a:pt x="9667" y="204"/>
+                </a:lnTo>
+                <a:lnTo>
+                  <a:pt x="9334" y="400"/>
+                </a:lnTo>
+                <a:lnTo>
+                  <a:pt x="9001" y="590"/>
+                </a:lnTo>
+                <a:lnTo>
+                  <a:pt x="8667" y="753"/>
+                </a:lnTo>
+                <a:lnTo>
+                  <a:pt x="8333" y="917"/>
+                </a:lnTo>
+                <a:lnTo>
+                  <a:pt x="7999" y="1071"/>
+                </a:lnTo>
+                <a:lnTo>
+                  <a:pt x="7669" y="1202"/>
+                </a:lnTo>
+                <a:lnTo>
+                  <a:pt x="7333" y="1325"/>
+                </a:lnTo>
+                <a:lnTo>
+                  <a:pt x="7000" y="1440"/>
+                </a:lnTo>
+                <a:lnTo>
+                  <a:pt x="6673" y="1538"/>
+                </a:lnTo>
+                <a:lnTo>
+                  <a:pt x="6340" y="1636"/>
+                </a:lnTo>
+                <a:lnTo>
+                  <a:pt x="6013" y="1719"/>
+                </a:lnTo>
+                <a:lnTo>
+                  <a:pt x="5686" y="1784"/>
+                </a:lnTo>
+                <a:lnTo>
+                  <a:pt x="5359" y="1850"/>
+                </a:lnTo>
+                <a:lnTo>
+                  <a:pt x="5036" y="1906"/>
+                </a:lnTo>
+                <a:lnTo>
+                  <a:pt x="4717" y="1948"/>
+                </a:lnTo>
+                <a:lnTo>
+                  <a:pt x="4396" y="1980"/>
+                </a:lnTo>
+                <a:lnTo>
+                  <a:pt x="4079" y="2013"/>
+                </a:lnTo>
+                <a:lnTo>
+                  <a:pt x="3766" y="2029"/>
+                </a:lnTo>
+                <a:lnTo>
+                  <a:pt x="3454" y="2046"/>
+                </a:lnTo>
+                <a:lnTo>
+                  <a:pt x="3145" y="2053"/>
+                </a:lnTo>
+                <a:lnTo>
+                  <a:pt x="2839" y="2046"/>
+                </a:lnTo>
+                <a:lnTo>
+                  <a:pt x="2537" y="2046"/>
+                </a:lnTo>
+                <a:lnTo>
+                  <a:pt x="2238" y="2029"/>
+                </a:lnTo>
+                <a:lnTo>
+                  <a:pt x="1943" y="2004"/>
+                </a:lnTo>
+                <a:lnTo>
+                  <a:pt x="1653" y="1980"/>
+                </a:lnTo>
+                <a:lnTo>
+                  <a:pt x="1368" y="1955"/>
+                </a:lnTo>
+                <a:lnTo>
+                  <a:pt x="1085" y="1915"/>
+                </a:lnTo>
+                <a:lnTo>
+                  <a:pt x="806" y="1873"/>
+                </a:lnTo>
+                <a:lnTo>
+                  <a:pt x="533" y="1833"/>
+                </a:lnTo>
+                <a:lnTo>
+                  <a:pt x="0" y="1726"/>
+                </a:lnTo>
+                <a:cubicBezTo>
+                  <a:pt x="28" y="1995"/>
+                  <a:pt x="57" y="2263"/>
+                  <a:pt x="85" y="2532"/>
+                </a:cubicBezTo>
+                <a:close/>
+              </a:path>
+            </a:pathLst>
+          </a:custGeom>
+          <a:solidFill>
+            <a:schemeClr val="tx1">
+              <a:alpha val="20000"/>
+            </a:schemeClr>
+          </a:solidFill>
+          <a:ln>
+            <a:noFill/>
+          </a:ln>
+        </p:spPr>
+      </p:sp>
+      <p:sp>
+        <p:nvSpPr>
+          <p:cNvPr id="13" name="Freeform 5">
+            <a:extLst>
+              <a:ext uri="{FF2B5EF4-FFF2-40B4-BE49-F238E27FC236}">
+                <a16:creationId xmlns:a16="http://schemas.microsoft.com/office/drawing/2014/main" id="{96BA11E4-0636-4FA9-A836-2A4FB176449A}"/>
+              </a:ext>
+              <a:ext uri="{C183D7F6-B498-43B3-948B-1728B52AA6E4}">
+                <adec:decorative xmlns:adec="http://schemas.microsoft.com/office/drawing/2017/decorative" val="1"/>
+              </a:ext>
+            </a:extLst>
+          </p:cNvPr>
+          <p:cNvSpPr>
+            <a:spLocks noGrp="1" noRot="1" noChangeAspect="1" noMove="1" noResize="1" noEditPoints="1" noAdjustHandles="1" noChangeArrowheads="1" noChangeShapeType="1" noTextEdit="1"/>
+          </p:cNvSpPr>
+          <p:nvPr>
+            <p:extLst>
+              <p:ext uri="{386F3935-93C4-4BCD-93E2-E3B085C9AB24}">
+                <p16:designElem xmlns:p16="http://schemas.microsoft.com/office/powerpoint/2015/main" val="1"/>
+              </p:ext>
+            </p:extLst>
+          </p:nvPr>
+        </p:nvSpPr>
+        <p:spPr bwMode="gray">
+          <a:xfrm>
+            <a:off x="0" y="1587"/>
+            <a:ext cx="12192000" cy="6856413"/>
+          </a:xfrm>
+          <a:custGeom>
+            <a:avLst/>
+            <a:gdLst/>
+            <a:ahLst/>
+            <a:cxnLst/>
+            <a:rect l="0" t="0" r="r" b="b"/>
+            <a:pathLst>
+              <a:path w="15356" h="8638">
+                <a:moveTo>
+                  <a:pt x="0" y="0"/>
+                </a:moveTo>
+                <a:lnTo>
+                  <a:pt x="0" y="8638"/>
+                </a:lnTo>
+                <a:lnTo>
+                  <a:pt x="15356" y="8638"/>
+                </a:lnTo>
+                <a:lnTo>
+                  <a:pt x="15356" y="0"/>
+                </a:lnTo>
+                <a:lnTo>
+                  <a:pt x="0" y="0"/>
+                </a:lnTo>
+                <a:close/>
+                <a:moveTo>
+                  <a:pt x="14748" y="8038"/>
+                </a:moveTo>
+                <a:lnTo>
+                  <a:pt x="600" y="8038"/>
+                </a:lnTo>
+                <a:lnTo>
+                  <a:pt x="600" y="592"/>
+                </a:lnTo>
+                <a:lnTo>
+                  <a:pt x="14748" y="592"/>
+                </a:lnTo>
+                <a:lnTo>
+                  <a:pt x="14748" y="8038"/>
+                </a:lnTo>
+                <a:close/>
+              </a:path>
+            </a:pathLst>
+          </a:custGeom>
+          <a:solidFill>
+            <a:schemeClr val="tx1"/>
+          </a:solidFill>
+          <a:ln>
+            <a:noFill/>
+          </a:ln>
+        </p:spPr>
+      </p:sp>
+      <p:sp>
+        <p:nvSpPr>
+          <p:cNvPr id="15" name="Freeform: Shape 14">
+            <a:extLst>
+              <a:ext uri="{FF2B5EF4-FFF2-40B4-BE49-F238E27FC236}">
+                <a16:creationId xmlns:a16="http://schemas.microsoft.com/office/drawing/2014/main" id="{5681882E-BDD0-4311-AF62-E8019628524D}"/>
+              </a:ext>
+              <a:ext uri="{C183D7F6-B498-43B3-948B-1728B52AA6E4}">
+                <adec:decorative xmlns:adec="http://schemas.microsoft.com/office/drawing/2017/decorative" val="1"/>
+              </a:ext>
+            </a:extLst>
+          </p:cNvPr>
+          <p:cNvSpPr>
+            <a:spLocks noGrp="1" noRot="1" noChangeAspect="1" noMove="1" noResize="1" noEditPoints="1" noAdjustHandles="1" noChangeArrowheads="1" noChangeShapeType="1" noTextEdit="1"/>
+          </p:cNvSpPr>
+          <p:nvPr>
+            <p:extLst>
+              <p:ext uri="{386F3935-93C4-4BCD-93E2-E3B085C9AB24}">
+                <p16:designElem xmlns:p16="http://schemas.microsoft.com/office/powerpoint/2015/main" val="1"/>
+              </p:ext>
+            </p:extLst>
+          </p:nvPr>
+        </p:nvSpPr>
+        <p:spPr bwMode="gray">
+          <a:xfrm rot="16200000">
+            <a:off x="6290102" y="977273"/>
+            <a:ext cx="6053670" cy="4903455"/>
+          </a:xfrm>
+          <a:custGeom>
+            <a:avLst/>
+            <a:gdLst>
+              <a:gd name="connsiteX0" fmla="*/ 6053670 w 6053670"/>
+              <a:gd name="connsiteY0" fmla="*/ 1098 h 4903455"/>
+              <a:gd name="connsiteX1" fmla="*/ 6053670 w 6053670"/>
+              <a:gd name="connsiteY1" fmla="*/ 424590 h 4903455"/>
+              <a:gd name="connsiteX2" fmla="*/ 6053670 w 6053670"/>
+              <a:gd name="connsiteY2" fmla="*/ 1254558 h 4903455"/>
+              <a:gd name="connsiteX3" fmla="*/ 6053670 w 6053670"/>
+              <a:gd name="connsiteY3" fmla="*/ 4903455 h 4903455"/>
+              <a:gd name="connsiteX4" fmla="*/ 0 w 6053670"/>
+              <a:gd name="connsiteY4" fmla="*/ 4903455 h 4903455"/>
+              <a:gd name="connsiteX5" fmla="*/ 0 w 6053670"/>
+              <a:gd name="connsiteY5" fmla="*/ 1249853 h 4903455"/>
+              <a:gd name="connsiteX6" fmla="*/ 0 w 6053670"/>
+              <a:gd name="connsiteY6" fmla="*/ 424590 h 4903455"/>
+              <a:gd name="connsiteX7" fmla="*/ 0 w 6053670"/>
+              <a:gd name="connsiteY7" fmla="*/ 0 h 4903455"/>
+              <a:gd name="connsiteX8" fmla="*/ 35717 w 6053670"/>
+              <a:gd name="connsiteY8" fmla="*/ 5488 h 4903455"/>
+              <a:gd name="connsiteX9" fmla="*/ 140445 w 6053670"/>
+              <a:gd name="connsiteY9" fmla="*/ 21641 h 4903455"/>
+              <a:gd name="connsiteX10" fmla="*/ 216722 w 6053670"/>
+              <a:gd name="connsiteY10" fmla="*/ 32932 h 4903455"/>
+              <a:gd name="connsiteX11" fmla="*/ 307527 w 6053670"/>
+              <a:gd name="connsiteY11" fmla="*/ 44850 h 4903455"/>
+              <a:gd name="connsiteX12" fmla="*/ 415282 w 6053670"/>
+              <a:gd name="connsiteY12" fmla="*/ 59121 h 4903455"/>
+              <a:gd name="connsiteX13" fmla="*/ 534539 w 6053670"/>
+              <a:gd name="connsiteY13" fmla="*/ 74175 h 4903455"/>
+              <a:gd name="connsiteX14" fmla="*/ 668931 w 6053670"/>
+              <a:gd name="connsiteY14" fmla="*/ 90014 h 4903455"/>
+              <a:gd name="connsiteX15" fmla="*/ 815430 w 6053670"/>
+              <a:gd name="connsiteY15" fmla="*/ 106794 h 4903455"/>
+              <a:gd name="connsiteX16" fmla="*/ 974641 w 6053670"/>
+              <a:gd name="connsiteY16" fmla="*/ 123574 h 4903455"/>
+              <a:gd name="connsiteX17" fmla="*/ 1144144 w 6053670"/>
+              <a:gd name="connsiteY17" fmla="*/ 140667 h 4903455"/>
+              <a:gd name="connsiteX18" fmla="*/ 1326965 w 6053670"/>
+              <a:gd name="connsiteY18" fmla="*/ 156506 h 4903455"/>
+              <a:gd name="connsiteX19" fmla="*/ 1518261 w 6053670"/>
+              <a:gd name="connsiteY19" fmla="*/ 171717 h 4903455"/>
+              <a:gd name="connsiteX20" fmla="*/ 1720453 w 6053670"/>
+              <a:gd name="connsiteY20" fmla="*/ 185518 h 4903455"/>
+              <a:gd name="connsiteX21" fmla="*/ 1931121 w 6053670"/>
+              <a:gd name="connsiteY21" fmla="*/ 198690 h 4903455"/>
+              <a:gd name="connsiteX22" fmla="*/ 2150869 w 6053670"/>
+              <a:gd name="connsiteY22" fmla="*/ 211079 h 4903455"/>
+              <a:gd name="connsiteX23" fmla="*/ 2263467 w 6053670"/>
+              <a:gd name="connsiteY23" fmla="*/ 215470 h 4903455"/>
+              <a:gd name="connsiteX24" fmla="*/ 2378487 w 6053670"/>
+              <a:gd name="connsiteY24" fmla="*/ 220332 h 4903455"/>
+              <a:gd name="connsiteX25" fmla="*/ 2495323 w 6053670"/>
+              <a:gd name="connsiteY25" fmla="*/ 224879 h 4903455"/>
+              <a:gd name="connsiteX26" fmla="*/ 2612764 w 6053670"/>
+              <a:gd name="connsiteY26" fmla="*/ 227859 h 4903455"/>
+              <a:gd name="connsiteX27" fmla="*/ 2732627 w 6053670"/>
+              <a:gd name="connsiteY27" fmla="*/ 230525 h 4903455"/>
+              <a:gd name="connsiteX28" fmla="*/ 2853700 w 6053670"/>
+              <a:gd name="connsiteY28" fmla="*/ 233348 h 4903455"/>
+              <a:gd name="connsiteX29" fmla="*/ 2977195 w 6053670"/>
+              <a:gd name="connsiteY29" fmla="*/ 235229 h 4903455"/>
+              <a:gd name="connsiteX30" fmla="*/ 3101900 w 6053670"/>
+              <a:gd name="connsiteY30" fmla="*/ 235229 h 4903455"/>
+              <a:gd name="connsiteX31" fmla="*/ 3227817 w 6053670"/>
+              <a:gd name="connsiteY31" fmla="*/ 236170 h 4903455"/>
+              <a:gd name="connsiteX32" fmla="*/ 3354944 w 6053670"/>
+              <a:gd name="connsiteY32" fmla="*/ 235229 h 4903455"/>
+              <a:gd name="connsiteX33" fmla="*/ 3483887 w 6053670"/>
+              <a:gd name="connsiteY33" fmla="*/ 233348 h 4903455"/>
+              <a:gd name="connsiteX34" fmla="*/ 3612830 w 6053670"/>
+              <a:gd name="connsiteY34" fmla="*/ 231623 h 4903455"/>
+              <a:gd name="connsiteX35" fmla="*/ 3743589 w 6053670"/>
+              <a:gd name="connsiteY35" fmla="*/ 227859 h 4903455"/>
+              <a:gd name="connsiteX36" fmla="*/ 3875559 w 6053670"/>
+              <a:gd name="connsiteY36" fmla="*/ 223938 h 4903455"/>
+              <a:gd name="connsiteX37" fmla="*/ 4007529 w 6053670"/>
+              <a:gd name="connsiteY37" fmla="*/ 219391 h 4903455"/>
+              <a:gd name="connsiteX38" fmla="*/ 4140710 w 6053670"/>
+              <a:gd name="connsiteY38" fmla="*/ 212961 h 4903455"/>
+              <a:gd name="connsiteX39" fmla="*/ 4275102 w 6053670"/>
+              <a:gd name="connsiteY39" fmla="*/ 205277 h 4903455"/>
+              <a:gd name="connsiteX40" fmla="*/ 4410098 w 6053670"/>
+              <a:gd name="connsiteY40" fmla="*/ 197907 h 4903455"/>
+              <a:gd name="connsiteX41" fmla="*/ 4545096 w 6053670"/>
+              <a:gd name="connsiteY41" fmla="*/ 188498 h 4903455"/>
+              <a:gd name="connsiteX42" fmla="*/ 4681909 w 6053670"/>
+              <a:gd name="connsiteY42" fmla="*/ 177207 h 4903455"/>
+              <a:gd name="connsiteX43" fmla="*/ 4816905 w 6053670"/>
+              <a:gd name="connsiteY43" fmla="*/ 165916 h 4903455"/>
+              <a:gd name="connsiteX44" fmla="*/ 4954323 w 6053670"/>
+              <a:gd name="connsiteY44" fmla="*/ 152899 h 4903455"/>
+              <a:gd name="connsiteX45" fmla="*/ 5092347 w 6053670"/>
+              <a:gd name="connsiteY45" fmla="*/ 138629 h 4903455"/>
+              <a:gd name="connsiteX46" fmla="*/ 5228555 w 6053670"/>
+              <a:gd name="connsiteY46" fmla="*/ 123574 h 4903455"/>
+              <a:gd name="connsiteX47" fmla="*/ 5366578 w 6053670"/>
+              <a:gd name="connsiteY47" fmla="*/ 106010 h 4903455"/>
+              <a:gd name="connsiteX48" fmla="*/ 5503997 w 6053670"/>
+              <a:gd name="connsiteY48" fmla="*/ 87192 h 4903455"/>
+              <a:gd name="connsiteX49" fmla="*/ 5642020 w 6053670"/>
+              <a:gd name="connsiteY49" fmla="*/ 68530 h 4903455"/>
+              <a:gd name="connsiteX50" fmla="*/ 5779438 w 6053670"/>
+              <a:gd name="connsiteY50" fmla="*/ 46733 h 4903455"/>
+              <a:gd name="connsiteX51" fmla="*/ 5916251 w 6053670"/>
+              <a:gd name="connsiteY51" fmla="*/ 24464 h 4903455"/>
+            </a:gdLst>
+            <a:ahLst/>
+            <a:cxnLst>
+              <a:cxn ang="0">
+                <a:pos x="connsiteX0" y="connsiteY0"/>
+              </a:cxn>
+              <a:cxn ang="0">
+                <a:pos x="connsiteX1" y="connsiteY1"/>
+              </a:cxn>
+              <a:cxn ang="0">
+                <a:pos x="connsiteX2" y="connsiteY2"/>
+              </a:cxn>
+              <a:cxn ang="0">
+                <a:pos x="connsiteX3" y="connsiteY3"/>
+              </a:cxn>
+              <a:cxn ang="0">
+                <a:pos x="connsiteX4" y="connsiteY4"/>
+              </a:cxn>
+              <a:cxn ang="0">
+                <a:pos x="connsiteX5" y="connsiteY5"/>
+              </a:cxn>
+              <a:cxn ang="0">
+                <a:pos x="connsiteX6" y="connsiteY6"/>
+              </a:cxn>
+              <a:cxn ang="0">
+                <a:pos x="connsiteX7" y="connsiteY7"/>
+              </a:cxn>
+              <a:cxn ang="0">
+                <a:pos x="connsiteX8" y="connsiteY8"/>
+              </a:cxn>
+              <a:cxn ang="0">
+                <a:pos x="connsiteX9" y="connsiteY9"/>
+              </a:cxn>
+              <a:cxn ang="0">
+                <a:pos x="connsiteX10" y="connsiteY10"/>
+              </a:cxn>
+              <a:cxn ang="0">
+                <a:pos x="connsiteX11" y="connsiteY11"/>
+              </a:cxn>
+              <a:cxn ang="0">
+                <a:pos x="connsiteX12" y="connsiteY12"/>
+              </a:cxn>
+              <a:cxn ang="0">
+                <a:pos x="connsiteX13" y="connsiteY13"/>
+              </a:cxn>
+              <a:cxn ang="0">
+                <a:pos x="connsiteX14" y="connsiteY14"/>
+              </a:cxn>
+              <a:cxn ang="0">
+                <a:pos x="connsiteX15" y="connsiteY15"/>
+              </a:cxn>
+              <a:cxn ang="0">
+                <a:pos x="connsiteX16" y="connsiteY16"/>
+              </a:cxn>
+              <a:cxn ang="0">
+                <a:pos x="connsiteX17" y="connsiteY17"/>
+              </a:cxn>
+              <a:cxn ang="0">
+                <a:pos x="connsiteX18" y="connsiteY18"/>
+              </a:cxn>
+              <a:cxn ang="0">
+                <a:pos x="connsiteX19" y="connsiteY19"/>
+              </a:cxn>
+              <a:cxn ang="0">
+                <a:pos x="connsiteX20" y="connsiteY20"/>
+              </a:cxn>
+              <a:cxn ang="0">
+                <a:pos x="connsiteX21" y="connsiteY21"/>
+              </a:cxn>
+              <a:cxn ang="0">
+                <a:pos x="connsiteX22" y="connsiteY22"/>
+              </a:cxn>
+              <a:cxn ang="0">
+                <a:pos x="connsiteX23" y="connsiteY23"/>
+              </a:cxn>
+              <a:cxn ang="0">
+                <a:pos x="connsiteX24" y="connsiteY24"/>
+              </a:cxn>
+              <a:cxn ang="0">
+                <a:pos x="connsiteX25" y="connsiteY25"/>
+              </a:cxn>
+              <a:cxn ang="0">
+                <a:pos x="connsiteX26" y="connsiteY26"/>
+              </a:cxn>
+              <a:cxn ang="0">
+                <a:pos x="connsiteX27" y="connsiteY27"/>
+              </a:cxn>
+              <a:cxn ang="0">
+                <a:pos x="connsiteX28" y="connsiteY28"/>
+              </a:cxn>
+              <a:cxn ang="0">
+                <a:pos x="connsiteX29" y="connsiteY29"/>
+              </a:cxn>
+              <a:cxn ang="0">
+                <a:pos x="connsiteX30" y="connsiteY30"/>
+              </a:cxn>
+              <a:cxn ang="0">
+                <a:pos x="connsiteX31" y="connsiteY31"/>
+              </a:cxn>
+              <a:cxn ang="0">
+                <a:pos x="connsiteX32" y="connsiteY32"/>
+              </a:cxn>
+              <a:cxn ang="0">
+                <a:pos x="connsiteX33" y="connsiteY33"/>
+              </a:cxn>
+              <a:cxn ang="0">
+                <a:pos x="connsiteX34" y="connsiteY34"/>
+              </a:cxn>
+              <a:cxn ang="0">
+                <a:pos x="connsiteX35" y="connsiteY35"/>
+              </a:cxn>
+              <a:cxn ang="0">
+                <a:pos x="connsiteX36" y="connsiteY36"/>
+              </a:cxn>
+              <a:cxn ang="0">
+                <a:pos x="connsiteX37" y="connsiteY37"/>
+              </a:cxn>
+              <a:cxn ang="0">
+                <a:pos x="connsiteX38" y="connsiteY38"/>
+              </a:cxn>
+              <a:cxn ang="0">
+                <a:pos x="connsiteX39" y="connsiteY39"/>
+              </a:cxn>
+              <a:cxn ang="0">
+                <a:pos x="connsiteX40" y="connsiteY40"/>
+              </a:cxn>
+              <a:cxn ang="0">
+                <a:pos x="connsiteX41" y="connsiteY41"/>
+              </a:cxn>
+              <a:cxn ang="0">
+                <a:pos x="connsiteX42" y="connsiteY42"/>
+              </a:cxn>
+              <a:cxn ang="0">
+                <a:pos x="connsiteX43" y="connsiteY43"/>
+              </a:cxn>
+              <a:cxn ang="0">
+                <a:pos x="connsiteX44" y="connsiteY44"/>
+              </a:cxn>
+              <a:cxn ang="0">
+                <a:pos x="connsiteX45" y="connsiteY45"/>
+              </a:cxn>
+              <a:cxn ang="0">
+                <a:pos x="connsiteX46" y="connsiteY46"/>
+              </a:cxn>
+              <a:cxn ang="0">
+                <a:pos x="connsiteX47" y="connsiteY47"/>
+              </a:cxn>
+              <a:cxn ang="0">
+                <a:pos x="connsiteX48" y="connsiteY48"/>
+              </a:cxn>
+              <a:cxn ang="0">
+                <a:pos x="connsiteX49" y="connsiteY49"/>
+              </a:cxn>
+              <a:cxn ang="0">
+                <a:pos x="connsiteX50" y="connsiteY50"/>
+              </a:cxn>
+              <a:cxn ang="0">
+                <a:pos x="connsiteX51" y="connsiteY51"/>
+              </a:cxn>
+            </a:cxnLst>
+            <a:rect l="l" t="t" r="r" b="b"/>
+            <a:pathLst>
+              <a:path w="6053670" h="4903455">
+                <a:moveTo>
+                  <a:pt x="6053670" y="1098"/>
+                </a:moveTo>
+                <a:lnTo>
+                  <a:pt x="6053670" y="424590"/>
+                </a:lnTo>
+                <a:lnTo>
+                  <a:pt x="6053670" y="1254558"/>
+                </a:lnTo>
+                <a:lnTo>
+                  <a:pt x="6053670" y="4903455"/>
+                </a:lnTo>
+                <a:lnTo>
+                  <a:pt x="0" y="4903455"/>
+                </a:lnTo>
+                <a:lnTo>
+                  <a:pt x="0" y="1249853"/>
+                </a:lnTo>
+                <a:lnTo>
+                  <a:pt x="0" y="424590"/>
+                </a:lnTo>
+                <a:lnTo>
+                  <a:pt x="0" y="0"/>
+                </a:lnTo>
+                <a:lnTo>
+                  <a:pt x="35717" y="5488"/>
+                </a:lnTo>
+                <a:lnTo>
+                  <a:pt x="140445" y="21641"/>
+                </a:lnTo>
+                <a:lnTo>
+                  <a:pt x="216722" y="32932"/>
+                </a:lnTo>
+                <a:lnTo>
+                  <a:pt x="307527" y="44850"/>
+                </a:lnTo>
+                <a:lnTo>
+                  <a:pt x="415282" y="59121"/>
+                </a:lnTo>
+                <a:lnTo>
+                  <a:pt x="534539" y="74175"/>
+                </a:lnTo>
+                <a:lnTo>
+                  <a:pt x="668931" y="90014"/>
+                </a:lnTo>
+                <a:lnTo>
+                  <a:pt x="815430" y="106794"/>
+                </a:lnTo>
+                <a:lnTo>
+                  <a:pt x="974641" y="123574"/>
+                </a:lnTo>
+                <a:lnTo>
+                  <a:pt x="1144144" y="140667"/>
+                </a:lnTo>
+                <a:lnTo>
+                  <a:pt x="1326965" y="156506"/>
+                </a:lnTo>
+                <a:lnTo>
+                  <a:pt x="1518261" y="171717"/>
+                </a:lnTo>
+                <a:lnTo>
+                  <a:pt x="1720453" y="185518"/>
+                </a:lnTo>
+                <a:lnTo>
+                  <a:pt x="1931121" y="198690"/>
+                </a:lnTo>
+                <a:lnTo>
+                  <a:pt x="2150869" y="211079"/>
+                </a:lnTo>
+                <a:lnTo>
+                  <a:pt x="2263467" y="215470"/>
+                </a:lnTo>
+                <a:lnTo>
+                  <a:pt x="2378487" y="220332"/>
+                </a:lnTo>
+                <a:lnTo>
+                  <a:pt x="2495323" y="224879"/>
+                </a:lnTo>
+                <a:lnTo>
+                  <a:pt x="2612764" y="227859"/>
+                </a:lnTo>
+                <a:lnTo>
+                  <a:pt x="2732627" y="230525"/>
+                </a:lnTo>
+                <a:lnTo>
+                  <a:pt x="2853700" y="233348"/>
+                </a:lnTo>
+                <a:lnTo>
+                  <a:pt x="2977195" y="235229"/>
+                </a:lnTo>
+                <a:lnTo>
+                  <a:pt x="3101900" y="235229"/>
+                </a:lnTo>
+                <a:lnTo>
+                  <a:pt x="3227817" y="236170"/>
+                </a:lnTo>
+                <a:lnTo>
+                  <a:pt x="3354944" y="235229"/>
+                </a:lnTo>
+                <a:lnTo>
+                  <a:pt x="3483887" y="233348"/>
+                </a:lnTo>
+                <a:lnTo>
+                  <a:pt x="3612830" y="231623"/>
+                </a:lnTo>
+                <a:lnTo>
+                  <a:pt x="3743589" y="227859"/>
+                </a:lnTo>
+                <a:lnTo>
+                  <a:pt x="3875559" y="223938"/>
+                </a:lnTo>
+                <a:lnTo>
+                  <a:pt x="4007529" y="219391"/>
+                </a:lnTo>
+                <a:lnTo>
+                  <a:pt x="4140710" y="212961"/>
+                </a:lnTo>
+                <a:lnTo>
+                  <a:pt x="4275102" y="205277"/>
+                </a:lnTo>
+                <a:lnTo>
+                  <a:pt x="4410098" y="197907"/>
+                </a:lnTo>
+                <a:lnTo>
+                  <a:pt x="4545096" y="188498"/>
+                </a:lnTo>
+                <a:lnTo>
+                  <a:pt x="4681909" y="177207"/>
+                </a:lnTo>
+                <a:lnTo>
+                  <a:pt x="4816905" y="165916"/>
+                </a:lnTo>
+                <a:lnTo>
+                  <a:pt x="4954323" y="152899"/>
+                </a:lnTo>
+                <a:lnTo>
+                  <a:pt x="5092347" y="138629"/>
+                </a:lnTo>
+                <a:lnTo>
+                  <a:pt x="5228555" y="123574"/>
+                </a:lnTo>
+                <a:lnTo>
+                  <a:pt x="5366578" y="106010"/>
+                </a:lnTo>
+                <a:lnTo>
+                  <a:pt x="5503997" y="87192"/>
+                </a:lnTo>
+                <a:lnTo>
+                  <a:pt x="5642020" y="68530"/>
+                </a:lnTo>
+                <a:lnTo>
+                  <a:pt x="5779438" y="46733"/>
+                </a:lnTo>
+                <a:lnTo>
+                  <a:pt x="5916251" y="24464"/>
+                </a:lnTo>
+                <a:close/>
+              </a:path>
+            </a:pathLst>
+          </a:custGeom>
+          <a:solidFill>
+            <a:schemeClr val="tx1"/>
+          </a:solidFill>
+          <a:ln>
+            <a:noFill/>
+          </a:ln>
+        </p:spPr>
+      </p:sp>
+      <p:sp>
+        <p:nvSpPr>
+          <p:cNvPr id="17" name="Rectangle 16">
+            <a:extLst>
+              <a:ext uri="{FF2B5EF4-FFF2-40B4-BE49-F238E27FC236}">
+                <a16:creationId xmlns:a16="http://schemas.microsoft.com/office/drawing/2014/main" id="{EADD3260-4BDA-459B-A162-5E1B897E38FC}"/>
+              </a:ext>
+              <a:ext uri="{C183D7F6-B498-43B3-948B-1728B52AA6E4}">
+                <adec:decorative xmlns:adec="http://schemas.microsoft.com/office/drawing/2017/decorative" val="1"/>
+              </a:ext>
+            </a:extLst>
+          </p:cNvPr>
+          <p:cNvSpPr>
+            <a:spLocks noGrp="1" noRot="1" noChangeAspect="1" noMove="1" noResize="1" noEditPoints="1" noAdjustHandles="1" noChangeArrowheads="1" noChangeShapeType="1" noTextEdit="1"/>
+          </p:cNvSpPr>
+          <p:nvPr>
+            <p:extLst>
+              <p:ext uri="{386F3935-93C4-4BCD-93E2-E3B085C9AB24}">
+                <p16:designElem xmlns:p16="http://schemas.microsoft.com/office/powerpoint/2015/main" val="1"/>
+              </p:ext>
+            </p:extLst>
+          </p:nvPr>
+        </p:nvSpPr>
+        <p:spPr>
+          <a:xfrm>
+            <a:off x="10437812" y="0"/>
+            <a:ext cx="685800" cy="1143000"/>
+          </a:xfrm>
+          <a:prstGeom prst="rect">
+            <a:avLst/>
+          </a:prstGeom>
+          <a:solidFill>
+            <a:schemeClr val="accent1"/>
+          </a:solidFill>
+          <a:ln>
+            <a:noFill/>
+          </a:ln>
+        </p:spPr>
+        <p:style>
+          <a:lnRef idx="1">
+            <a:schemeClr val="accent1"/>
+          </a:lnRef>
+          <a:fillRef idx="3">
+            <a:schemeClr val="accent1"/>
+          </a:fillRef>
+          <a:effectRef idx="2">
+            <a:schemeClr val="accent1"/>
+          </a:effectRef>
+          <a:fontRef idx="minor">
+            <a:schemeClr val="lt1"/>
+          </a:fontRef>
+        </p:style>
+      </p:sp>
+      <p:sp>
+        <p:nvSpPr>
+          <p:cNvPr id="19" name="Oval 18">
+            <a:extLst>
+              <a:ext uri="{FF2B5EF4-FFF2-40B4-BE49-F238E27FC236}">
+                <a16:creationId xmlns:a16="http://schemas.microsoft.com/office/drawing/2014/main" id="{283DA7DD-CA37-4ED7-8710-48E56B063BA4}"/>
+              </a:ext>
+              <a:ext uri="{C183D7F6-B498-43B3-948B-1728B52AA6E4}">
+                <adec:decorative xmlns:adec="http://schemas.microsoft.com/office/drawing/2017/decorative" val="1"/>
+              </a:ext>
+            </a:extLst>
+          </p:cNvPr>
+          <p:cNvSpPr>
+            <a:spLocks noGrp="1" noRot="1" noChangeAspect="1" noMove="1" noResize="1" noEditPoints="1" noAdjustHandles="1" noChangeArrowheads="1" noChangeShapeType="1" noTextEdit="1"/>
+          </p:cNvSpPr>
+          <p:nvPr>
+            <p:extLst>
+              <p:ext uri="{386F3935-93C4-4BCD-93E2-E3B085C9AB24}">
+                <p16:designElem xmlns:p16="http://schemas.microsoft.com/office/powerpoint/2015/main" val="1"/>
+              </p:ext>
+            </p:extLst>
+          </p:nvPr>
+        </p:nvSpPr>
+        <p:spPr>
+          <a:xfrm>
+            <a:off x="0" y="2667000"/>
+            <a:ext cx="4191000" cy="4191000"/>
+          </a:xfrm>
+          <a:prstGeom prst="ellipse">
+            <a:avLst/>
+          </a:prstGeom>
+          <a:gradFill flip="none" rotWithShape="1">
+            <a:gsLst>
+              <a:gs pos="0">
+                <a:schemeClr val="accent5">
+                  <a:alpha val="11000"/>
+                </a:schemeClr>
+              </a:gs>
+              <a:gs pos="75000">
+                <a:schemeClr val="accent5">
+                  <a:alpha val="0"/>
+                </a:schemeClr>
+              </a:gs>
+              <a:gs pos="36000">
+                <a:schemeClr val="accent5">
+                  <a:alpha val="10000"/>
+                </a:schemeClr>
+              </a:gs>
+            </a:gsLst>
+            <a:path path="circle">
+              <a:fillToRect l="50000" t="50000" r="50000" b="50000"/>
+            </a:path>
+            <a:tileRect/>
+          </a:gradFill>
+          <a:ln>
+            <a:noFill/>
+          </a:ln>
+          <a:effectLst/>
+        </p:spPr>
+        <p:style>
+          <a:lnRef idx="1">
+            <a:schemeClr val="accent1"/>
+          </a:lnRef>
+          <a:fillRef idx="3">
+            <a:schemeClr val="accent1"/>
+          </a:fillRef>
+          <a:effectRef idx="2">
+            <a:schemeClr val="accent1"/>
+          </a:effectRef>
+          <a:fontRef idx="minor">
+            <a:schemeClr val="lt1"/>
+          </a:fontRef>
+        </p:style>
+      </p:sp>
+      <p:sp>
+        <p:nvSpPr>
+          <p:cNvPr id="21" name="Oval 20">
+            <a:extLst>
+              <a:ext uri="{FF2B5EF4-FFF2-40B4-BE49-F238E27FC236}">
+                <a16:creationId xmlns:a16="http://schemas.microsoft.com/office/drawing/2014/main" id="{B92F2E3C-66CD-4DEB-BA14-2A5912B65A21}"/>
+              </a:ext>
+              <a:ext uri="{C183D7F6-B498-43B3-948B-1728B52AA6E4}">
+                <adec:decorative xmlns:adec="http://schemas.microsoft.com/office/drawing/2017/decorative" val="1"/>
+              </a:ext>
+            </a:extLst>
+          </p:cNvPr>
+          <p:cNvSpPr>
+            <a:spLocks noGrp="1" noRot="1" noChangeAspect="1" noMove="1" noResize="1" noEditPoints="1" noAdjustHandles="1" noChangeArrowheads="1" noChangeShapeType="1" noTextEdit="1"/>
+          </p:cNvSpPr>
+          <p:nvPr>
+            <p:extLst>
+              <p:ext uri="{386F3935-93C4-4BCD-93E2-E3B085C9AB24}">
+                <p16:designElem xmlns:p16="http://schemas.microsoft.com/office/powerpoint/2015/main" val="1"/>
+              </p:ext>
+            </p:extLst>
+          </p:nvPr>
+        </p:nvSpPr>
+        <p:spPr>
+          <a:xfrm>
+            <a:off x="0" y="2895600"/>
+            <a:ext cx="2362200" cy="2362200"/>
+          </a:xfrm>
+          <a:prstGeom prst="ellipse">
+            <a:avLst/>
+          </a:prstGeom>
+          <a:gradFill flip="none" rotWithShape="1">
+            <a:gsLst>
+              <a:gs pos="0">
+                <a:schemeClr val="accent5">
+                  <a:alpha val="8000"/>
+                </a:schemeClr>
+              </a:gs>
+              <a:gs pos="72000">
+                <a:schemeClr val="accent5">
+                  <a:alpha val="0"/>
+                </a:schemeClr>
+              </a:gs>
+              <a:gs pos="36000">
+                <a:schemeClr val="accent5">
+                  <a:alpha val="8000"/>
+                </a:schemeClr>
+              </a:gs>
+            </a:gsLst>
+            <a:path path="circle">
+              <a:fillToRect l="50000" t="50000" r="50000" b="50000"/>
+            </a:path>
+            <a:tileRect/>
+          </a:gradFill>
+          <a:ln>
+            <a:noFill/>
+          </a:ln>
+          <a:effectLst/>
+        </p:spPr>
+        <p:style>
+          <a:lnRef idx="1">
+            <a:schemeClr val="accent1"/>
+          </a:lnRef>
+          <a:fillRef idx="3">
+            <a:schemeClr val="accent1"/>
+          </a:fillRef>
+          <a:effectRef idx="2">
+            <a:schemeClr val="accent1"/>
+          </a:effectRef>
+          <a:fontRef idx="minor">
+            <a:schemeClr val="lt1"/>
+          </a:fontRef>
+        </p:style>
+      </p:sp>
+      <p:sp>
+        <p:nvSpPr>
+          <p:cNvPr id="3" name="Content Placeholder 2">
+            <a:extLst>
+              <a:ext uri="{FF2B5EF4-FFF2-40B4-BE49-F238E27FC236}">
+                <a16:creationId xmlns:a16="http://schemas.microsoft.com/office/drawing/2014/main" id="{4A00F824-275F-4803-B4BC-6ABC1565303F}"/>
+              </a:ext>
+            </a:extLst>
+          </p:cNvPr>
+          <p:cNvSpPr>
+            <a:spLocks noGrp="1"/>
+          </p:cNvSpPr>
+          <p:nvPr>
+            <p:ph idx="1"/>
+          </p:nvPr>
+        </p:nvSpPr>
+        <p:spPr>
+          <a:xfrm>
+            <a:off x="648457" y="1955597"/>
+            <a:ext cx="5802776" cy="2705468"/>
+          </a:xfrm>
+        </p:spPr>
+        <p:txBody>
+          <a:bodyPr anchor="ctr">
+            <a:normAutofit/>
+          </a:bodyPr>
+          <a:lstStyle/>
+          <a:p>
+            <a:pPr marL="0" indent="0" algn="ctr">
+              <a:buNone/>
+            </a:pPr>
+            <a:r>
+              <a:rPr lang="en-GB" sz="6000" dirty="0">
+                <a:solidFill>
+                  <a:srgbClr val="FFFFFF"/>
+                </a:solidFill>
+              </a:rPr>
+              <a:t>Any Questions?</a:t>
+            </a:r>
+          </a:p>
+        </p:txBody>
+      </p:sp>
+      <p:pic>
+        <p:nvPicPr>
+          <p:cNvPr id="1026" name="Picture 2" descr="Ask Questions Png Question Mark Free Icon Png - Question Mark Icon Png  Transparent, Png Download - kindpng">
+            <a:extLst>
+              <a:ext uri="{FF2B5EF4-FFF2-40B4-BE49-F238E27FC236}">
+                <a16:creationId xmlns:a16="http://schemas.microsoft.com/office/drawing/2014/main" id="{064856DF-846C-4DC5-915A-42A907B6D87D}"/>
+              </a:ext>
+            </a:extLst>
+          </p:cNvPr>
+          <p:cNvPicPr>
+            <a:picLocks noChangeAspect="1" noChangeArrowheads="1"/>
+          </p:cNvPicPr>
+          <p:nvPr/>
+        </p:nvPicPr>
+        <p:blipFill>
+          <a:blip r:embed="rId2">
+            <a:extLst>
+              <a:ext uri="{28A0092B-C50C-407E-A947-70E740481C1C}">
+                <a14:useLocalDpi xmlns:a14="http://schemas.microsoft.com/office/drawing/2010/main" val="0"/>
+              </a:ext>
+            </a:extLst>
+          </a:blip>
+          <a:srcRect/>
+          <a:stretch>
+            <a:fillRect/>
+          </a:stretch>
+        </p:blipFill>
+        <p:spPr bwMode="auto">
+          <a:xfrm>
+            <a:off x="7984454" y="1852480"/>
+            <a:ext cx="2919342" cy="3452385"/>
           </a:xfrm>
           <a:prstGeom prst="rect">
             <a:avLst/>
           </a:prstGeom>
           <a:noFill/>
+          <a:extLst>
+            <a:ext uri="{909E8E84-426E-40DD-AFC4-6F175D3DCCD1}">
+              <a14:hiddenFill xmlns:a14="http://schemas.microsoft.com/office/drawing/2010/main">
+                <a:solidFill>
+                  <a:srgbClr val="FFFFFF"/>
+                </a:solidFill>
+              </a14:hiddenFill>
+            </a:ext>
+          </a:extLst>
         </p:spPr>
-        <p:txBody>
-          <a:bodyPr wrap="square" rtlCol="0">
-            <a:spAutoFit/>
-          </a:bodyPr>
-          <a:lstStyle/>
-          <a:p>
-            <a:pPr marL="285750" indent="-285750" fontAlgn="base">
-              <a:buFont typeface="Arial" panose="020B0604020202020204" pitchFamily="34" charset="0"/>
-              <a:buChar char="•"/>
-            </a:pPr>
-            <a:r>
-              <a:rPr lang="en-GB" dirty="0">
-                <a:hlinkClick r:id="rId5" tooltip="Meet the Godfather of AI in this Episode of Hello World (Video)"/>
-              </a:rPr>
-              <a:t>Geoff Hinton</a:t>
-            </a:r>
-            <a:r>
-              <a:rPr lang="en-GB" dirty="0"/>
-              <a:t>, an emeritus professor at the University of Toronto and a senior researcher at </a:t>
-            </a:r>
-            <a:r>
-              <a:rPr lang="en-GB" dirty="0">
-                <a:hlinkClick r:id="rId6" tooltip="Company Overview"/>
-              </a:rPr>
-              <a:t>Alphabet Inc.</a:t>
-            </a:r>
-            <a:r>
-              <a:rPr lang="en-GB" dirty="0"/>
-              <a:t>’s Google Brain. </a:t>
-            </a:r>
-          </a:p>
-          <a:p>
-            <a:pPr fontAlgn="base"/>
-            <a:endParaRPr lang="en-GB" dirty="0"/>
-          </a:p>
-          <a:p>
-            <a:pPr marL="285750" indent="-285750" fontAlgn="base">
-              <a:buFont typeface="Arial" panose="020B0604020202020204" pitchFamily="34" charset="0"/>
-              <a:buChar char="•"/>
-            </a:pPr>
-            <a:r>
-              <a:rPr lang="en-GB" dirty="0"/>
-              <a:t>Yann </a:t>
-            </a:r>
-            <a:r>
-              <a:rPr lang="en-GB" dirty="0" err="1"/>
-              <a:t>LeCun</a:t>
-            </a:r>
-            <a:r>
-              <a:rPr lang="en-GB" dirty="0"/>
-              <a:t>, a professor at New York University and the chief AI scientist at </a:t>
-            </a:r>
-            <a:r>
-              <a:rPr lang="en-GB" dirty="0">
-                <a:hlinkClick r:id="rId7" tooltip="Company Overview"/>
-              </a:rPr>
-              <a:t>Facebook Inc.</a:t>
-            </a:r>
-            <a:r>
-              <a:rPr lang="en-GB" dirty="0"/>
-              <a:t> </a:t>
-            </a:r>
-          </a:p>
-          <a:p>
-            <a:pPr fontAlgn="base"/>
-            <a:endParaRPr lang="en-GB" dirty="0"/>
-          </a:p>
-          <a:p>
-            <a:pPr marL="285750" indent="-285750" fontAlgn="base">
-              <a:buFont typeface="Arial" panose="020B0604020202020204" pitchFamily="34" charset="0"/>
-              <a:buChar char="•"/>
-            </a:pPr>
-            <a:r>
-              <a:rPr lang="en-GB" dirty="0"/>
-              <a:t> </a:t>
-            </a:r>
-            <a:r>
-              <a:rPr lang="en-GB" dirty="0" err="1"/>
-              <a:t>Yoshua</a:t>
-            </a:r>
-            <a:r>
-              <a:rPr lang="en-GB" dirty="0"/>
-              <a:t> </a:t>
-            </a:r>
-            <a:r>
-              <a:rPr lang="en-GB" dirty="0" err="1"/>
-              <a:t>Bengio</a:t>
-            </a:r>
-            <a:r>
-              <a:rPr lang="en-GB" dirty="0"/>
-              <a:t>, a professor at the University of Montreal as well as co-founder of AI company </a:t>
-            </a:r>
-            <a:r>
-              <a:rPr lang="en-GB" dirty="0">
-                <a:hlinkClick r:id="rId8" tooltip="Company Overview"/>
-              </a:rPr>
-              <a:t>Element AI Inc.</a:t>
-            </a:r>
-            <a:r>
-              <a:rPr lang="en-GB" dirty="0"/>
-              <a:t> </a:t>
-            </a:r>
-          </a:p>
-        </p:txBody>
-      </p:sp>
+      </p:pic>
     </p:spTree>
     <p:extLst>
       <p:ext uri="{BB962C8B-B14F-4D97-AF65-F5344CB8AC3E}">
-        <p14:creationId xmlns:p14="http://schemas.microsoft.com/office/powerpoint/2010/main" val="1008068401"/>
+        <p14:creationId xmlns:p14="http://schemas.microsoft.com/office/powerpoint/2010/main" val="3537680052"/>
       </p:ext>
     </p:extLst>
   </p:cSld>

</xml_diff>

<commit_message>
redid the timeline,made it a diagram instead of text
</commit_message>
<xml_diff>
--- a/Research Methods in Computing Presentation.pptx
+++ b/Research Methods in Computing Presentation.pptx
@@ -15915,10 +15915,10 @@
       </p:pic>
       <p:pic>
         <p:nvPicPr>
-          <p:cNvPr id="2050" name="Picture 2">
+          <p:cNvPr id="2054" name="Picture 6" descr="Timeline logo - The Aleppo Project">
             <a:extLst>
               <a:ext uri="{FF2B5EF4-FFF2-40B4-BE49-F238E27FC236}">
-                <a16:creationId xmlns:a16="http://schemas.microsoft.com/office/drawing/2014/main" id="{A975A1DE-D819-430C-BBB3-37384E85C155}"/>
+                <a16:creationId xmlns:a16="http://schemas.microsoft.com/office/drawing/2014/main" id="{7E10271D-1EFF-4D9D-B4E8-817F101D3A5A}"/>
               </a:ext>
             </a:extLst>
           </p:cNvPr>
@@ -15942,64 +15942,8 @@
         </p:blipFill>
         <p:spPr bwMode="auto">
           <a:xfrm>
-            <a:off x="6202123" y="1943373"/>
-            <a:ext cx="3956341" cy="3700821"/>
-          </a:xfrm>
-          <a:prstGeom prst="rect">
-            <a:avLst/>
-          </a:prstGeom>
-          <a:ln>
-            <a:noFill/>
-          </a:ln>
-          <a:effectLst>
-            <a:outerShdw blurRad="190500" algn="tl" rotWithShape="0">
-              <a:srgbClr val="000000">
-                <a:alpha val="70000"/>
-              </a:srgbClr>
-            </a:outerShdw>
-          </a:effectLst>
-          <a:extLst>
-            <a:ext uri="{909E8E84-426E-40DD-AFC4-6F175D3DCCD1}">
-              <a14:hiddenFill xmlns:a14="http://schemas.microsoft.com/office/drawing/2010/main">
-                <a:solidFill>
-                  <a:srgbClr val="FFFFFF"/>
-                </a:solidFill>
-              </a14:hiddenFill>
-            </a:ext>
-          </a:extLst>
-        </p:spPr>
-      </p:pic>
-      <p:pic>
-        <p:nvPicPr>
-          <p:cNvPr id="2054" name="Picture 6" descr="Timeline logo - The Aleppo Project">
-            <a:extLst>
-              <a:ext uri="{FF2B5EF4-FFF2-40B4-BE49-F238E27FC236}">
-                <a16:creationId xmlns:a16="http://schemas.microsoft.com/office/drawing/2014/main" id="{7E10271D-1EFF-4D9D-B4E8-817F101D3A5A}"/>
-              </a:ext>
-            </a:extLst>
-          </p:cNvPr>
-          <p:cNvPicPr>
-            <a:picLocks noChangeAspect="1" noChangeArrowheads="1"/>
-          </p:cNvPicPr>
-          <p:nvPr/>
-        </p:nvPicPr>
-        <p:blipFill>
-          <a:blip r:embed="rId6">
-            <a:extLst>
-              <a:ext uri="{28A0092B-C50C-407E-A947-70E740481C1C}">
-                <a14:useLocalDpi xmlns:a14="http://schemas.microsoft.com/office/drawing/2010/main" val="0"/>
-              </a:ext>
-            </a:extLst>
-          </a:blip>
-          <a:srcRect/>
-          <a:stretch>
-            <a:fillRect/>
-          </a:stretch>
-        </p:blipFill>
-        <p:spPr bwMode="auto">
-          <a:xfrm>
-            <a:off x="593887" y="694952"/>
-            <a:ext cx="2162760" cy="769564"/>
+            <a:off x="593888" y="694953"/>
+            <a:ext cx="1880372" cy="669083"/>
           </a:xfrm>
           <a:prstGeom prst="rect">
             <a:avLst/>
@@ -16030,6 +15974,68 @@
               </a14:hiddenFill>
             </a:ext>
           </a:extLst>
+        </p:spPr>
+      </p:pic>
+      <p:pic>
+        <p:nvPicPr>
+          <p:cNvPr id="9" name="Picture 8" descr="A close up of a clock&#10;&#10;Description automatically generated">
+            <a:extLst>
+              <a:ext uri="{FF2B5EF4-FFF2-40B4-BE49-F238E27FC236}">
+                <a16:creationId xmlns:a16="http://schemas.microsoft.com/office/drawing/2014/main" id="{F0891F74-DBA4-441B-A83D-02E425D6C007}"/>
+              </a:ext>
+            </a:extLst>
+          </p:cNvPr>
+          <p:cNvPicPr>
+            <a:picLocks noChangeAspect="1"/>
+          </p:cNvPicPr>
+          <p:nvPr/>
+        </p:nvPicPr>
+        <p:blipFill>
+          <a:blip r:embed="rId6">
+            <a:extLst>
+              <a:ext uri="{28A0092B-C50C-407E-A947-70E740481C1C}">
+                <a14:useLocalDpi xmlns:a14="http://schemas.microsoft.com/office/drawing/2010/main" val="0"/>
+              </a:ext>
+            </a:extLst>
+          </a:blip>
+          <a:stretch>
+            <a:fillRect/>
+          </a:stretch>
+        </p:blipFill>
+        <p:spPr>
+          <a:xfrm>
+            <a:off x="5615920" y="1967845"/>
+            <a:ext cx="5507692" cy="3304615"/>
+          </a:xfrm>
+          <a:prstGeom prst="roundRect">
+            <a:avLst>
+              <a:gd name="adj" fmla="val 4167"/>
+            </a:avLst>
+          </a:prstGeom>
+          <a:solidFill>
+            <a:srgbClr val="FFFFFF"/>
+          </a:solidFill>
+          <a:ln w="76200" cap="sq">
+            <a:solidFill>
+              <a:srgbClr val="EAEAEA"/>
+            </a:solidFill>
+            <a:miter lim="800000"/>
+          </a:ln>
+          <a:effectLst>
+            <a:reflection blurRad="12700" stA="33000" endPos="28000" dist="5000" dir="5400000" sy="-100000" algn="bl" rotWithShape="0"/>
+          </a:effectLst>
+          <a:scene3d>
+            <a:camera prst="orthographicFront"/>
+            <a:lightRig rig="threePt" dir="t">
+              <a:rot lat="0" lon="0" rev="2700000"/>
+            </a:lightRig>
+          </a:scene3d>
+          <a:sp3d contourW="6350">
+            <a:bevelT h="38100"/>
+            <a:contourClr>
+              <a:srgbClr val="C0C0C0"/>
+            </a:contourClr>
+          </a:sp3d>
         </p:spPr>
       </p:pic>
     </p:spTree>

</xml_diff>

<commit_message>
added slide which indicates their contributions to AI
</commit_message>
<xml_diff>
--- a/Research Methods in Computing Presentation.pptx
+++ b/Research Methods in Computing Presentation.pptx
@@ -14560,7 +14560,7 @@
         </p:nvSpPr>
         <p:spPr>
           <a:xfrm>
-            <a:off x="1454958" y="1089212"/>
+            <a:off x="1431208" y="851004"/>
             <a:ext cx="4716276" cy="2980270"/>
           </a:xfrm>
         </p:spPr>
@@ -14684,7 +14684,7 @@
         </p:blipFill>
         <p:spPr>
           <a:xfrm>
-            <a:off x="727836" y="537973"/>
+            <a:off x="460641" y="392549"/>
             <a:ext cx="2304476" cy="2304476"/>
           </a:xfrm>
           <a:prstGeom prst="roundRect">
@@ -14793,7 +14793,7 @@
         </p:blipFill>
         <p:spPr bwMode="auto">
           <a:xfrm>
-            <a:off x="2295529" y="4385411"/>
+            <a:off x="2139316" y="5025794"/>
             <a:ext cx="2867025" cy="247650"/>
           </a:xfrm>
           <a:prstGeom prst="roundRect">
@@ -14827,6 +14827,42 @@
           </a:sp3d>
         </p:spPr>
       </p:pic>
+      <p:sp>
+        <p:nvSpPr>
+          <p:cNvPr id="3" name="TextBox 2">
+            <a:extLst>
+              <a:ext uri="{FF2B5EF4-FFF2-40B4-BE49-F238E27FC236}">
+                <a16:creationId xmlns:a16="http://schemas.microsoft.com/office/drawing/2014/main" id="{70229479-33F4-448C-BDCD-FEB2C24733F5}"/>
+              </a:ext>
+            </a:extLst>
+          </p:cNvPr>
+          <p:cNvSpPr txBox="1"/>
+          <p:nvPr/>
+        </p:nvSpPr>
+        <p:spPr>
+          <a:xfrm>
+            <a:off x="1868200" y="3744749"/>
+            <a:ext cx="3493510" cy="1200329"/>
+          </a:xfrm>
+          <a:prstGeom prst="rect">
+            <a:avLst/>
+          </a:prstGeom>
+          <a:noFill/>
+        </p:spPr>
+        <p:txBody>
+          <a:bodyPr wrap="square" rtlCol="0">
+            <a:spAutoFit/>
+          </a:bodyPr>
+          <a:lstStyle/>
+          <a:p>
+            <a:pPr algn="ctr"/>
+            <a:r>
+              <a:rPr lang="en-GB" dirty="0"/>
+              <a:t>Given to those who contributed “ lasting and major technical importance to the computer field". </a:t>
+            </a:r>
+          </a:p>
+        </p:txBody>
+      </p:sp>
     </p:spTree>
     <p:extLst>
       <p:ext uri="{BB962C8B-B14F-4D97-AF65-F5344CB8AC3E}">
@@ -15196,8 +15232,8 @@
         </p:nvSpPr>
         <p:spPr>
           <a:xfrm>
-            <a:off x="2775899" y="-653714"/>
-            <a:ext cx="4798142" cy="3153753"/>
+            <a:off x="840221" y="2567752"/>
+            <a:ext cx="4260231" cy="2526761"/>
           </a:xfrm>
         </p:spPr>
         <p:txBody>
@@ -15219,7 +15255,7 @@
                   <a:srgbClr val="EBEBEB"/>
                 </a:solidFill>
               </a:rPr>
-              <a:t>Their hard work achievements</a:t>
+              <a:t>Each Scientists Contribution</a:t>
             </a:r>
             <a:endParaRPr lang="en-US" sz="5400" b="0" i="0" kern="1200" dirty="0">
               <a:solidFill>
@@ -15316,8 +15352,8 @@
         </p:blipFill>
         <p:spPr>
           <a:xfrm>
-            <a:off x="770791" y="561734"/>
-            <a:ext cx="2053719" cy="2053719"/>
+            <a:off x="840221" y="648404"/>
+            <a:ext cx="1919349" cy="1919349"/>
           </a:xfrm>
           <a:prstGeom prst="roundRect">
             <a:avLst>
@@ -15335,10 +15371,10 @@
       </p:pic>
       <p:sp>
         <p:nvSpPr>
-          <p:cNvPr id="3" name="TextBox 2">
+          <p:cNvPr id="4" name="TextBox 3">
             <a:extLst>
               <a:ext uri="{FF2B5EF4-FFF2-40B4-BE49-F238E27FC236}">
-                <a16:creationId xmlns:a16="http://schemas.microsoft.com/office/drawing/2014/main" id="{B6A36904-43CD-4AD1-ABB7-0451E148CD3E}"/>
+                <a16:creationId xmlns:a16="http://schemas.microsoft.com/office/drawing/2014/main" id="{8A651019-F013-4242-847D-4EDBB673911E}"/>
               </a:ext>
             </a:extLst>
           </p:cNvPr>
@@ -15347,8 +15383,8 @@
         </p:nvSpPr>
         <p:spPr>
           <a:xfrm>
-            <a:off x="2499756" y="2939143"/>
-            <a:ext cx="6187044" cy="2031325"/>
+            <a:off x="1570709" y="3289465"/>
+            <a:ext cx="2505693" cy="2582883"/>
           </a:xfrm>
           <a:prstGeom prst="rect">
             <a:avLst/>
@@ -15361,64 +15397,66 @@
           </a:bodyPr>
           <a:lstStyle/>
           <a:p>
-            <a:pPr marL="285750" indent="-285750">
-              <a:buFont typeface="Arial" panose="020B0604020202020204" pitchFamily="34" charset="0"/>
-              <a:buChar char="•"/>
-            </a:pPr>
-            <a:r>
-              <a:rPr lang="en-GB" dirty="0"/>
-              <a:t>Invented the techniques underpinning today’s AI breakthroughs</a:t>
-            </a:r>
-          </a:p>
-          <a:p>
-            <a:pPr marL="285750" indent="-285750">
-              <a:buFont typeface="Arial" panose="020B0604020202020204" pitchFamily="34" charset="0"/>
-              <a:buChar char="•"/>
-            </a:pPr>
-            <a:r>
-              <a:rPr lang="en-GB" dirty="0"/>
-              <a:t>.</a:t>
-            </a:r>
-          </a:p>
-          <a:p>
-            <a:pPr marL="285750" indent="-285750">
-              <a:buFont typeface="Arial" panose="020B0604020202020204" pitchFamily="34" charset="0"/>
-              <a:buChar char="•"/>
-            </a:pPr>
-            <a:r>
-              <a:rPr lang="en-GB" dirty="0"/>
-              <a:t>.</a:t>
-            </a:r>
-          </a:p>
-          <a:p>
-            <a:pPr marL="285750" indent="-285750">
-              <a:buFont typeface="Arial" panose="020B0604020202020204" pitchFamily="34" charset="0"/>
-              <a:buChar char="•"/>
-            </a:pPr>
-            <a:r>
-              <a:rPr lang="en-GB" dirty="0"/>
-              <a:t>.</a:t>
-            </a:r>
-          </a:p>
-          <a:p>
-            <a:pPr marL="285750" indent="-285750">
-              <a:buFont typeface="Arial" panose="020B0604020202020204" pitchFamily="34" charset="0"/>
-              <a:buChar char="•"/>
-            </a:pPr>
-            <a:r>
-              <a:rPr lang="en-GB" dirty="0"/>
-              <a:t>.</a:t>
-            </a:r>
-          </a:p>
-          <a:p>
-            <a:pPr marL="285750" indent="-285750">
-              <a:buFont typeface="Arial" panose="020B0604020202020204" pitchFamily="34" charset="0"/>
-              <a:buChar char="•"/>
-            </a:pPr>
             <a:endParaRPr lang="en-GB" dirty="0"/>
           </a:p>
         </p:txBody>
       </p:sp>
+      <p:pic>
+        <p:nvPicPr>
+          <p:cNvPr id="8" name="Picture 7">
+            <a:extLst>
+              <a:ext uri="{FF2B5EF4-FFF2-40B4-BE49-F238E27FC236}">
+                <a16:creationId xmlns:a16="http://schemas.microsoft.com/office/drawing/2014/main" id="{9C86656F-FD91-40F2-8865-1756DF1C3B8A}"/>
+              </a:ext>
+            </a:extLst>
+          </p:cNvPr>
+          <p:cNvPicPr>
+            <a:picLocks noChangeAspect="1"/>
+          </p:cNvPicPr>
+          <p:nvPr/>
+        </p:nvPicPr>
+        <p:blipFill>
+          <a:blip r:embed="rId5"/>
+          <a:stretch>
+            <a:fillRect/>
+          </a:stretch>
+        </p:blipFill>
+        <p:spPr>
+          <a:xfrm>
+            <a:off x="5181590" y="1841204"/>
+            <a:ext cx="5868016" cy="4031144"/>
+          </a:xfrm>
+          <a:prstGeom prst="roundRect">
+            <a:avLst>
+              <a:gd name="adj" fmla="val 4167"/>
+            </a:avLst>
+          </a:prstGeom>
+          <a:solidFill>
+            <a:srgbClr val="FFFFFF"/>
+          </a:solidFill>
+          <a:ln w="76200" cap="sq">
+            <a:solidFill>
+              <a:srgbClr val="EAEAEA"/>
+            </a:solidFill>
+            <a:miter lim="800000"/>
+          </a:ln>
+          <a:effectLst>
+            <a:reflection blurRad="12700" stA="33000" endPos="28000" dist="5000" dir="5400000" sy="-100000" algn="bl" rotWithShape="0"/>
+          </a:effectLst>
+          <a:scene3d>
+            <a:camera prst="orthographicFront"/>
+            <a:lightRig rig="threePt" dir="t">
+              <a:rot lat="0" lon="0" rev="2700000"/>
+            </a:lightRig>
+          </a:scene3d>
+          <a:sp3d contourW="6350">
+            <a:bevelT h="38100"/>
+            <a:contourClr>
+              <a:srgbClr val="C0C0C0"/>
+            </a:contourClr>
+          </a:sp3d>
+        </p:spPr>
+      </p:pic>
     </p:spTree>
     <p:extLst>
       <p:ext uri="{BB962C8B-B14F-4D97-AF65-F5344CB8AC3E}">

</xml_diff>

<commit_message>
changed video for a picture
</commit_message>
<xml_diff>
--- a/Research Methods in Computing Presentation.pptx
+++ b/Research Methods in Computing Presentation.pptx
@@ -16175,7 +16175,7 @@
               <a:avLst/>
             </a:prstGeom>
             <a:blipFill>
-              <a:blip r:embed="rId4">
+              <a:blip r:embed="rId2">
                 <a:duotone>
                   <a:schemeClr val="dk2">
                     <a:shade val="69000"/>
@@ -16589,13 +16589,13 @@
           <p:nvPr/>
         </p:nvPicPr>
         <p:blipFill>
-          <a:blip r:embed="rId5">
+          <a:blip r:embed="rId3">
             <a:extLst>
               <a:ext uri="{28A0092B-C50C-407E-A947-70E740481C1C}">
                 <a14:useLocalDpi xmlns:a14="http://schemas.microsoft.com/office/drawing/2010/main" val="0"/>
               </a:ext>
               <a:ext uri="{96DAC541-7B7A-43D3-8B79-37D633B846F1}">
-                <asvg:svgBlip xmlns:asvg="http://schemas.microsoft.com/office/drawing/2016/SVG/main" r:embed="rId6"/>
+                <asvg:svgBlip xmlns:asvg="http://schemas.microsoft.com/office/drawing/2016/SVG/main" r:embed="rId4"/>
               </a:ext>
             </a:extLst>
           </a:blip>
@@ -16605,8 +16605,8 @@
         </p:blipFill>
         <p:spPr>
           <a:xfrm>
-            <a:off x="50462" y="450320"/>
-            <a:ext cx="3134031" cy="3134031"/>
+            <a:off x="50463" y="609225"/>
+            <a:ext cx="2975126" cy="2975126"/>
           </a:xfrm>
           <a:prstGeom prst="roundRect">
             <a:avLst>
@@ -16624,54 +16624,58 @@
       </p:pic>
       <p:pic>
         <p:nvPicPr>
-          <p:cNvPr id="4" name="AI EXAMPLE">
-            <a:hlinkClick r:id="" action="ppaction://media"/>
+          <p:cNvPr id="3" name="Picture 2">
             <a:extLst>
               <a:ext uri="{FF2B5EF4-FFF2-40B4-BE49-F238E27FC236}">
-                <a16:creationId xmlns:a16="http://schemas.microsoft.com/office/drawing/2014/main" id="{224EC0EA-8E49-4346-895F-89B8AA369EDF}"/>
+                <a16:creationId xmlns:a16="http://schemas.microsoft.com/office/drawing/2014/main" id="{D717BFCA-0CD6-4132-A094-F20D9BB8796D}"/>
               </a:ext>
             </a:extLst>
           </p:cNvPr>
           <p:cNvPicPr>
             <a:picLocks noChangeAspect="1"/>
           </p:cNvPicPr>
-          <p:nvPr>
-            <a:videoFile r:link="rId2"/>
-            <p:extLst>
-              <p:ext uri="{DAA4B4D4-6D71-4841-9C94-3DE7FCFB9230}">
-                <p14:media xmlns:p14="http://schemas.microsoft.com/office/powerpoint/2010/main" r:embed="rId1"/>
-              </p:ext>
-            </p:extLst>
-          </p:nvPr>
+          <p:nvPr/>
         </p:nvPicPr>
         <p:blipFill>
-          <a:blip r:embed="rId7"/>
+          <a:blip r:embed="rId5"/>
           <a:stretch>
             <a:fillRect/>
           </a:stretch>
         </p:blipFill>
         <p:spPr>
           <a:xfrm>
-            <a:off x="3440785" y="1774114"/>
-            <a:ext cx="7328946" cy="4122532"/>
+            <a:off x="3369426" y="1913993"/>
+            <a:ext cx="6911508" cy="4022883"/>
           </a:xfrm>
-          <a:prstGeom prst="rect">
-            <a:avLst/>
+          <a:prstGeom prst="roundRect">
+            <a:avLst>
+              <a:gd name="adj" fmla="val 4167"/>
+            </a:avLst>
           </a:prstGeom>
-          <a:ln w="38100" cap="sq">
+          <a:solidFill>
+            <a:srgbClr val="FFFFFF"/>
+          </a:solidFill>
+          <a:ln w="76200" cap="sq">
             <a:solidFill>
-              <a:srgbClr val="000000"/>
+              <a:srgbClr val="EAEAEA"/>
             </a:solidFill>
-            <a:prstDash val="solid"/>
             <a:miter lim="800000"/>
           </a:ln>
           <a:effectLst>
-            <a:outerShdw blurRad="50800" dist="38100" dir="2700000" algn="tl" rotWithShape="0">
-              <a:srgbClr val="000000">
-                <a:alpha val="43000"/>
-              </a:srgbClr>
-            </a:outerShdw>
+            <a:reflection blurRad="12700" stA="33000" endPos="28000" dist="5000" dir="5400000" sy="-100000" algn="bl" rotWithShape="0"/>
           </a:effectLst>
+          <a:scene3d>
+            <a:camera prst="orthographicFront"/>
+            <a:lightRig rig="threePt" dir="t">
+              <a:rot lat="0" lon="0" rev="2700000"/>
+            </a:lightRig>
+          </a:scene3d>
+          <a:sp3d contourW="6350">
+            <a:bevelT h="38100"/>
+            <a:contourClr>
+              <a:srgbClr val="C0C0C0"/>
+            </a:contourClr>
+          </a:sp3d>
         </p:spPr>
       </p:pic>
     </p:spTree>
@@ -16684,141 +16688,6 @@
   <p:clrMapOvr>
     <a:overrideClrMapping bg1="dk1" tx1="lt1" bg2="dk2" tx2="lt2" accent1="accent1" accent2="accent2" accent3="accent3" accent4="accent4" accent5="accent5" accent6="accent6" hlink="hlink" folHlink="folHlink"/>
   </p:clrMapOvr>
-  <p:timing>
-    <p:tnLst>
-      <p:par>
-        <p:cTn id="1" dur="indefinite" restart="never" nodeType="tmRoot">
-          <p:childTnLst>
-            <p:seq concurrent="1" nextAc="seek">
-              <p:cTn id="2" dur="indefinite" nodeType="mainSeq">
-                <p:childTnLst>
-                  <p:par>
-                    <p:cTn id="3" fill="hold">
-                      <p:stCondLst>
-                        <p:cond delay="indefinite"/>
-                      </p:stCondLst>
-                      <p:childTnLst>
-                        <p:par>
-                          <p:cTn id="4" fill="hold">
-                            <p:stCondLst>
-                              <p:cond delay="0"/>
-                            </p:stCondLst>
-                            <p:childTnLst>
-                              <p:par>
-                                <p:cTn id="5" presetID="1" presetClass="mediacall" presetSubtype="0" fill="hold" nodeType="clickEffect">
-                                  <p:stCondLst>
-                                    <p:cond delay="0"/>
-                                  </p:stCondLst>
-                                  <p:childTnLst>
-                                    <p:cmd type="call" cmd="playFrom(0.0)">
-                                      <p:cBhvr>
-                                        <p:cTn id="6" dur="39551" fill="hold"/>
-                                        <p:tgtEl>
-                                          <p:spTgt spid="4"/>
-                                        </p:tgtEl>
-                                      </p:cBhvr>
-                                    </p:cmd>
-                                  </p:childTnLst>
-                                </p:cTn>
-                              </p:par>
-                            </p:childTnLst>
-                          </p:cTn>
-                        </p:par>
-                      </p:childTnLst>
-                    </p:cTn>
-                  </p:par>
-                </p:childTnLst>
-              </p:cTn>
-              <p:prevCondLst>
-                <p:cond evt="onPrev" delay="0">
-                  <p:tgtEl>
-                    <p:sldTgt/>
-                  </p:tgtEl>
-                </p:cond>
-              </p:prevCondLst>
-              <p:nextCondLst>
-                <p:cond evt="onNext" delay="0">
-                  <p:tgtEl>
-                    <p:sldTgt/>
-                  </p:tgtEl>
-                </p:cond>
-              </p:nextCondLst>
-            </p:seq>
-            <p:video>
-              <p:cMediaNode vol="80000">
-                <p:cTn id="7" fill="hold" display="0">
-                  <p:stCondLst>
-                    <p:cond delay="indefinite"/>
-                  </p:stCondLst>
-                </p:cTn>
-                <p:tgtEl>
-                  <p:spTgt spid="4"/>
-                </p:tgtEl>
-              </p:cMediaNode>
-            </p:video>
-            <p:seq concurrent="1" nextAc="seek">
-              <p:cTn id="8" restart="whenNotActive" fill="hold" evtFilter="cancelBubble" nodeType="interactiveSeq">
-                <p:stCondLst>
-                  <p:cond evt="onClick" delay="0">
-                    <p:tgtEl>
-                      <p:spTgt spid="4"/>
-                    </p:tgtEl>
-                  </p:cond>
-                </p:stCondLst>
-                <p:endSync evt="end" delay="0">
-                  <p:rtn val="all"/>
-                </p:endSync>
-                <p:childTnLst>
-                  <p:par>
-                    <p:cTn id="9" fill="hold">
-                      <p:stCondLst>
-                        <p:cond delay="0"/>
-                      </p:stCondLst>
-                      <p:childTnLst>
-                        <p:par>
-                          <p:cTn id="10" fill="hold">
-                            <p:stCondLst>
-                              <p:cond delay="0"/>
-                            </p:stCondLst>
-                            <p:childTnLst>
-                              <p:par>
-                                <p:cTn id="11" presetID="2" presetClass="mediacall" presetSubtype="0" fill="hold" nodeType="clickEffect">
-                                  <p:stCondLst>
-                                    <p:cond delay="0"/>
-                                  </p:stCondLst>
-                                  <p:childTnLst>
-                                    <p:cmd type="call" cmd="togglePause">
-                                      <p:cBhvr>
-                                        <p:cTn id="12" dur="1" fill="hold"/>
-                                        <p:tgtEl>
-                                          <p:spTgt spid="4"/>
-                                        </p:tgtEl>
-                                      </p:cBhvr>
-                                    </p:cmd>
-                                  </p:childTnLst>
-                                </p:cTn>
-                              </p:par>
-                            </p:childTnLst>
-                          </p:cTn>
-                        </p:par>
-                      </p:childTnLst>
-                    </p:cTn>
-                  </p:par>
-                </p:childTnLst>
-              </p:cTn>
-              <p:nextCondLst>
-                <p:cond evt="onClick" delay="0">
-                  <p:tgtEl>
-                    <p:spTgt spid="4"/>
-                  </p:tgtEl>
-                </p:cond>
-              </p:nextCondLst>
-            </p:seq>
-          </p:childTnLst>
-        </p:cTn>
-      </p:par>
-    </p:tnLst>
-  </p:timing>
 </p:sld>
 </file>
 

</xml_diff>

<commit_message>
changed order of slides
</commit_message>
<xml_diff>
--- a/Research Methods in Computing Presentation.pptx
+++ b/Research Methods in Computing Presentation.pptx
@@ -7,9 +7,9 @@
   <p:sldIdLst>
     <p:sldId id="256" r:id="rId2"/>
     <p:sldId id="257" r:id="rId3"/>
-    <p:sldId id="260" r:id="rId4"/>
-    <p:sldId id="258" r:id="rId5"/>
-    <p:sldId id="259" r:id="rId6"/>
+    <p:sldId id="259" r:id="rId4"/>
+    <p:sldId id="260" r:id="rId5"/>
+    <p:sldId id="258" r:id="rId6"/>
     <p:sldId id="261" r:id="rId7"/>
   </p:sldIdLst>
   <p:sldSz cx="12192000" cy="6858000"/>
@@ -15137,6 +15137,608 @@
       </p:sp>
       <p:sp>
         <p:nvSpPr>
+          <p:cNvPr id="16" name="Rectangle 15">
+            <a:extLst>
+              <a:ext uri="{FF2B5EF4-FFF2-40B4-BE49-F238E27FC236}">
+                <a16:creationId xmlns:a16="http://schemas.microsoft.com/office/drawing/2014/main" id="{2B109C5B-3B98-48EB-A942-8D11CEA374B6}"/>
+              </a:ext>
+              <a:ext uri="{C183D7F6-B498-43B3-948B-1728B52AA6E4}">
+                <adec:decorative xmlns:adec="http://schemas.microsoft.com/office/drawing/2017/decorative" val="1"/>
+              </a:ext>
+            </a:extLst>
+          </p:cNvPr>
+          <p:cNvSpPr>
+            <a:spLocks noGrp="1" noRot="1" noChangeAspect="1" noMove="1" noResize="1" noEditPoints="1" noAdjustHandles="1" noChangeArrowheads="1" noChangeShapeType="1" noTextEdit="1"/>
+          </p:cNvSpPr>
+          <p:nvPr>
+            <p:extLst>
+              <p:ext uri="{386F3935-93C4-4BCD-93E2-E3B085C9AB24}">
+                <p16:designElem xmlns:p16="http://schemas.microsoft.com/office/powerpoint/2015/main" val="1"/>
+              </p:ext>
+            </p:extLst>
+          </p:nvPr>
+        </p:nvSpPr>
+        <p:spPr>
+          <a:xfrm>
+            <a:off x="0" y="793"/>
+            <a:ext cx="12192000" cy="6858000"/>
+          </a:xfrm>
+          <a:prstGeom prst="rect">
+            <a:avLst/>
+          </a:prstGeom>
+          <a:ln>
+            <a:noFill/>
+          </a:ln>
+        </p:spPr>
+        <p:style>
+          <a:lnRef idx="2">
+            <a:schemeClr val="accent1">
+              <a:shade val="50000"/>
+            </a:schemeClr>
+          </a:lnRef>
+          <a:fillRef idx="1003">
+            <a:schemeClr val="dk2"/>
+          </a:fillRef>
+          <a:effectRef idx="0">
+            <a:schemeClr val="accent1"/>
+          </a:effectRef>
+          <a:fontRef idx="minor">
+            <a:schemeClr val="lt1"/>
+          </a:fontRef>
+        </p:style>
+      </p:sp>
+      <p:sp>
+        <p:nvSpPr>
+          <p:cNvPr id="18" name="Freeform 5">
+            <a:extLst>
+              <a:ext uri="{FF2B5EF4-FFF2-40B4-BE49-F238E27FC236}">
+                <a16:creationId xmlns:a16="http://schemas.microsoft.com/office/drawing/2014/main" id="{A9C389E4-003E-40C9-AC9E-ED821C16F525}"/>
+              </a:ext>
+              <a:ext uri="{C183D7F6-B498-43B3-948B-1728B52AA6E4}">
+                <adec:decorative xmlns:adec="http://schemas.microsoft.com/office/drawing/2017/decorative" val="1"/>
+              </a:ext>
+            </a:extLst>
+          </p:cNvPr>
+          <p:cNvSpPr>
+            <a:spLocks noGrp="1" noRot="1" noChangeAspect="1" noMove="1" noResize="1" noEditPoints="1" noAdjustHandles="1" noChangeArrowheads="1" noChangeShapeType="1" noTextEdit="1"/>
+          </p:cNvSpPr>
+          <p:nvPr>
+            <p:extLst>
+              <p:ext uri="{386F3935-93C4-4BCD-93E2-E3B085C9AB24}">
+                <p16:designElem xmlns:p16="http://schemas.microsoft.com/office/powerpoint/2015/main" val="1"/>
+              </p:ext>
+            </p:extLst>
+          </p:nvPr>
+        </p:nvSpPr>
+        <p:spPr bwMode="gray">
+          <a:xfrm>
+            <a:off x="0" y="1587"/>
+            <a:ext cx="12192000" cy="6856413"/>
+          </a:xfrm>
+          <a:custGeom>
+            <a:avLst/>
+            <a:gdLst/>
+            <a:ahLst/>
+            <a:cxnLst/>
+            <a:rect l="0" t="0" r="r" b="b"/>
+            <a:pathLst>
+              <a:path w="15356" h="8638">
+                <a:moveTo>
+                  <a:pt x="0" y="0"/>
+                </a:moveTo>
+                <a:lnTo>
+                  <a:pt x="0" y="8638"/>
+                </a:lnTo>
+                <a:lnTo>
+                  <a:pt x="15356" y="8638"/>
+                </a:lnTo>
+                <a:lnTo>
+                  <a:pt x="15356" y="0"/>
+                </a:lnTo>
+                <a:lnTo>
+                  <a:pt x="0" y="0"/>
+                </a:lnTo>
+                <a:close/>
+                <a:moveTo>
+                  <a:pt x="14748" y="8038"/>
+                </a:moveTo>
+                <a:lnTo>
+                  <a:pt x="600" y="8038"/>
+                </a:lnTo>
+                <a:lnTo>
+                  <a:pt x="600" y="592"/>
+                </a:lnTo>
+                <a:lnTo>
+                  <a:pt x="14748" y="592"/>
+                </a:lnTo>
+                <a:lnTo>
+                  <a:pt x="14748" y="8038"/>
+                </a:lnTo>
+                <a:close/>
+              </a:path>
+            </a:pathLst>
+          </a:custGeom>
+          <a:solidFill>
+            <a:schemeClr val="tx1"/>
+          </a:solidFill>
+          <a:ln>
+            <a:noFill/>
+          </a:ln>
+        </p:spPr>
+      </p:sp>
+      <p:sp>
+        <p:nvSpPr>
+          <p:cNvPr id="20" name="Rectangle 19">
+            <a:extLst>
+              <a:ext uri="{FF2B5EF4-FFF2-40B4-BE49-F238E27FC236}">
+                <a16:creationId xmlns:a16="http://schemas.microsoft.com/office/drawing/2014/main" id="{6C042684-2705-40BD-9104-A6B24CE1CA45}"/>
+              </a:ext>
+              <a:ext uri="{C183D7F6-B498-43B3-948B-1728B52AA6E4}">
+                <adec:decorative xmlns:adec="http://schemas.microsoft.com/office/drawing/2017/decorative" val="1"/>
+              </a:ext>
+            </a:extLst>
+          </p:cNvPr>
+          <p:cNvSpPr>
+            <a:spLocks noGrp="1" noRot="1" noChangeAspect="1" noMove="1" noResize="1" noEditPoints="1" noAdjustHandles="1" noChangeArrowheads="1" noChangeShapeType="1" noTextEdit="1"/>
+          </p:cNvSpPr>
+          <p:nvPr>
+            <p:extLst>
+              <p:ext uri="{386F3935-93C4-4BCD-93E2-E3B085C9AB24}">
+                <p16:designElem xmlns:p16="http://schemas.microsoft.com/office/powerpoint/2015/main" val="1"/>
+              </p:ext>
+            </p:extLst>
+          </p:nvPr>
+        </p:nvSpPr>
+        <p:spPr>
+          <a:xfrm>
+            <a:off x="10437812" y="0"/>
+            <a:ext cx="685800" cy="1143000"/>
+          </a:xfrm>
+          <a:prstGeom prst="rect">
+            <a:avLst/>
+          </a:prstGeom>
+          <a:solidFill>
+            <a:schemeClr val="accent1"/>
+          </a:solidFill>
+          <a:ln>
+            <a:noFill/>
+          </a:ln>
+        </p:spPr>
+        <p:style>
+          <a:lnRef idx="1">
+            <a:schemeClr val="accent1"/>
+          </a:lnRef>
+          <a:fillRef idx="3">
+            <a:schemeClr val="accent1"/>
+          </a:fillRef>
+          <a:effectRef idx="2">
+            <a:schemeClr val="accent1"/>
+          </a:effectRef>
+          <a:fontRef idx="minor">
+            <a:schemeClr val="lt1"/>
+          </a:fontRef>
+        </p:style>
+      </p:sp>
+      <p:sp>
+        <p:nvSpPr>
+          <p:cNvPr id="2" name="Title 1">
+            <a:extLst>
+              <a:ext uri="{FF2B5EF4-FFF2-40B4-BE49-F238E27FC236}">
+                <a16:creationId xmlns:a16="http://schemas.microsoft.com/office/drawing/2014/main" id="{802A6C26-D287-4D18-8F0A-2B11293BB772}"/>
+              </a:ext>
+            </a:extLst>
+          </p:cNvPr>
+          <p:cNvSpPr>
+            <a:spLocks noGrp="1"/>
+          </p:cNvSpPr>
+          <p:nvPr>
+            <p:ph type="title"/>
+          </p:nvPr>
+        </p:nvSpPr>
+        <p:spPr>
+          <a:xfrm>
+            <a:off x="2509390" y="-1341062"/>
+            <a:ext cx="6268246" cy="3134032"/>
+          </a:xfrm>
+        </p:spPr>
+        <p:txBody>
+          <a:bodyPr vert="horz" lIns="91440" tIns="45720" rIns="91440" bIns="45720" rtlCol="0" anchor="b">
+            <a:normAutofit/>
+          </a:bodyPr>
+          <a:lstStyle/>
+          <a:p>
+            <a:r>
+              <a:rPr lang="en-US" sz="6600" b="0" i="0" kern="1200" dirty="0">
+                <a:solidFill>
+                  <a:srgbClr val="EBEBEB"/>
+                </a:solidFill>
+                <a:latin typeface="+mj-lt"/>
+                <a:ea typeface="+mj-ea"/>
+                <a:cs typeface="+mj-cs"/>
+              </a:rPr>
+              <a:t>AI EXAMPLE</a:t>
+            </a:r>
+          </a:p>
+        </p:txBody>
+      </p:sp>
+      <p:pic>
+        <p:nvPicPr>
+          <p:cNvPr id="7" name="Graphic 6" descr="Fingerprint">
+            <a:extLst>
+              <a:ext uri="{FF2B5EF4-FFF2-40B4-BE49-F238E27FC236}">
+                <a16:creationId xmlns:a16="http://schemas.microsoft.com/office/drawing/2014/main" id="{C77B2BFC-2E98-4D32-90FC-C0E2F8AA3936}"/>
+              </a:ext>
+            </a:extLst>
+          </p:cNvPr>
+          <p:cNvPicPr>
+            <a:picLocks noChangeAspect="1"/>
+          </p:cNvPicPr>
+          <p:nvPr/>
+        </p:nvPicPr>
+        <p:blipFill>
+          <a:blip r:embed="rId3">
+            <a:extLst>
+              <a:ext uri="{28A0092B-C50C-407E-A947-70E740481C1C}">
+                <a14:useLocalDpi xmlns:a14="http://schemas.microsoft.com/office/drawing/2010/main" val="0"/>
+              </a:ext>
+              <a:ext uri="{96DAC541-7B7A-43D3-8B79-37D633B846F1}">
+                <asvg:svgBlip xmlns:asvg="http://schemas.microsoft.com/office/drawing/2016/SVG/main" r:embed="rId4"/>
+              </a:ext>
+            </a:extLst>
+          </a:blip>
+          <a:stretch>
+            <a:fillRect/>
+          </a:stretch>
+        </p:blipFill>
+        <p:spPr>
+          <a:xfrm>
+            <a:off x="50463" y="609225"/>
+            <a:ext cx="2975126" cy="2975126"/>
+          </a:xfrm>
+          <a:prstGeom prst="roundRect">
+            <a:avLst>
+              <a:gd name="adj" fmla="val 1858"/>
+            </a:avLst>
+          </a:prstGeom>
+          <a:effectLst>
+            <a:outerShdw blurRad="50800" dist="50800" dir="5400000" algn="tl" rotWithShape="0">
+              <a:srgbClr val="000000">
+                <a:alpha val="43000"/>
+              </a:srgbClr>
+            </a:outerShdw>
+          </a:effectLst>
+        </p:spPr>
+      </p:pic>
+      <p:pic>
+        <p:nvPicPr>
+          <p:cNvPr id="3" name="Picture 2">
+            <a:extLst>
+              <a:ext uri="{FF2B5EF4-FFF2-40B4-BE49-F238E27FC236}">
+                <a16:creationId xmlns:a16="http://schemas.microsoft.com/office/drawing/2014/main" id="{D717BFCA-0CD6-4132-A094-F20D9BB8796D}"/>
+              </a:ext>
+            </a:extLst>
+          </p:cNvPr>
+          <p:cNvPicPr>
+            <a:picLocks noChangeAspect="1"/>
+          </p:cNvPicPr>
+          <p:nvPr/>
+        </p:nvPicPr>
+        <p:blipFill>
+          <a:blip r:embed="rId5"/>
+          <a:stretch>
+            <a:fillRect/>
+          </a:stretch>
+        </p:blipFill>
+        <p:spPr>
+          <a:xfrm>
+            <a:off x="3369426" y="1913993"/>
+            <a:ext cx="6911508" cy="4022883"/>
+          </a:xfrm>
+          <a:prstGeom prst="roundRect">
+            <a:avLst>
+              <a:gd name="adj" fmla="val 4167"/>
+            </a:avLst>
+          </a:prstGeom>
+          <a:solidFill>
+            <a:srgbClr val="FFFFFF"/>
+          </a:solidFill>
+          <a:ln w="76200" cap="sq">
+            <a:solidFill>
+              <a:srgbClr val="EAEAEA"/>
+            </a:solidFill>
+            <a:miter lim="800000"/>
+          </a:ln>
+          <a:effectLst>
+            <a:reflection blurRad="12700" stA="33000" endPos="28000" dist="5000" dir="5400000" sy="-100000" algn="bl" rotWithShape="0"/>
+          </a:effectLst>
+          <a:scene3d>
+            <a:camera prst="orthographicFront"/>
+            <a:lightRig rig="threePt" dir="t">
+              <a:rot lat="0" lon="0" rev="2700000"/>
+            </a:lightRig>
+          </a:scene3d>
+          <a:sp3d contourW="6350">
+            <a:bevelT h="38100"/>
+            <a:contourClr>
+              <a:srgbClr val="C0C0C0"/>
+            </a:contourClr>
+          </a:sp3d>
+        </p:spPr>
+      </p:pic>
+    </p:spTree>
+    <p:extLst>
+      <p:ext uri="{BB962C8B-B14F-4D97-AF65-F5344CB8AC3E}">
+        <p14:creationId xmlns:p14="http://schemas.microsoft.com/office/powerpoint/2010/main" val="1008068401"/>
+      </p:ext>
+    </p:extLst>
+  </p:cSld>
+  <p:clrMapOvr>
+    <a:overrideClrMapping bg1="dk1" tx1="lt1" bg2="dk2" tx2="lt2" accent1="accent1" accent2="accent2" accent3="accent3" accent4="accent4" accent5="accent5" accent6="accent6" hlink="hlink" folHlink="folHlink"/>
+  </p:clrMapOvr>
+</p:sld>
+</file>
+
+<file path=ppt/slides/slide4.xml><?xml version="1.0" encoding="utf-8"?>
+<p:sld xmlns:a="http://schemas.openxmlformats.org/drawingml/2006/main" xmlns:r="http://schemas.openxmlformats.org/officeDocument/2006/relationships" xmlns:p="http://schemas.openxmlformats.org/presentationml/2006/main">
+  <p:cSld>
+    <p:bg>
+      <p:bgPr>
+        <a:solidFill>
+          <a:schemeClr val="bg1"/>
+        </a:solidFill>
+        <a:effectLst/>
+      </p:bgPr>
+    </p:bg>
+    <p:spTree>
+      <p:nvGrpSpPr>
+        <p:cNvPr id="1" name=""/>
+        <p:cNvGrpSpPr/>
+        <p:nvPr/>
+      </p:nvGrpSpPr>
+      <p:grpSpPr>
+        <a:xfrm>
+          <a:off x="0" y="0"/>
+          <a:ext cx="0" cy="0"/>
+          <a:chOff x="0" y="0"/>
+          <a:chExt cx="0" cy="0"/>
+        </a:xfrm>
+      </p:grpSpPr>
+      <p:grpSp>
+        <p:nvGrpSpPr>
+          <p:cNvPr id="10" name="Group 9">
+            <a:extLst>
+              <a:ext uri="{FF2B5EF4-FFF2-40B4-BE49-F238E27FC236}">
+                <a16:creationId xmlns:a16="http://schemas.microsoft.com/office/drawing/2014/main" id="{4091D54B-59AB-4A5E-8E9E-0421BD66D4FB}"/>
+              </a:ext>
+              <a:ext uri="{C183D7F6-B498-43B3-948B-1728B52AA6E4}">
+                <adec:decorative xmlns:adec="http://schemas.microsoft.com/office/drawing/2017/decorative" val="1"/>
+              </a:ext>
+            </a:extLst>
+          </p:cNvPr>
+          <p:cNvGrpSpPr>
+            <a:grpSpLocks noGrp="1" noUngrp="1" noRot="1" noChangeAspect="1" noMove="1" noResize="1"/>
+          </p:cNvGrpSpPr>
+          <p:nvPr>
+            <p:extLst>
+              <p:ext uri="{386F3935-93C4-4BCD-93E2-E3B085C9AB24}">
+                <p16:designElem xmlns:p16="http://schemas.microsoft.com/office/powerpoint/2015/main" val="1"/>
+              </p:ext>
+            </p:extLst>
+          </p:nvPr>
+        </p:nvGrpSpPr>
+        <p:grpSpPr>
+          <a:xfrm>
+            <a:off x="0" y="0"/>
+            <a:ext cx="12192000" cy="6858000"/>
+            <a:chOff x="0" y="0"/>
+            <a:chExt cx="12192000" cy="6858000"/>
+          </a:xfrm>
+        </p:grpSpPr>
+        <p:sp>
+          <p:nvSpPr>
+            <p:cNvPr id="11" name="Rectangle 10">
+              <a:extLst>
+                <a:ext uri="{FF2B5EF4-FFF2-40B4-BE49-F238E27FC236}">
+                  <a16:creationId xmlns:a16="http://schemas.microsoft.com/office/drawing/2014/main" id="{547CE62E-FFFD-4A1F-BA78-C3B89C36FCA5}"/>
+                </a:ext>
+                <a:ext uri="{C183D7F6-B498-43B3-948B-1728B52AA6E4}">
+                  <adec:decorative xmlns:adec="http://schemas.microsoft.com/office/drawing/2017/decorative" val="1"/>
+                </a:ext>
+              </a:extLst>
+            </p:cNvPr>
+            <p:cNvSpPr/>
+            <p:nvPr>
+              <p:extLst>
+                <p:ext uri="{386F3935-93C4-4BCD-93E2-E3B085C9AB24}">
+                  <p16:designElem xmlns:p16="http://schemas.microsoft.com/office/powerpoint/2015/main" val="1"/>
+                </p:ext>
+              </p:extLst>
+            </p:nvPr>
+          </p:nvSpPr>
+          <p:spPr>
+            <a:xfrm>
+              <a:off x="0" y="0"/>
+              <a:ext cx="12192000" cy="6858000"/>
+            </a:xfrm>
+            <a:prstGeom prst="rect">
+              <a:avLst/>
+            </a:prstGeom>
+            <a:blipFill>
+              <a:blip r:embed="rId2">
+                <a:duotone>
+                  <a:schemeClr val="dk2">
+                    <a:shade val="69000"/>
+                    <a:hueMod val="91000"/>
+                    <a:satMod val="164000"/>
+                    <a:lumMod val="74000"/>
+                  </a:schemeClr>
+                  <a:schemeClr val="dk2">
+                    <a:hueMod val="124000"/>
+                    <a:satMod val="140000"/>
+                    <a:lumMod val="142000"/>
+                  </a:schemeClr>
+                </a:duotone>
+              </a:blip>
+              <a:stretch>
+                <a:fillRect/>
+              </a:stretch>
+            </a:blipFill>
+            <a:ln>
+              <a:noFill/>
+            </a:ln>
+          </p:spPr>
+          <p:style>
+            <a:lnRef idx="2">
+              <a:schemeClr val="accent1">
+                <a:shade val="50000"/>
+              </a:schemeClr>
+            </a:lnRef>
+            <a:fillRef idx="1">
+              <a:schemeClr val="accent1"/>
+            </a:fillRef>
+            <a:effectRef idx="0">
+              <a:schemeClr val="accent1"/>
+            </a:effectRef>
+            <a:fontRef idx="minor">
+              <a:schemeClr val="lt1"/>
+            </a:fontRef>
+          </p:style>
+        </p:sp>
+        <p:sp>
+          <p:nvSpPr>
+            <p:cNvPr id="12" name="Freeform 5">
+              <a:extLst>
+                <a:ext uri="{FF2B5EF4-FFF2-40B4-BE49-F238E27FC236}">
+                  <a16:creationId xmlns:a16="http://schemas.microsoft.com/office/drawing/2014/main" id="{AE51FD27-6B6A-4D21-BF22-245DA9BD0B3E}"/>
+                </a:ext>
+                <a:ext uri="{C183D7F6-B498-43B3-948B-1728B52AA6E4}">
+                  <adec:decorative xmlns:adec="http://schemas.microsoft.com/office/drawing/2017/decorative" val="1"/>
+                </a:ext>
+              </a:extLst>
+            </p:cNvPr>
+            <p:cNvSpPr>
+              <a:spLocks noEditPoints="1"/>
+            </p:cNvSpPr>
+            <p:nvPr>
+              <p:extLst>
+                <p:ext uri="{386F3935-93C4-4BCD-93E2-E3B085C9AB24}">
+                  <p16:designElem xmlns:p16="http://schemas.microsoft.com/office/powerpoint/2015/main" val="1"/>
+                </p:ext>
+              </p:extLst>
+            </p:nvPr>
+          </p:nvSpPr>
+          <p:spPr bwMode="gray">
+            <a:xfrm>
+              <a:off x="0" y="1587"/>
+              <a:ext cx="12192000" cy="6856413"/>
+            </a:xfrm>
+            <a:custGeom>
+              <a:avLst/>
+              <a:gdLst/>
+              <a:ahLst/>
+              <a:cxnLst/>
+              <a:rect l="0" t="0" r="r" b="b"/>
+              <a:pathLst>
+                <a:path w="15356" h="8638">
+                  <a:moveTo>
+                    <a:pt x="0" y="0"/>
+                  </a:moveTo>
+                  <a:lnTo>
+                    <a:pt x="0" y="8638"/>
+                  </a:lnTo>
+                  <a:lnTo>
+                    <a:pt x="15356" y="8638"/>
+                  </a:lnTo>
+                  <a:lnTo>
+                    <a:pt x="15356" y="0"/>
+                  </a:lnTo>
+                  <a:lnTo>
+                    <a:pt x="0" y="0"/>
+                  </a:lnTo>
+                  <a:close/>
+                  <a:moveTo>
+                    <a:pt x="14748" y="8038"/>
+                  </a:moveTo>
+                  <a:lnTo>
+                    <a:pt x="600" y="8038"/>
+                  </a:lnTo>
+                  <a:lnTo>
+                    <a:pt x="600" y="592"/>
+                  </a:lnTo>
+                  <a:lnTo>
+                    <a:pt x="14748" y="592"/>
+                  </a:lnTo>
+                  <a:lnTo>
+                    <a:pt x="14748" y="8038"/>
+                  </a:lnTo>
+                  <a:close/>
+                </a:path>
+              </a:pathLst>
+            </a:custGeom>
+            <a:solidFill>
+              <a:schemeClr val="bg1"/>
+            </a:solidFill>
+            <a:ln>
+              <a:noFill/>
+            </a:ln>
+          </p:spPr>
+        </p:sp>
+      </p:grpSp>
+      <p:sp>
+        <p:nvSpPr>
+          <p:cNvPr id="14" name="Rectangle 13">
+            <a:extLst>
+              <a:ext uri="{FF2B5EF4-FFF2-40B4-BE49-F238E27FC236}">
+                <a16:creationId xmlns:a16="http://schemas.microsoft.com/office/drawing/2014/main" id="{B8144315-1C5A-4185-A952-25D98D303D46}"/>
+              </a:ext>
+              <a:ext uri="{C183D7F6-B498-43B3-948B-1728B52AA6E4}">
+                <adec:decorative xmlns:adec="http://schemas.microsoft.com/office/drawing/2017/decorative" val="1"/>
+              </a:ext>
+            </a:extLst>
+          </p:cNvPr>
+          <p:cNvSpPr>
+            <a:spLocks noGrp="1" noRot="1" noChangeAspect="1" noMove="1" noResize="1" noEditPoints="1" noAdjustHandles="1" noChangeArrowheads="1" noChangeShapeType="1" noTextEdit="1"/>
+          </p:cNvSpPr>
+          <p:nvPr>
+            <p:extLst>
+              <p:ext uri="{386F3935-93C4-4BCD-93E2-E3B085C9AB24}">
+                <p16:designElem xmlns:p16="http://schemas.microsoft.com/office/powerpoint/2015/main" val="1"/>
+              </p:ext>
+            </p:extLst>
+          </p:nvPr>
+        </p:nvSpPr>
+        <p:spPr>
+          <a:xfrm>
+            <a:off x="10437812" y="0"/>
+            <a:ext cx="685800" cy="1143000"/>
+          </a:xfrm>
+          <a:prstGeom prst="rect">
+            <a:avLst/>
+          </a:prstGeom>
+          <a:solidFill>
+            <a:schemeClr val="accent1"/>
+          </a:solidFill>
+          <a:ln>
+            <a:noFill/>
+          </a:ln>
+        </p:spPr>
+        <p:style>
+          <a:lnRef idx="1">
+            <a:schemeClr val="accent1"/>
+          </a:lnRef>
+          <a:fillRef idx="3">
+            <a:schemeClr val="accent1"/>
+          </a:fillRef>
+          <a:effectRef idx="2">
+            <a:schemeClr val="accent1"/>
+          </a:effectRef>
+          <a:fontRef idx="minor">
+            <a:schemeClr val="lt1"/>
+          </a:fontRef>
+        </p:style>
+      </p:sp>
+      <p:sp>
+        <p:nvSpPr>
           <p:cNvPr id="16" name="Freeform 5">
             <a:extLst>
               <a:ext uri="{FF2B5EF4-FFF2-40B4-BE49-F238E27FC236}">
@@ -15470,7 +16072,7 @@
 </p:sld>
 </file>
 
-<file path=ppt/slides/slide4.xml><?xml version="1.0" encoding="utf-8"?>
+<file path=ppt/slides/slide5.xml><?xml version="1.0" encoding="utf-8"?>
 <p:sld xmlns:a="http://schemas.openxmlformats.org/drawingml/2006/main" xmlns:r="http://schemas.openxmlformats.org/officeDocument/2006/relationships" xmlns:p="http://schemas.openxmlformats.org/presentationml/2006/main">
   <p:cSld>
     <p:bg>
@@ -16080,608 +16682,6 @@
     <p:extLst>
       <p:ext uri="{BB962C8B-B14F-4D97-AF65-F5344CB8AC3E}">
         <p14:creationId xmlns:p14="http://schemas.microsoft.com/office/powerpoint/2010/main" val="1137987216"/>
-      </p:ext>
-    </p:extLst>
-  </p:cSld>
-  <p:clrMapOvr>
-    <a:overrideClrMapping bg1="dk1" tx1="lt1" bg2="dk2" tx2="lt2" accent1="accent1" accent2="accent2" accent3="accent3" accent4="accent4" accent5="accent5" accent6="accent6" hlink="hlink" folHlink="folHlink"/>
-  </p:clrMapOvr>
-</p:sld>
-</file>
-
-<file path=ppt/slides/slide5.xml><?xml version="1.0" encoding="utf-8"?>
-<p:sld xmlns:a="http://schemas.openxmlformats.org/drawingml/2006/main" xmlns:r="http://schemas.openxmlformats.org/officeDocument/2006/relationships" xmlns:p="http://schemas.openxmlformats.org/presentationml/2006/main">
-  <p:cSld>
-    <p:bg>
-      <p:bgPr>
-        <a:solidFill>
-          <a:schemeClr val="bg1"/>
-        </a:solidFill>
-        <a:effectLst/>
-      </p:bgPr>
-    </p:bg>
-    <p:spTree>
-      <p:nvGrpSpPr>
-        <p:cNvPr id="1" name=""/>
-        <p:cNvGrpSpPr/>
-        <p:nvPr/>
-      </p:nvGrpSpPr>
-      <p:grpSpPr>
-        <a:xfrm>
-          <a:off x="0" y="0"/>
-          <a:ext cx="0" cy="0"/>
-          <a:chOff x="0" y="0"/>
-          <a:chExt cx="0" cy="0"/>
-        </a:xfrm>
-      </p:grpSpPr>
-      <p:grpSp>
-        <p:nvGrpSpPr>
-          <p:cNvPr id="10" name="Group 9">
-            <a:extLst>
-              <a:ext uri="{FF2B5EF4-FFF2-40B4-BE49-F238E27FC236}">
-                <a16:creationId xmlns:a16="http://schemas.microsoft.com/office/drawing/2014/main" id="{4091D54B-59AB-4A5E-8E9E-0421BD66D4FB}"/>
-              </a:ext>
-              <a:ext uri="{C183D7F6-B498-43B3-948B-1728B52AA6E4}">
-                <adec:decorative xmlns:adec="http://schemas.microsoft.com/office/drawing/2017/decorative" val="1"/>
-              </a:ext>
-            </a:extLst>
-          </p:cNvPr>
-          <p:cNvGrpSpPr>
-            <a:grpSpLocks noGrp="1" noUngrp="1" noRot="1" noChangeAspect="1" noMove="1" noResize="1"/>
-          </p:cNvGrpSpPr>
-          <p:nvPr>
-            <p:extLst>
-              <p:ext uri="{386F3935-93C4-4BCD-93E2-E3B085C9AB24}">
-                <p16:designElem xmlns:p16="http://schemas.microsoft.com/office/powerpoint/2015/main" val="1"/>
-              </p:ext>
-            </p:extLst>
-          </p:nvPr>
-        </p:nvGrpSpPr>
-        <p:grpSpPr>
-          <a:xfrm>
-            <a:off x="0" y="0"/>
-            <a:ext cx="12192000" cy="6858000"/>
-            <a:chOff x="0" y="0"/>
-            <a:chExt cx="12192000" cy="6858000"/>
-          </a:xfrm>
-        </p:grpSpPr>
-        <p:sp>
-          <p:nvSpPr>
-            <p:cNvPr id="11" name="Rectangle 10">
-              <a:extLst>
-                <a:ext uri="{FF2B5EF4-FFF2-40B4-BE49-F238E27FC236}">
-                  <a16:creationId xmlns:a16="http://schemas.microsoft.com/office/drawing/2014/main" id="{547CE62E-FFFD-4A1F-BA78-C3B89C36FCA5}"/>
-                </a:ext>
-                <a:ext uri="{C183D7F6-B498-43B3-948B-1728B52AA6E4}">
-                  <adec:decorative xmlns:adec="http://schemas.microsoft.com/office/drawing/2017/decorative" val="1"/>
-                </a:ext>
-              </a:extLst>
-            </p:cNvPr>
-            <p:cNvSpPr/>
-            <p:nvPr>
-              <p:extLst>
-                <p:ext uri="{386F3935-93C4-4BCD-93E2-E3B085C9AB24}">
-                  <p16:designElem xmlns:p16="http://schemas.microsoft.com/office/powerpoint/2015/main" val="1"/>
-                </p:ext>
-              </p:extLst>
-            </p:nvPr>
-          </p:nvSpPr>
-          <p:spPr>
-            <a:xfrm>
-              <a:off x="0" y="0"/>
-              <a:ext cx="12192000" cy="6858000"/>
-            </a:xfrm>
-            <a:prstGeom prst="rect">
-              <a:avLst/>
-            </a:prstGeom>
-            <a:blipFill>
-              <a:blip r:embed="rId2">
-                <a:duotone>
-                  <a:schemeClr val="dk2">
-                    <a:shade val="69000"/>
-                    <a:hueMod val="91000"/>
-                    <a:satMod val="164000"/>
-                    <a:lumMod val="74000"/>
-                  </a:schemeClr>
-                  <a:schemeClr val="dk2">
-                    <a:hueMod val="124000"/>
-                    <a:satMod val="140000"/>
-                    <a:lumMod val="142000"/>
-                  </a:schemeClr>
-                </a:duotone>
-              </a:blip>
-              <a:stretch>
-                <a:fillRect/>
-              </a:stretch>
-            </a:blipFill>
-            <a:ln>
-              <a:noFill/>
-            </a:ln>
-          </p:spPr>
-          <p:style>
-            <a:lnRef idx="2">
-              <a:schemeClr val="accent1">
-                <a:shade val="50000"/>
-              </a:schemeClr>
-            </a:lnRef>
-            <a:fillRef idx="1">
-              <a:schemeClr val="accent1"/>
-            </a:fillRef>
-            <a:effectRef idx="0">
-              <a:schemeClr val="accent1"/>
-            </a:effectRef>
-            <a:fontRef idx="minor">
-              <a:schemeClr val="lt1"/>
-            </a:fontRef>
-          </p:style>
-        </p:sp>
-        <p:sp>
-          <p:nvSpPr>
-            <p:cNvPr id="12" name="Freeform 5">
-              <a:extLst>
-                <a:ext uri="{FF2B5EF4-FFF2-40B4-BE49-F238E27FC236}">
-                  <a16:creationId xmlns:a16="http://schemas.microsoft.com/office/drawing/2014/main" id="{AE51FD27-6B6A-4D21-BF22-245DA9BD0B3E}"/>
-                </a:ext>
-                <a:ext uri="{C183D7F6-B498-43B3-948B-1728B52AA6E4}">
-                  <adec:decorative xmlns:adec="http://schemas.microsoft.com/office/drawing/2017/decorative" val="1"/>
-                </a:ext>
-              </a:extLst>
-            </p:cNvPr>
-            <p:cNvSpPr>
-              <a:spLocks noEditPoints="1"/>
-            </p:cNvSpPr>
-            <p:nvPr>
-              <p:extLst>
-                <p:ext uri="{386F3935-93C4-4BCD-93E2-E3B085C9AB24}">
-                  <p16:designElem xmlns:p16="http://schemas.microsoft.com/office/powerpoint/2015/main" val="1"/>
-                </p:ext>
-              </p:extLst>
-            </p:nvPr>
-          </p:nvSpPr>
-          <p:spPr bwMode="gray">
-            <a:xfrm>
-              <a:off x="0" y="1587"/>
-              <a:ext cx="12192000" cy="6856413"/>
-            </a:xfrm>
-            <a:custGeom>
-              <a:avLst/>
-              <a:gdLst/>
-              <a:ahLst/>
-              <a:cxnLst/>
-              <a:rect l="0" t="0" r="r" b="b"/>
-              <a:pathLst>
-                <a:path w="15356" h="8638">
-                  <a:moveTo>
-                    <a:pt x="0" y="0"/>
-                  </a:moveTo>
-                  <a:lnTo>
-                    <a:pt x="0" y="8638"/>
-                  </a:lnTo>
-                  <a:lnTo>
-                    <a:pt x="15356" y="8638"/>
-                  </a:lnTo>
-                  <a:lnTo>
-                    <a:pt x="15356" y="0"/>
-                  </a:lnTo>
-                  <a:lnTo>
-                    <a:pt x="0" y="0"/>
-                  </a:lnTo>
-                  <a:close/>
-                  <a:moveTo>
-                    <a:pt x="14748" y="8038"/>
-                  </a:moveTo>
-                  <a:lnTo>
-                    <a:pt x="600" y="8038"/>
-                  </a:lnTo>
-                  <a:lnTo>
-                    <a:pt x="600" y="592"/>
-                  </a:lnTo>
-                  <a:lnTo>
-                    <a:pt x="14748" y="592"/>
-                  </a:lnTo>
-                  <a:lnTo>
-                    <a:pt x="14748" y="8038"/>
-                  </a:lnTo>
-                  <a:close/>
-                </a:path>
-              </a:pathLst>
-            </a:custGeom>
-            <a:solidFill>
-              <a:schemeClr val="bg1"/>
-            </a:solidFill>
-            <a:ln>
-              <a:noFill/>
-            </a:ln>
-          </p:spPr>
-        </p:sp>
-      </p:grpSp>
-      <p:sp>
-        <p:nvSpPr>
-          <p:cNvPr id="14" name="Rectangle 13">
-            <a:extLst>
-              <a:ext uri="{FF2B5EF4-FFF2-40B4-BE49-F238E27FC236}">
-                <a16:creationId xmlns:a16="http://schemas.microsoft.com/office/drawing/2014/main" id="{B8144315-1C5A-4185-A952-25D98D303D46}"/>
-              </a:ext>
-              <a:ext uri="{C183D7F6-B498-43B3-948B-1728B52AA6E4}">
-                <adec:decorative xmlns:adec="http://schemas.microsoft.com/office/drawing/2017/decorative" val="1"/>
-              </a:ext>
-            </a:extLst>
-          </p:cNvPr>
-          <p:cNvSpPr>
-            <a:spLocks noGrp="1" noRot="1" noChangeAspect="1" noMove="1" noResize="1" noEditPoints="1" noAdjustHandles="1" noChangeArrowheads="1" noChangeShapeType="1" noTextEdit="1"/>
-          </p:cNvSpPr>
-          <p:nvPr>
-            <p:extLst>
-              <p:ext uri="{386F3935-93C4-4BCD-93E2-E3B085C9AB24}">
-                <p16:designElem xmlns:p16="http://schemas.microsoft.com/office/powerpoint/2015/main" val="1"/>
-              </p:ext>
-            </p:extLst>
-          </p:nvPr>
-        </p:nvSpPr>
-        <p:spPr>
-          <a:xfrm>
-            <a:off x="10437812" y="0"/>
-            <a:ext cx="685800" cy="1143000"/>
-          </a:xfrm>
-          <a:prstGeom prst="rect">
-            <a:avLst/>
-          </a:prstGeom>
-          <a:solidFill>
-            <a:schemeClr val="accent1"/>
-          </a:solidFill>
-          <a:ln>
-            <a:noFill/>
-          </a:ln>
-        </p:spPr>
-        <p:style>
-          <a:lnRef idx="1">
-            <a:schemeClr val="accent1"/>
-          </a:lnRef>
-          <a:fillRef idx="3">
-            <a:schemeClr val="accent1"/>
-          </a:fillRef>
-          <a:effectRef idx="2">
-            <a:schemeClr val="accent1"/>
-          </a:effectRef>
-          <a:fontRef idx="minor">
-            <a:schemeClr val="lt1"/>
-          </a:fontRef>
-        </p:style>
-      </p:sp>
-      <p:sp>
-        <p:nvSpPr>
-          <p:cNvPr id="16" name="Rectangle 15">
-            <a:extLst>
-              <a:ext uri="{FF2B5EF4-FFF2-40B4-BE49-F238E27FC236}">
-                <a16:creationId xmlns:a16="http://schemas.microsoft.com/office/drawing/2014/main" id="{2B109C5B-3B98-48EB-A942-8D11CEA374B6}"/>
-              </a:ext>
-              <a:ext uri="{C183D7F6-B498-43B3-948B-1728B52AA6E4}">
-                <adec:decorative xmlns:adec="http://schemas.microsoft.com/office/drawing/2017/decorative" val="1"/>
-              </a:ext>
-            </a:extLst>
-          </p:cNvPr>
-          <p:cNvSpPr>
-            <a:spLocks noGrp="1" noRot="1" noChangeAspect="1" noMove="1" noResize="1" noEditPoints="1" noAdjustHandles="1" noChangeArrowheads="1" noChangeShapeType="1" noTextEdit="1"/>
-          </p:cNvSpPr>
-          <p:nvPr>
-            <p:extLst>
-              <p:ext uri="{386F3935-93C4-4BCD-93E2-E3B085C9AB24}">
-                <p16:designElem xmlns:p16="http://schemas.microsoft.com/office/powerpoint/2015/main" val="1"/>
-              </p:ext>
-            </p:extLst>
-          </p:nvPr>
-        </p:nvSpPr>
-        <p:spPr>
-          <a:xfrm>
-            <a:off x="0" y="793"/>
-            <a:ext cx="12192000" cy="6858000"/>
-          </a:xfrm>
-          <a:prstGeom prst="rect">
-            <a:avLst/>
-          </a:prstGeom>
-          <a:ln>
-            <a:noFill/>
-          </a:ln>
-        </p:spPr>
-        <p:style>
-          <a:lnRef idx="2">
-            <a:schemeClr val="accent1">
-              <a:shade val="50000"/>
-            </a:schemeClr>
-          </a:lnRef>
-          <a:fillRef idx="1003">
-            <a:schemeClr val="dk2"/>
-          </a:fillRef>
-          <a:effectRef idx="0">
-            <a:schemeClr val="accent1"/>
-          </a:effectRef>
-          <a:fontRef idx="minor">
-            <a:schemeClr val="lt1"/>
-          </a:fontRef>
-        </p:style>
-      </p:sp>
-      <p:sp>
-        <p:nvSpPr>
-          <p:cNvPr id="18" name="Freeform 5">
-            <a:extLst>
-              <a:ext uri="{FF2B5EF4-FFF2-40B4-BE49-F238E27FC236}">
-                <a16:creationId xmlns:a16="http://schemas.microsoft.com/office/drawing/2014/main" id="{A9C389E4-003E-40C9-AC9E-ED821C16F525}"/>
-              </a:ext>
-              <a:ext uri="{C183D7F6-B498-43B3-948B-1728B52AA6E4}">
-                <adec:decorative xmlns:adec="http://schemas.microsoft.com/office/drawing/2017/decorative" val="1"/>
-              </a:ext>
-            </a:extLst>
-          </p:cNvPr>
-          <p:cNvSpPr>
-            <a:spLocks noGrp="1" noRot="1" noChangeAspect="1" noMove="1" noResize="1" noEditPoints="1" noAdjustHandles="1" noChangeArrowheads="1" noChangeShapeType="1" noTextEdit="1"/>
-          </p:cNvSpPr>
-          <p:nvPr>
-            <p:extLst>
-              <p:ext uri="{386F3935-93C4-4BCD-93E2-E3B085C9AB24}">
-                <p16:designElem xmlns:p16="http://schemas.microsoft.com/office/powerpoint/2015/main" val="1"/>
-              </p:ext>
-            </p:extLst>
-          </p:nvPr>
-        </p:nvSpPr>
-        <p:spPr bwMode="gray">
-          <a:xfrm>
-            <a:off x="0" y="1587"/>
-            <a:ext cx="12192000" cy="6856413"/>
-          </a:xfrm>
-          <a:custGeom>
-            <a:avLst/>
-            <a:gdLst/>
-            <a:ahLst/>
-            <a:cxnLst/>
-            <a:rect l="0" t="0" r="r" b="b"/>
-            <a:pathLst>
-              <a:path w="15356" h="8638">
-                <a:moveTo>
-                  <a:pt x="0" y="0"/>
-                </a:moveTo>
-                <a:lnTo>
-                  <a:pt x="0" y="8638"/>
-                </a:lnTo>
-                <a:lnTo>
-                  <a:pt x="15356" y="8638"/>
-                </a:lnTo>
-                <a:lnTo>
-                  <a:pt x="15356" y="0"/>
-                </a:lnTo>
-                <a:lnTo>
-                  <a:pt x="0" y="0"/>
-                </a:lnTo>
-                <a:close/>
-                <a:moveTo>
-                  <a:pt x="14748" y="8038"/>
-                </a:moveTo>
-                <a:lnTo>
-                  <a:pt x="600" y="8038"/>
-                </a:lnTo>
-                <a:lnTo>
-                  <a:pt x="600" y="592"/>
-                </a:lnTo>
-                <a:lnTo>
-                  <a:pt x="14748" y="592"/>
-                </a:lnTo>
-                <a:lnTo>
-                  <a:pt x="14748" y="8038"/>
-                </a:lnTo>
-                <a:close/>
-              </a:path>
-            </a:pathLst>
-          </a:custGeom>
-          <a:solidFill>
-            <a:schemeClr val="tx1"/>
-          </a:solidFill>
-          <a:ln>
-            <a:noFill/>
-          </a:ln>
-        </p:spPr>
-      </p:sp>
-      <p:sp>
-        <p:nvSpPr>
-          <p:cNvPr id="20" name="Rectangle 19">
-            <a:extLst>
-              <a:ext uri="{FF2B5EF4-FFF2-40B4-BE49-F238E27FC236}">
-                <a16:creationId xmlns:a16="http://schemas.microsoft.com/office/drawing/2014/main" id="{6C042684-2705-40BD-9104-A6B24CE1CA45}"/>
-              </a:ext>
-              <a:ext uri="{C183D7F6-B498-43B3-948B-1728B52AA6E4}">
-                <adec:decorative xmlns:adec="http://schemas.microsoft.com/office/drawing/2017/decorative" val="1"/>
-              </a:ext>
-            </a:extLst>
-          </p:cNvPr>
-          <p:cNvSpPr>
-            <a:spLocks noGrp="1" noRot="1" noChangeAspect="1" noMove="1" noResize="1" noEditPoints="1" noAdjustHandles="1" noChangeArrowheads="1" noChangeShapeType="1" noTextEdit="1"/>
-          </p:cNvSpPr>
-          <p:nvPr>
-            <p:extLst>
-              <p:ext uri="{386F3935-93C4-4BCD-93E2-E3B085C9AB24}">
-                <p16:designElem xmlns:p16="http://schemas.microsoft.com/office/powerpoint/2015/main" val="1"/>
-              </p:ext>
-            </p:extLst>
-          </p:nvPr>
-        </p:nvSpPr>
-        <p:spPr>
-          <a:xfrm>
-            <a:off x="10437812" y="0"/>
-            <a:ext cx="685800" cy="1143000"/>
-          </a:xfrm>
-          <a:prstGeom prst="rect">
-            <a:avLst/>
-          </a:prstGeom>
-          <a:solidFill>
-            <a:schemeClr val="accent1"/>
-          </a:solidFill>
-          <a:ln>
-            <a:noFill/>
-          </a:ln>
-        </p:spPr>
-        <p:style>
-          <a:lnRef idx="1">
-            <a:schemeClr val="accent1"/>
-          </a:lnRef>
-          <a:fillRef idx="3">
-            <a:schemeClr val="accent1"/>
-          </a:fillRef>
-          <a:effectRef idx="2">
-            <a:schemeClr val="accent1"/>
-          </a:effectRef>
-          <a:fontRef idx="minor">
-            <a:schemeClr val="lt1"/>
-          </a:fontRef>
-        </p:style>
-      </p:sp>
-      <p:sp>
-        <p:nvSpPr>
-          <p:cNvPr id="2" name="Title 1">
-            <a:extLst>
-              <a:ext uri="{FF2B5EF4-FFF2-40B4-BE49-F238E27FC236}">
-                <a16:creationId xmlns:a16="http://schemas.microsoft.com/office/drawing/2014/main" id="{802A6C26-D287-4D18-8F0A-2B11293BB772}"/>
-              </a:ext>
-            </a:extLst>
-          </p:cNvPr>
-          <p:cNvSpPr>
-            <a:spLocks noGrp="1"/>
-          </p:cNvSpPr>
-          <p:nvPr>
-            <p:ph type="title"/>
-          </p:nvPr>
-        </p:nvSpPr>
-        <p:spPr>
-          <a:xfrm>
-            <a:off x="2509390" y="-1341062"/>
-            <a:ext cx="6268246" cy="3134032"/>
-          </a:xfrm>
-        </p:spPr>
-        <p:txBody>
-          <a:bodyPr vert="horz" lIns="91440" tIns="45720" rIns="91440" bIns="45720" rtlCol="0" anchor="b">
-            <a:normAutofit/>
-          </a:bodyPr>
-          <a:lstStyle/>
-          <a:p>
-            <a:r>
-              <a:rPr lang="en-US" sz="6600" b="0" i="0" kern="1200" dirty="0">
-                <a:solidFill>
-                  <a:srgbClr val="EBEBEB"/>
-                </a:solidFill>
-                <a:latin typeface="+mj-lt"/>
-                <a:ea typeface="+mj-ea"/>
-                <a:cs typeface="+mj-cs"/>
-              </a:rPr>
-              <a:t>AI EXAMPLE</a:t>
-            </a:r>
-          </a:p>
-        </p:txBody>
-      </p:sp>
-      <p:pic>
-        <p:nvPicPr>
-          <p:cNvPr id="7" name="Graphic 6" descr="Fingerprint">
-            <a:extLst>
-              <a:ext uri="{FF2B5EF4-FFF2-40B4-BE49-F238E27FC236}">
-                <a16:creationId xmlns:a16="http://schemas.microsoft.com/office/drawing/2014/main" id="{C77B2BFC-2E98-4D32-90FC-C0E2F8AA3936}"/>
-              </a:ext>
-            </a:extLst>
-          </p:cNvPr>
-          <p:cNvPicPr>
-            <a:picLocks noChangeAspect="1"/>
-          </p:cNvPicPr>
-          <p:nvPr/>
-        </p:nvPicPr>
-        <p:blipFill>
-          <a:blip r:embed="rId3">
-            <a:extLst>
-              <a:ext uri="{28A0092B-C50C-407E-A947-70E740481C1C}">
-                <a14:useLocalDpi xmlns:a14="http://schemas.microsoft.com/office/drawing/2010/main" val="0"/>
-              </a:ext>
-              <a:ext uri="{96DAC541-7B7A-43D3-8B79-37D633B846F1}">
-                <asvg:svgBlip xmlns:asvg="http://schemas.microsoft.com/office/drawing/2016/SVG/main" r:embed="rId4"/>
-              </a:ext>
-            </a:extLst>
-          </a:blip>
-          <a:stretch>
-            <a:fillRect/>
-          </a:stretch>
-        </p:blipFill>
-        <p:spPr>
-          <a:xfrm>
-            <a:off x="50463" y="609225"/>
-            <a:ext cx="2975126" cy="2975126"/>
-          </a:xfrm>
-          <a:prstGeom prst="roundRect">
-            <a:avLst>
-              <a:gd name="adj" fmla="val 1858"/>
-            </a:avLst>
-          </a:prstGeom>
-          <a:effectLst>
-            <a:outerShdw blurRad="50800" dist="50800" dir="5400000" algn="tl" rotWithShape="0">
-              <a:srgbClr val="000000">
-                <a:alpha val="43000"/>
-              </a:srgbClr>
-            </a:outerShdw>
-          </a:effectLst>
-        </p:spPr>
-      </p:pic>
-      <p:pic>
-        <p:nvPicPr>
-          <p:cNvPr id="3" name="Picture 2">
-            <a:extLst>
-              <a:ext uri="{FF2B5EF4-FFF2-40B4-BE49-F238E27FC236}">
-                <a16:creationId xmlns:a16="http://schemas.microsoft.com/office/drawing/2014/main" id="{D717BFCA-0CD6-4132-A094-F20D9BB8796D}"/>
-              </a:ext>
-            </a:extLst>
-          </p:cNvPr>
-          <p:cNvPicPr>
-            <a:picLocks noChangeAspect="1"/>
-          </p:cNvPicPr>
-          <p:nvPr/>
-        </p:nvPicPr>
-        <p:blipFill>
-          <a:blip r:embed="rId5"/>
-          <a:stretch>
-            <a:fillRect/>
-          </a:stretch>
-        </p:blipFill>
-        <p:spPr>
-          <a:xfrm>
-            <a:off x="3369426" y="1913993"/>
-            <a:ext cx="6911508" cy="4022883"/>
-          </a:xfrm>
-          <a:prstGeom prst="roundRect">
-            <a:avLst>
-              <a:gd name="adj" fmla="val 4167"/>
-            </a:avLst>
-          </a:prstGeom>
-          <a:solidFill>
-            <a:srgbClr val="FFFFFF"/>
-          </a:solidFill>
-          <a:ln w="76200" cap="sq">
-            <a:solidFill>
-              <a:srgbClr val="EAEAEA"/>
-            </a:solidFill>
-            <a:miter lim="800000"/>
-          </a:ln>
-          <a:effectLst>
-            <a:reflection blurRad="12700" stA="33000" endPos="28000" dist="5000" dir="5400000" sy="-100000" algn="bl" rotWithShape="0"/>
-          </a:effectLst>
-          <a:scene3d>
-            <a:camera prst="orthographicFront"/>
-            <a:lightRig rig="threePt" dir="t">
-              <a:rot lat="0" lon="0" rev="2700000"/>
-            </a:lightRig>
-          </a:scene3d>
-          <a:sp3d contourW="6350">
-            <a:bevelT h="38100"/>
-            <a:contourClr>
-              <a:srgbClr val="C0C0C0"/>
-            </a:contourClr>
-          </a:sp3d>
-        </p:spPr>
-      </p:pic>
-    </p:spTree>
-    <p:extLst>
-      <p:ext uri="{BB962C8B-B14F-4D97-AF65-F5344CB8AC3E}">
-        <p14:creationId xmlns:p14="http://schemas.microsoft.com/office/powerpoint/2010/main" val="1008068401"/>
       </p:ext>
     </p:extLst>
   </p:cSld>

</xml_diff>

<commit_message>
Powerpoint Complete for Presentation
</commit_message>
<xml_diff>
--- a/Research Methods in Computing Presentation.pptx
+++ b/Research Methods in Computing Presentation.pptx
@@ -6,11 +6,13 @@
   </p:sldMasterIdLst>
   <p:sldIdLst>
     <p:sldId id="256" r:id="rId2"/>
-    <p:sldId id="257" r:id="rId3"/>
-    <p:sldId id="259" r:id="rId4"/>
-    <p:sldId id="260" r:id="rId5"/>
-    <p:sldId id="258" r:id="rId6"/>
-    <p:sldId id="261" r:id="rId7"/>
+    <p:sldId id="263" r:id="rId3"/>
+    <p:sldId id="257" r:id="rId4"/>
+    <p:sldId id="259" r:id="rId5"/>
+    <p:sldId id="260" r:id="rId6"/>
+    <p:sldId id="258" r:id="rId7"/>
+    <p:sldId id="262" r:id="rId8"/>
+    <p:sldId id="261" r:id="rId9"/>
   </p:sldIdLst>
   <p:sldSz cx="12192000" cy="6858000"/>
   <p:notesSz cx="6858000" cy="9144000"/>
@@ -452,7 +454,7 @@
           <a:p>
             <a:fld id="{990B45B9-6F7B-4A1C-ABF2-9469D9125292}" type="datetimeFigureOut">
               <a:rPr lang="en-GB" smtClean="0"/>
-              <a:t>05/12/2020</a:t>
+              <a:t>07/12/2020</a:t>
             </a:fld>
             <a:endParaRPr lang="en-GB"/>
           </a:p>
@@ -1540,7 +1542,7 @@
           <a:p>
             <a:fld id="{990B45B9-6F7B-4A1C-ABF2-9469D9125292}" type="datetimeFigureOut">
               <a:rPr lang="en-GB" smtClean="0"/>
-              <a:t>05/12/2020</a:t>
+              <a:t>07/12/2020</a:t>
             </a:fld>
             <a:endParaRPr lang="en-GB"/>
           </a:p>
@@ -2520,7 +2522,7 @@
           <a:p>
             <a:fld id="{990B45B9-6F7B-4A1C-ABF2-9469D9125292}" type="datetimeFigureOut">
               <a:rPr lang="en-GB" smtClean="0"/>
-              <a:t>05/12/2020</a:t>
+              <a:t>07/12/2020</a:t>
             </a:fld>
             <a:endParaRPr lang="en-GB"/>
           </a:p>
@@ -3654,7 +3656,7 @@
           <a:p>
             <a:fld id="{990B45B9-6F7B-4A1C-ABF2-9469D9125292}" type="datetimeFigureOut">
               <a:rPr lang="en-GB" smtClean="0"/>
-              <a:t>05/12/2020</a:t>
+              <a:t>07/12/2020</a:t>
             </a:fld>
             <a:endParaRPr lang="en-GB"/>
           </a:p>
@@ -4687,7 +4689,7 @@
           <a:p>
             <a:fld id="{990B45B9-6F7B-4A1C-ABF2-9469D9125292}" type="datetimeFigureOut">
               <a:rPr lang="en-GB" smtClean="0"/>
-              <a:t>05/12/2020</a:t>
+              <a:t>07/12/2020</a:t>
             </a:fld>
             <a:endParaRPr lang="en-GB"/>
           </a:p>
@@ -5347,7 +5349,7 @@
           <a:p>
             <a:fld id="{990B45B9-6F7B-4A1C-ABF2-9469D9125292}" type="datetimeFigureOut">
               <a:rPr lang="en-GB" smtClean="0"/>
-              <a:t>05/12/2020</a:t>
+              <a:t>07/12/2020</a:t>
             </a:fld>
             <a:endParaRPr lang="en-GB"/>
           </a:p>
@@ -6208,7 +6210,7 @@
           <a:p>
             <a:fld id="{990B45B9-6F7B-4A1C-ABF2-9469D9125292}" type="datetimeFigureOut">
               <a:rPr lang="en-GB" smtClean="0"/>
-              <a:t>05/12/2020</a:t>
+              <a:t>07/12/2020</a:t>
             </a:fld>
             <a:endParaRPr lang="en-GB"/>
           </a:p>
@@ -6398,7 +6400,7 @@
           <a:p>
             <a:fld id="{990B45B9-6F7B-4A1C-ABF2-9469D9125292}" type="datetimeFigureOut">
               <a:rPr lang="en-GB" smtClean="0"/>
-              <a:t>05/12/2020</a:t>
+              <a:t>07/12/2020</a:t>
             </a:fld>
             <a:endParaRPr lang="en-GB"/>
           </a:p>
@@ -7370,7 +7372,7 @@
           <a:p>
             <a:fld id="{990B45B9-6F7B-4A1C-ABF2-9469D9125292}" type="datetimeFigureOut">
               <a:rPr lang="en-GB" smtClean="0"/>
-              <a:t>05/12/2020</a:t>
+              <a:t>07/12/2020</a:t>
             </a:fld>
             <a:endParaRPr lang="en-GB"/>
           </a:p>
@@ -7581,7 +7583,7 @@
           <a:p>
             <a:fld id="{990B45B9-6F7B-4A1C-ABF2-9469D9125292}" type="datetimeFigureOut">
               <a:rPr lang="en-GB" smtClean="0"/>
-              <a:t>05/12/2020</a:t>
+              <a:t>07/12/2020</a:t>
             </a:fld>
             <a:endParaRPr lang="en-GB"/>
           </a:p>
@@ -8615,7 +8617,7 @@
           <a:p>
             <a:fld id="{990B45B9-6F7B-4A1C-ABF2-9469D9125292}" type="datetimeFigureOut">
               <a:rPr lang="en-GB" smtClean="0"/>
-              <a:t>05/12/2020</a:t>
+              <a:t>07/12/2020</a:t>
             </a:fld>
             <a:endParaRPr lang="en-GB"/>
           </a:p>
@@ -8887,7 +8889,7 @@
           <a:p>
             <a:fld id="{990B45B9-6F7B-4A1C-ABF2-9469D9125292}" type="datetimeFigureOut">
               <a:rPr lang="en-GB" smtClean="0"/>
-              <a:t>05/12/2020</a:t>
+              <a:t>07/12/2020</a:t>
             </a:fld>
             <a:endParaRPr lang="en-GB"/>
           </a:p>
@@ -9297,7 +9299,7 @@
           <a:p>
             <a:fld id="{990B45B9-6F7B-4A1C-ABF2-9469D9125292}" type="datetimeFigureOut">
               <a:rPr lang="en-GB" smtClean="0"/>
-              <a:t>05/12/2020</a:t>
+              <a:t>07/12/2020</a:t>
             </a:fld>
             <a:endParaRPr lang="en-GB"/>
           </a:p>
@@ -9424,7 +9426,7 @@
           <a:p>
             <a:fld id="{990B45B9-6F7B-4A1C-ABF2-9469D9125292}" type="datetimeFigureOut">
               <a:rPr lang="en-GB" smtClean="0"/>
-              <a:t>05/12/2020</a:t>
+              <a:t>07/12/2020</a:t>
             </a:fld>
             <a:endParaRPr lang="en-GB"/>
           </a:p>
@@ -9519,7 +9521,7 @@
           <a:p>
             <a:fld id="{990B45B9-6F7B-4A1C-ABF2-9469D9125292}" type="datetimeFigureOut">
               <a:rPr lang="en-GB" smtClean="0"/>
-              <a:t>05/12/2020</a:t>
+              <a:t>07/12/2020</a:t>
             </a:fld>
             <a:endParaRPr lang="en-GB"/>
           </a:p>
@@ -10600,7 +10602,7 @@
           <a:p>
             <a:fld id="{990B45B9-6F7B-4A1C-ABF2-9469D9125292}" type="datetimeFigureOut">
               <a:rPr lang="en-GB" smtClean="0"/>
-              <a:t>05/12/2020</a:t>
+              <a:t>07/12/2020</a:t>
             </a:fld>
             <a:endParaRPr lang="en-GB"/>
           </a:p>
@@ -11708,7 +11710,7 @@
           <a:p>
             <a:fld id="{990B45B9-6F7B-4A1C-ABF2-9469D9125292}" type="datetimeFigureOut">
               <a:rPr lang="en-GB" smtClean="0"/>
-              <a:t>05/12/2020</a:t>
+              <a:t>07/12/2020</a:t>
             </a:fld>
             <a:endParaRPr lang="en-GB"/>
           </a:p>
@@ -12705,7 +12707,7 @@
           <a:p>
             <a:fld id="{990B45B9-6F7B-4A1C-ABF2-9469D9125292}" type="datetimeFigureOut">
               <a:rPr lang="en-GB" smtClean="0"/>
-              <a:t>05/12/2020</a:t>
+              <a:t>07/12/2020</a:t>
             </a:fld>
             <a:endParaRPr lang="en-GB"/>
           </a:p>
@@ -14185,8 +14187,8 @@
               </a:lnSpc>
             </a:pPr>
             <a:r>
-              <a:rPr lang="en-GB" sz="3800"/>
-              <a:t>Research Methods in Computing Presentation</a:t>
+              <a:rPr lang="en-GB" sz="3800" dirty="0"/>
+              <a:t>Research Methods Presentation – “A Turning Award Winner”. </a:t>
             </a:r>
           </a:p>
         </p:txBody>
@@ -14205,6 +14207,819 @@
 </file>
 
 <file path=ppt/slides/slide2.xml><?xml version="1.0" encoding="utf-8"?>
+<p:sld xmlns:a="http://schemas.openxmlformats.org/drawingml/2006/main" xmlns:r="http://schemas.openxmlformats.org/officeDocument/2006/relationships" xmlns:p="http://schemas.openxmlformats.org/presentationml/2006/main">
+  <p:cSld>
+    <p:bg>
+      <p:bgPr>
+        <a:solidFill>
+          <a:schemeClr val="bg1"/>
+        </a:solidFill>
+        <a:effectLst/>
+      </p:bgPr>
+    </p:bg>
+    <p:spTree>
+      <p:nvGrpSpPr>
+        <p:cNvPr id="1" name=""/>
+        <p:cNvGrpSpPr/>
+        <p:nvPr/>
+      </p:nvGrpSpPr>
+      <p:grpSpPr>
+        <a:xfrm>
+          <a:off x="0" y="0"/>
+          <a:ext cx="0" cy="0"/>
+          <a:chOff x="0" y="0"/>
+          <a:chExt cx="0" cy="0"/>
+        </a:xfrm>
+      </p:grpSpPr>
+      <p:grpSp>
+        <p:nvGrpSpPr>
+          <p:cNvPr id="1028" name="Group 70">
+            <a:extLst>
+              <a:ext uri="{FF2B5EF4-FFF2-40B4-BE49-F238E27FC236}">
+                <a16:creationId xmlns:a16="http://schemas.microsoft.com/office/drawing/2014/main" id="{6503EB0F-2257-4A3E-A73B-E1DE769B459F}"/>
+              </a:ext>
+              <a:ext uri="{C183D7F6-B498-43B3-948B-1728B52AA6E4}">
+                <adec:decorative xmlns:adec="http://schemas.microsoft.com/office/drawing/2017/decorative" val="1"/>
+              </a:ext>
+            </a:extLst>
+          </p:cNvPr>
+          <p:cNvGrpSpPr>
+            <a:grpSpLocks noGrp="1" noUngrp="1" noRot="1" noChangeAspect="1" noMove="1" noResize="1"/>
+          </p:cNvGrpSpPr>
+          <p:nvPr>
+            <p:extLst>
+              <p:ext uri="{386F3935-93C4-4BCD-93E2-E3B085C9AB24}">
+                <p16:designElem xmlns:p16="http://schemas.microsoft.com/office/powerpoint/2015/main" val="1"/>
+              </p:ext>
+            </p:extLst>
+          </p:nvPr>
+        </p:nvGrpSpPr>
+        <p:grpSpPr>
+          <a:xfrm>
+            <a:off x="0" y="0"/>
+            <a:ext cx="12192000" cy="6858000"/>
+            <a:chOff x="0" y="0"/>
+            <a:chExt cx="12192000" cy="6858000"/>
+          </a:xfrm>
+        </p:grpSpPr>
+        <p:sp>
+          <p:nvSpPr>
+            <p:cNvPr id="72" name="Rectangle 71">
+              <a:extLst>
+                <a:ext uri="{FF2B5EF4-FFF2-40B4-BE49-F238E27FC236}">
+                  <a16:creationId xmlns:a16="http://schemas.microsoft.com/office/drawing/2014/main" id="{77012B2A-0D78-433A-8C68-8889D3DCDDAF}"/>
+                </a:ext>
+                <a:ext uri="{C183D7F6-B498-43B3-948B-1728B52AA6E4}">
+                  <adec:decorative xmlns:adec="http://schemas.microsoft.com/office/drawing/2017/decorative" val="1"/>
+                </a:ext>
+              </a:extLst>
+            </p:cNvPr>
+            <p:cNvSpPr/>
+            <p:nvPr>
+              <p:extLst>
+                <p:ext uri="{386F3935-93C4-4BCD-93E2-E3B085C9AB24}">
+                  <p16:designElem xmlns:p16="http://schemas.microsoft.com/office/powerpoint/2015/main" val="1"/>
+                </p:ext>
+              </p:extLst>
+            </p:nvPr>
+          </p:nvSpPr>
+          <p:spPr>
+            <a:xfrm>
+              <a:off x="0" y="0"/>
+              <a:ext cx="12192000" cy="6858000"/>
+            </a:xfrm>
+            <a:prstGeom prst="rect">
+              <a:avLst/>
+            </a:prstGeom>
+            <a:blipFill>
+              <a:blip r:embed="rId2">
+                <a:duotone>
+                  <a:schemeClr val="dk2">
+                    <a:shade val="69000"/>
+                    <a:hueMod val="91000"/>
+                    <a:satMod val="164000"/>
+                    <a:lumMod val="74000"/>
+                  </a:schemeClr>
+                  <a:schemeClr val="dk2">
+                    <a:hueMod val="124000"/>
+                    <a:satMod val="140000"/>
+                    <a:lumMod val="142000"/>
+                  </a:schemeClr>
+                </a:duotone>
+              </a:blip>
+              <a:stretch>
+                <a:fillRect/>
+              </a:stretch>
+            </a:blipFill>
+            <a:ln>
+              <a:noFill/>
+            </a:ln>
+          </p:spPr>
+          <p:style>
+            <a:lnRef idx="2">
+              <a:schemeClr val="accent1">
+                <a:shade val="50000"/>
+              </a:schemeClr>
+            </a:lnRef>
+            <a:fillRef idx="1">
+              <a:schemeClr val="accent1"/>
+            </a:fillRef>
+            <a:effectRef idx="0">
+              <a:schemeClr val="accent1"/>
+            </a:effectRef>
+            <a:fontRef idx="minor">
+              <a:schemeClr val="lt1"/>
+            </a:fontRef>
+          </p:style>
+        </p:sp>
+        <p:sp>
+          <p:nvSpPr>
+            <p:cNvPr id="73" name="Freeform 5">
+              <a:extLst>
+                <a:ext uri="{FF2B5EF4-FFF2-40B4-BE49-F238E27FC236}">
+                  <a16:creationId xmlns:a16="http://schemas.microsoft.com/office/drawing/2014/main" id="{119D0202-ED3F-47CC-90E9-4E963BCDAB91}"/>
+                </a:ext>
+                <a:ext uri="{C183D7F6-B498-43B3-948B-1728B52AA6E4}">
+                  <adec:decorative xmlns:adec="http://schemas.microsoft.com/office/drawing/2017/decorative" val="1"/>
+                </a:ext>
+              </a:extLst>
+            </p:cNvPr>
+            <p:cNvSpPr>
+              <a:spLocks noEditPoints="1"/>
+            </p:cNvSpPr>
+            <p:nvPr>
+              <p:extLst>
+                <p:ext uri="{386F3935-93C4-4BCD-93E2-E3B085C9AB24}">
+                  <p16:designElem xmlns:p16="http://schemas.microsoft.com/office/powerpoint/2015/main" val="1"/>
+                </p:ext>
+              </p:extLst>
+            </p:nvPr>
+          </p:nvSpPr>
+          <p:spPr bwMode="gray">
+            <a:xfrm>
+              <a:off x="0" y="1587"/>
+              <a:ext cx="12192000" cy="6856413"/>
+            </a:xfrm>
+            <a:custGeom>
+              <a:avLst/>
+              <a:gdLst/>
+              <a:ahLst/>
+              <a:cxnLst/>
+              <a:rect l="0" t="0" r="r" b="b"/>
+              <a:pathLst>
+                <a:path w="15356" h="8638">
+                  <a:moveTo>
+                    <a:pt x="0" y="0"/>
+                  </a:moveTo>
+                  <a:lnTo>
+                    <a:pt x="0" y="8638"/>
+                  </a:lnTo>
+                  <a:lnTo>
+                    <a:pt x="15356" y="8638"/>
+                  </a:lnTo>
+                  <a:lnTo>
+                    <a:pt x="15356" y="0"/>
+                  </a:lnTo>
+                  <a:lnTo>
+                    <a:pt x="0" y="0"/>
+                  </a:lnTo>
+                  <a:close/>
+                  <a:moveTo>
+                    <a:pt x="14748" y="8038"/>
+                  </a:moveTo>
+                  <a:lnTo>
+                    <a:pt x="600" y="8038"/>
+                  </a:lnTo>
+                  <a:lnTo>
+                    <a:pt x="600" y="592"/>
+                  </a:lnTo>
+                  <a:lnTo>
+                    <a:pt x="14748" y="592"/>
+                  </a:lnTo>
+                  <a:lnTo>
+                    <a:pt x="14748" y="8038"/>
+                  </a:lnTo>
+                  <a:close/>
+                </a:path>
+              </a:pathLst>
+            </a:custGeom>
+            <a:solidFill>
+              <a:schemeClr val="bg1"/>
+            </a:solidFill>
+            <a:ln>
+              <a:noFill/>
+            </a:ln>
+          </p:spPr>
+        </p:sp>
+      </p:grpSp>
+      <p:sp>
+        <p:nvSpPr>
+          <p:cNvPr id="1029" name="Rectangle 74">
+            <a:extLst>
+              <a:ext uri="{FF2B5EF4-FFF2-40B4-BE49-F238E27FC236}">
+                <a16:creationId xmlns:a16="http://schemas.microsoft.com/office/drawing/2014/main" id="{670D6F2B-93AF-47D6-9378-5E54BE0AC69F}"/>
+              </a:ext>
+              <a:ext uri="{C183D7F6-B498-43B3-948B-1728B52AA6E4}">
+                <adec:decorative xmlns:adec="http://schemas.microsoft.com/office/drawing/2017/decorative" val="1"/>
+              </a:ext>
+            </a:extLst>
+          </p:cNvPr>
+          <p:cNvSpPr>
+            <a:spLocks noGrp="1" noRot="1" noChangeAspect="1" noMove="1" noResize="1" noEditPoints="1" noAdjustHandles="1" noChangeArrowheads="1" noChangeShapeType="1" noTextEdit="1"/>
+          </p:cNvSpPr>
+          <p:nvPr>
+            <p:extLst>
+              <p:ext uri="{386F3935-93C4-4BCD-93E2-E3B085C9AB24}">
+                <p16:designElem xmlns:p16="http://schemas.microsoft.com/office/powerpoint/2015/main" val="1"/>
+              </p:ext>
+            </p:extLst>
+          </p:nvPr>
+        </p:nvSpPr>
+        <p:spPr>
+          <a:xfrm>
+            <a:off x="10437812" y="0"/>
+            <a:ext cx="685800" cy="1143000"/>
+          </a:xfrm>
+          <a:prstGeom prst="rect">
+            <a:avLst/>
+          </a:prstGeom>
+          <a:solidFill>
+            <a:schemeClr val="accent1"/>
+          </a:solidFill>
+          <a:ln>
+            <a:noFill/>
+          </a:ln>
+        </p:spPr>
+        <p:style>
+          <a:lnRef idx="1">
+            <a:schemeClr val="accent1"/>
+          </a:lnRef>
+          <a:fillRef idx="3">
+            <a:schemeClr val="accent1"/>
+          </a:fillRef>
+          <a:effectRef idx="2">
+            <a:schemeClr val="accent1"/>
+          </a:effectRef>
+          <a:fontRef idx="minor">
+            <a:schemeClr val="lt1"/>
+          </a:fontRef>
+        </p:style>
+      </p:sp>
+      <p:sp>
+        <p:nvSpPr>
+          <p:cNvPr id="1030" name="Freeform 5">
+            <a:extLst>
+              <a:ext uri="{FF2B5EF4-FFF2-40B4-BE49-F238E27FC236}">
+                <a16:creationId xmlns:a16="http://schemas.microsoft.com/office/drawing/2014/main" id="{2D529E20-662F-4915-ACD7-970C026FDB7F}"/>
+              </a:ext>
+              <a:ext uri="{C183D7F6-B498-43B3-948B-1728B52AA6E4}">
+                <adec:decorative xmlns:adec="http://schemas.microsoft.com/office/drawing/2017/decorative" val="1"/>
+              </a:ext>
+            </a:extLst>
+          </p:cNvPr>
+          <p:cNvSpPr>
+            <a:spLocks noGrp="1" noRot="1" noChangeAspect="1" noMove="1" noResize="1" noEditPoints="1" noAdjustHandles="1" noChangeArrowheads="1" noChangeShapeType="1" noTextEdit="1"/>
+          </p:cNvSpPr>
+          <p:nvPr>
+            <p:extLst>
+              <p:ext uri="{386F3935-93C4-4BCD-93E2-E3B085C9AB24}">
+                <p16:designElem xmlns:p16="http://schemas.microsoft.com/office/powerpoint/2015/main" val="1"/>
+              </p:ext>
+            </p:extLst>
+          </p:nvPr>
+        </p:nvSpPr>
+        <p:spPr bwMode="gray">
+          <a:xfrm rot="5677511" flipH="1">
+            <a:off x="3527283" y="1857885"/>
+            <a:ext cx="3299407" cy="440924"/>
+          </a:xfrm>
+          <a:custGeom>
+            <a:avLst/>
+            <a:gdLst/>
+            <a:ahLst/>
+            <a:cxnLst/>
+            <a:rect l="l" t="t" r="r" b="b"/>
+            <a:pathLst>
+              <a:path w="10000" h="5291">
+                <a:moveTo>
+                  <a:pt x="85" y="2532"/>
+                </a:moveTo>
+                <a:cubicBezTo>
+                  <a:pt x="1736" y="3911"/>
+                  <a:pt x="7524" y="5298"/>
+                  <a:pt x="9958" y="5291"/>
+                </a:cubicBezTo>
+                <a:cubicBezTo>
+                  <a:pt x="9989" y="1958"/>
+                  <a:pt x="9969" y="3333"/>
+                  <a:pt x="10000" y="0"/>
+                </a:cubicBezTo>
+                <a:lnTo>
+                  <a:pt x="10000" y="0"/>
+                </a:lnTo>
+                <a:lnTo>
+                  <a:pt x="9667" y="204"/>
+                </a:lnTo>
+                <a:lnTo>
+                  <a:pt x="9334" y="400"/>
+                </a:lnTo>
+                <a:lnTo>
+                  <a:pt x="9001" y="590"/>
+                </a:lnTo>
+                <a:lnTo>
+                  <a:pt x="8667" y="753"/>
+                </a:lnTo>
+                <a:lnTo>
+                  <a:pt x="8333" y="917"/>
+                </a:lnTo>
+                <a:lnTo>
+                  <a:pt x="7999" y="1071"/>
+                </a:lnTo>
+                <a:lnTo>
+                  <a:pt x="7669" y="1202"/>
+                </a:lnTo>
+                <a:lnTo>
+                  <a:pt x="7333" y="1325"/>
+                </a:lnTo>
+                <a:lnTo>
+                  <a:pt x="7000" y="1440"/>
+                </a:lnTo>
+                <a:lnTo>
+                  <a:pt x="6673" y="1538"/>
+                </a:lnTo>
+                <a:lnTo>
+                  <a:pt x="6340" y="1636"/>
+                </a:lnTo>
+                <a:lnTo>
+                  <a:pt x="6013" y="1719"/>
+                </a:lnTo>
+                <a:lnTo>
+                  <a:pt x="5686" y="1784"/>
+                </a:lnTo>
+                <a:lnTo>
+                  <a:pt x="5359" y="1850"/>
+                </a:lnTo>
+                <a:lnTo>
+                  <a:pt x="5036" y="1906"/>
+                </a:lnTo>
+                <a:lnTo>
+                  <a:pt x="4717" y="1948"/>
+                </a:lnTo>
+                <a:lnTo>
+                  <a:pt x="4396" y="1980"/>
+                </a:lnTo>
+                <a:lnTo>
+                  <a:pt x="4079" y="2013"/>
+                </a:lnTo>
+                <a:lnTo>
+                  <a:pt x="3766" y="2029"/>
+                </a:lnTo>
+                <a:lnTo>
+                  <a:pt x="3454" y="2046"/>
+                </a:lnTo>
+                <a:lnTo>
+                  <a:pt x="3145" y="2053"/>
+                </a:lnTo>
+                <a:lnTo>
+                  <a:pt x="2839" y="2046"/>
+                </a:lnTo>
+                <a:lnTo>
+                  <a:pt x="2537" y="2046"/>
+                </a:lnTo>
+                <a:lnTo>
+                  <a:pt x="2238" y="2029"/>
+                </a:lnTo>
+                <a:lnTo>
+                  <a:pt x="1943" y="2004"/>
+                </a:lnTo>
+                <a:lnTo>
+                  <a:pt x="1653" y="1980"/>
+                </a:lnTo>
+                <a:lnTo>
+                  <a:pt x="1368" y="1955"/>
+                </a:lnTo>
+                <a:lnTo>
+                  <a:pt x="1085" y="1915"/>
+                </a:lnTo>
+                <a:lnTo>
+                  <a:pt x="806" y="1873"/>
+                </a:lnTo>
+                <a:lnTo>
+                  <a:pt x="533" y="1833"/>
+                </a:lnTo>
+                <a:lnTo>
+                  <a:pt x="0" y="1726"/>
+                </a:lnTo>
+                <a:cubicBezTo>
+                  <a:pt x="28" y="1995"/>
+                  <a:pt x="57" y="2263"/>
+                  <a:pt x="85" y="2532"/>
+                </a:cubicBezTo>
+                <a:close/>
+              </a:path>
+            </a:pathLst>
+          </a:custGeom>
+          <a:solidFill>
+            <a:schemeClr val="bg1">
+              <a:alpha val="20000"/>
+            </a:schemeClr>
+          </a:solidFill>
+          <a:ln>
+            <a:noFill/>
+          </a:ln>
+        </p:spPr>
+      </p:sp>
+      <p:pic>
+        <p:nvPicPr>
+          <p:cNvPr id="1026" name="Picture 2" descr="Cognitive Computing and Artificial Intelligence Systems Market in  Healthcare Expected to Reach $16.1 billion by 2022 | Medgadget">
+            <a:extLst>
+              <a:ext uri="{FF2B5EF4-FFF2-40B4-BE49-F238E27FC236}">
+                <a16:creationId xmlns:a16="http://schemas.microsoft.com/office/drawing/2014/main" id="{9EA09BB5-1C67-4F3C-9BD2-6A3EACB15DAD}"/>
+              </a:ext>
+            </a:extLst>
+          </p:cNvPr>
+          <p:cNvPicPr>
+            <a:picLocks noChangeAspect="1" noChangeArrowheads="1"/>
+          </p:cNvPicPr>
+          <p:nvPr/>
+        </p:nvPicPr>
+        <p:blipFill rotWithShape="1">
+          <a:blip r:embed="rId3">
+            <a:extLst>
+              <a:ext uri="{28A0092B-C50C-407E-A947-70E740481C1C}">
+                <a14:useLocalDpi xmlns:a14="http://schemas.microsoft.com/office/drawing/2010/main" val="0"/>
+              </a:ext>
+            </a:extLst>
+          </a:blip>
+          <a:srcRect l="23077" r="22531"/>
+          <a:stretch/>
+        </p:blipFill>
+        <p:spPr bwMode="auto">
+          <a:xfrm>
+            <a:off x="423337" y="402166"/>
+            <a:ext cx="4932951" cy="6053670"/>
+          </a:xfrm>
+          <a:custGeom>
+            <a:avLst/>
+            <a:gdLst/>
+            <a:ahLst/>
+            <a:cxnLst/>
+            <a:rect l="l" t="t" r="r" b="b"/>
+            <a:pathLst>
+              <a:path w="4932951" h="6053670">
+                <a:moveTo>
+                  <a:pt x="0" y="0"/>
+                </a:moveTo>
+                <a:lnTo>
+                  <a:pt x="3678393" y="0"/>
+                </a:lnTo>
+                <a:lnTo>
+                  <a:pt x="4478865" y="0"/>
+                </a:lnTo>
+                <a:lnTo>
+                  <a:pt x="4931853" y="0"/>
+                </a:lnTo>
+                <a:lnTo>
+                  <a:pt x="4908487" y="137419"/>
+                </a:lnTo>
+                <a:lnTo>
+                  <a:pt x="4886218" y="274232"/>
+                </a:lnTo>
+                <a:lnTo>
+                  <a:pt x="4864421" y="411650"/>
+                </a:lnTo>
+                <a:lnTo>
+                  <a:pt x="4845759" y="549673"/>
+                </a:lnTo>
+                <a:lnTo>
+                  <a:pt x="4826941" y="687092"/>
+                </a:lnTo>
+                <a:lnTo>
+                  <a:pt x="4809377" y="825115"/>
+                </a:lnTo>
+                <a:lnTo>
+                  <a:pt x="4794322" y="961323"/>
+                </a:lnTo>
+                <a:lnTo>
+                  <a:pt x="4780052" y="1099347"/>
+                </a:lnTo>
+                <a:lnTo>
+                  <a:pt x="4767035" y="1236765"/>
+                </a:lnTo>
+                <a:lnTo>
+                  <a:pt x="4755744" y="1371761"/>
+                </a:lnTo>
+                <a:lnTo>
+                  <a:pt x="4744453" y="1508574"/>
+                </a:lnTo>
+                <a:lnTo>
+                  <a:pt x="4735044" y="1643572"/>
+                </a:lnTo>
+                <a:lnTo>
+                  <a:pt x="4727674" y="1778568"/>
+                </a:lnTo>
+                <a:lnTo>
+                  <a:pt x="4719990" y="1912960"/>
+                </a:lnTo>
+                <a:lnTo>
+                  <a:pt x="4713560" y="2046141"/>
+                </a:lnTo>
+                <a:lnTo>
+                  <a:pt x="4709012" y="2178111"/>
+                </a:lnTo>
+                <a:lnTo>
+                  <a:pt x="4705092" y="2310081"/>
+                </a:lnTo>
+                <a:lnTo>
+                  <a:pt x="4701328" y="2440840"/>
+                </a:lnTo>
+                <a:lnTo>
+                  <a:pt x="4699603" y="2569783"/>
+                </a:lnTo>
+                <a:lnTo>
+                  <a:pt x="4697721" y="2698726"/>
+                </a:lnTo>
+                <a:lnTo>
+                  <a:pt x="4696780" y="2825853"/>
+                </a:lnTo>
+                <a:lnTo>
+                  <a:pt x="4697721" y="2951770"/>
+                </a:lnTo>
+                <a:lnTo>
+                  <a:pt x="4697721" y="3076475"/>
+                </a:lnTo>
+                <a:lnTo>
+                  <a:pt x="4699603" y="3199970"/>
+                </a:lnTo>
+                <a:lnTo>
+                  <a:pt x="4702426" y="3321043"/>
+                </a:lnTo>
+                <a:lnTo>
+                  <a:pt x="4705092" y="3440906"/>
+                </a:lnTo>
+                <a:lnTo>
+                  <a:pt x="4708071" y="3558347"/>
+                </a:lnTo>
+                <a:lnTo>
+                  <a:pt x="4712619" y="3675183"/>
+                </a:lnTo>
+                <a:lnTo>
+                  <a:pt x="4717480" y="3790203"/>
+                </a:lnTo>
+                <a:lnTo>
+                  <a:pt x="4721871" y="3902801"/>
+                </a:lnTo>
+                <a:lnTo>
+                  <a:pt x="4734260" y="4122549"/>
+                </a:lnTo>
+                <a:lnTo>
+                  <a:pt x="4747433" y="4333217"/>
+                </a:lnTo>
+                <a:lnTo>
+                  <a:pt x="4761233" y="4535409"/>
+                </a:lnTo>
+                <a:lnTo>
+                  <a:pt x="4776445" y="4726705"/>
+                </a:lnTo>
+                <a:lnTo>
+                  <a:pt x="4792283" y="4909526"/>
+                </a:lnTo>
+                <a:lnTo>
+                  <a:pt x="4809377" y="5079029"/>
+                </a:lnTo>
+                <a:lnTo>
+                  <a:pt x="4826157" y="5238240"/>
+                </a:lnTo>
+                <a:lnTo>
+                  <a:pt x="4842936" y="5384739"/>
+                </a:lnTo>
+                <a:lnTo>
+                  <a:pt x="4858775" y="5519131"/>
+                </a:lnTo>
+                <a:lnTo>
+                  <a:pt x="4873830" y="5638388"/>
+                </a:lnTo>
+                <a:lnTo>
+                  <a:pt x="4888100" y="5746143"/>
+                </a:lnTo>
+                <a:lnTo>
+                  <a:pt x="4900019" y="5836948"/>
+                </a:lnTo>
+                <a:lnTo>
+                  <a:pt x="4911310" y="5913225"/>
+                </a:lnTo>
+                <a:lnTo>
+                  <a:pt x="4927462" y="6017953"/>
+                </a:lnTo>
+                <a:lnTo>
+                  <a:pt x="4932951" y="6053670"/>
+                </a:lnTo>
+                <a:lnTo>
+                  <a:pt x="4478865" y="6053670"/>
+                </a:lnTo>
+                <a:lnTo>
+                  <a:pt x="3683097" y="6053670"/>
+                </a:lnTo>
+                <a:lnTo>
+                  <a:pt x="0" y="6053670"/>
+                </a:lnTo>
+                <a:close/>
+              </a:path>
+            </a:pathLst>
+          </a:custGeom>
+          <a:noFill/>
+          <a:extLst>
+            <a:ext uri="{909E8E84-426E-40DD-AFC4-6F175D3DCCD1}">
+              <a14:hiddenFill xmlns:a14="http://schemas.microsoft.com/office/drawing/2010/main">
+                <a:solidFill>
+                  <a:srgbClr val="FFFFFF"/>
+                </a:solidFill>
+              </a14:hiddenFill>
+            </a:ext>
+          </a:extLst>
+        </p:spPr>
+      </p:pic>
+      <p:sp>
+        <p:nvSpPr>
+          <p:cNvPr id="79" name="Freeform 5">
+            <a:extLst>
+              <a:ext uri="{FF2B5EF4-FFF2-40B4-BE49-F238E27FC236}">
+                <a16:creationId xmlns:a16="http://schemas.microsoft.com/office/drawing/2014/main" id="{1AD5EB79-7F9A-4BBC-92A5-188382CBA1B6}"/>
+              </a:ext>
+              <a:ext uri="{C183D7F6-B498-43B3-948B-1728B52AA6E4}">
+                <adec:decorative xmlns:adec="http://schemas.microsoft.com/office/drawing/2017/decorative" val="1"/>
+              </a:ext>
+            </a:extLst>
+          </p:cNvPr>
+          <p:cNvSpPr>
+            <a:spLocks noGrp="1" noRot="1" noChangeAspect="1" noMove="1" noResize="1" noEditPoints="1" noAdjustHandles="1" noChangeArrowheads="1" noChangeShapeType="1" noTextEdit="1"/>
+          </p:cNvSpPr>
+          <p:nvPr>
+            <p:extLst>
+              <p:ext uri="{386F3935-93C4-4BCD-93E2-E3B085C9AB24}">
+                <p16:designElem xmlns:p16="http://schemas.microsoft.com/office/powerpoint/2015/main" val="1"/>
+              </p:ext>
+            </p:extLst>
+          </p:nvPr>
+        </p:nvSpPr>
+        <p:spPr bwMode="gray">
+          <a:xfrm>
+            <a:off x="0" y="1587"/>
+            <a:ext cx="12192000" cy="6856413"/>
+          </a:xfrm>
+          <a:custGeom>
+            <a:avLst/>
+            <a:gdLst/>
+            <a:ahLst/>
+            <a:cxnLst/>
+            <a:rect l="0" t="0" r="r" b="b"/>
+            <a:pathLst>
+              <a:path w="15356" h="8638">
+                <a:moveTo>
+                  <a:pt x="0" y="0"/>
+                </a:moveTo>
+                <a:lnTo>
+                  <a:pt x="0" y="8638"/>
+                </a:lnTo>
+                <a:lnTo>
+                  <a:pt x="15356" y="8638"/>
+                </a:lnTo>
+                <a:lnTo>
+                  <a:pt x="15356" y="0"/>
+                </a:lnTo>
+                <a:lnTo>
+                  <a:pt x="0" y="0"/>
+                </a:lnTo>
+                <a:close/>
+                <a:moveTo>
+                  <a:pt x="14748" y="8038"/>
+                </a:moveTo>
+                <a:lnTo>
+                  <a:pt x="600" y="8038"/>
+                </a:lnTo>
+                <a:lnTo>
+                  <a:pt x="600" y="592"/>
+                </a:lnTo>
+                <a:lnTo>
+                  <a:pt x="14748" y="592"/>
+                </a:lnTo>
+                <a:lnTo>
+                  <a:pt x="14748" y="8038"/>
+                </a:lnTo>
+                <a:close/>
+              </a:path>
+            </a:pathLst>
+          </a:custGeom>
+          <a:solidFill>
+            <a:schemeClr val="bg1"/>
+          </a:solidFill>
+          <a:ln>
+            <a:noFill/>
+          </a:ln>
+        </p:spPr>
+      </p:sp>
+      <p:sp>
+        <p:nvSpPr>
+          <p:cNvPr id="2" name="Title 1">
+            <a:extLst>
+              <a:ext uri="{FF2B5EF4-FFF2-40B4-BE49-F238E27FC236}">
+                <a16:creationId xmlns:a16="http://schemas.microsoft.com/office/drawing/2014/main" id="{2622F06F-7B59-45E5-B923-9B1336E202F1}"/>
+              </a:ext>
+            </a:extLst>
+          </p:cNvPr>
+          <p:cNvSpPr>
+            <a:spLocks noGrp="1"/>
+          </p:cNvSpPr>
+          <p:nvPr>
+            <p:ph type="title"/>
+          </p:nvPr>
+        </p:nvSpPr>
+        <p:spPr>
+          <a:xfrm>
+            <a:off x="5695061" y="1241266"/>
+            <a:ext cx="5428551" cy="3153753"/>
+          </a:xfrm>
+        </p:spPr>
+        <p:txBody>
+          <a:bodyPr vert="horz" lIns="91440" tIns="45720" rIns="91440" bIns="45720" rtlCol="0" anchor="b">
+            <a:normAutofit/>
+          </a:bodyPr>
+          <a:lstStyle/>
+          <a:p>
+            <a:r>
+              <a:rPr lang="en-US" sz="5400"/>
+              <a:t>Beginning Of A.I.</a:t>
+            </a:r>
+          </a:p>
+        </p:txBody>
+      </p:sp>
+      <p:sp>
+        <p:nvSpPr>
+          <p:cNvPr id="1031" name="Rectangle 80">
+            <a:extLst>
+              <a:ext uri="{FF2B5EF4-FFF2-40B4-BE49-F238E27FC236}">
+                <a16:creationId xmlns:a16="http://schemas.microsoft.com/office/drawing/2014/main" id="{B9B8A17F-DC3A-4D9A-AA53-9BFB894CD7BA}"/>
+              </a:ext>
+              <a:ext uri="{C183D7F6-B498-43B3-948B-1728B52AA6E4}">
+                <adec:decorative xmlns:adec="http://schemas.microsoft.com/office/drawing/2017/decorative" val="1"/>
+              </a:ext>
+            </a:extLst>
+          </p:cNvPr>
+          <p:cNvSpPr>
+            <a:spLocks noGrp="1" noRot="1" noChangeAspect="1" noMove="1" noResize="1" noEditPoints="1" noAdjustHandles="1" noChangeArrowheads="1" noChangeShapeType="1" noTextEdit="1"/>
+          </p:cNvSpPr>
+          <p:nvPr>
+            <p:extLst>
+              <p:ext uri="{386F3935-93C4-4BCD-93E2-E3B085C9AB24}">
+                <p16:designElem xmlns:p16="http://schemas.microsoft.com/office/powerpoint/2015/main" val="1"/>
+              </p:ext>
+            </p:extLst>
+          </p:nvPr>
+        </p:nvSpPr>
+        <p:spPr>
+          <a:xfrm>
+            <a:off x="10437812" y="0"/>
+            <a:ext cx="685800" cy="1143000"/>
+          </a:xfrm>
+          <a:prstGeom prst="rect">
+            <a:avLst/>
+          </a:prstGeom>
+          <a:solidFill>
+            <a:schemeClr val="accent1"/>
+          </a:solidFill>
+          <a:ln>
+            <a:noFill/>
+          </a:ln>
+        </p:spPr>
+        <p:style>
+          <a:lnRef idx="1">
+            <a:schemeClr val="accent1"/>
+          </a:lnRef>
+          <a:fillRef idx="3">
+            <a:schemeClr val="accent1"/>
+          </a:fillRef>
+          <a:effectRef idx="2">
+            <a:schemeClr val="accent1"/>
+          </a:effectRef>
+          <a:fontRef idx="minor">
+            <a:schemeClr val="lt1"/>
+          </a:fontRef>
+        </p:style>
+      </p:sp>
+    </p:spTree>
+    <p:extLst>
+      <p:ext uri="{BB962C8B-B14F-4D97-AF65-F5344CB8AC3E}">
+        <p14:creationId xmlns:p14="http://schemas.microsoft.com/office/powerpoint/2010/main" val="3600752339"/>
+      </p:ext>
+    </p:extLst>
+  </p:cSld>
+  <p:clrMapOvr>
+    <a:masterClrMapping/>
+  </p:clrMapOvr>
+</p:sld>
+</file>
+
+<file path=ppt/slides/slide3.xml><?xml version="1.0" encoding="utf-8"?>
 <p:sld xmlns:a="http://schemas.openxmlformats.org/drawingml/2006/main" xmlns:r="http://schemas.openxmlformats.org/officeDocument/2006/relationships" xmlns:p="http://schemas.openxmlformats.org/presentationml/2006/main">
   <p:cSld>
     <p:bg>
@@ -14876,7 +15691,7 @@
 </p:sld>
 </file>
 
-<file path=ppt/slides/slide3.xml><?xml version="1.0" encoding="utf-8"?>
+<file path=ppt/slides/slide4.xml><?xml version="1.0" encoding="utf-8"?>
 <p:sld xmlns:a="http://schemas.openxmlformats.org/drawingml/2006/main" xmlns:r="http://schemas.openxmlformats.org/officeDocument/2006/relationships" xmlns:p="http://schemas.openxmlformats.org/presentationml/2006/main">
   <p:cSld>
     <p:bg>
@@ -15478,7 +16293,7 @@
 </p:sld>
 </file>
 
-<file path=ppt/slides/slide4.xml><?xml version="1.0" encoding="utf-8"?>
+<file path=ppt/slides/slide5.xml><?xml version="1.0" encoding="utf-8"?>
 <p:sld xmlns:a="http://schemas.openxmlformats.org/drawingml/2006/main" xmlns:r="http://schemas.openxmlformats.org/officeDocument/2006/relationships" xmlns:p="http://schemas.openxmlformats.org/presentationml/2006/main">
   <p:cSld>
     <p:bg>
@@ -16072,7 +16887,7 @@
 </p:sld>
 </file>
 
-<file path=ppt/slides/slide5.xml><?xml version="1.0" encoding="utf-8"?>
+<file path=ppt/slides/slide6.xml><?xml version="1.0" encoding="utf-8"?>
 <p:sld xmlns:a="http://schemas.openxmlformats.org/drawingml/2006/main" xmlns:r="http://schemas.openxmlformats.org/officeDocument/2006/relationships" xmlns:p="http://schemas.openxmlformats.org/presentationml/2006/main">
   <p:cSld>
     <p:bg>
@@ -16691,7 +17506,741 @@
 </p:sld>
 </file>
 
-<file path=ppt/slides/slide6.xml><?xml version="1.0" encoding="utf-8"?>
+<file path=ppt/slides/slide7.xml><?xml version="1.0" encoding="utf-8"?>
+<p:sld xmlns:a="http://schemas.openxmlformats.org/drawingml/2006/main" xmlns:r="http://schemas.openxmlformats.org/officeDocument/2006/relationships" xmlns:p="http://schemas.openxmlformats.org/presentationml/2006/main">
+  <p:cSld>
+    <p:bg>
+      <p:bgPr>
+        <a:solidFill>
+          <a:schemeClr val="bg1"/>
+        </a:solidFill>
+        <a:effectLst/>
+      </p:bgPr>
+    </p:bg>
+    <p:spTree>
+      <p:nvGrpSpPr>
+        <p:cNvPr id="1" name=""/>
+        <p:cNvGrpSpPr/>
+        <p:nvPr/>
+      </p:nvGrpSpPr>
+      <p:grpSpPr>
+        <a:xfrm>
+          <a:off x="0" y="0"/>
+          <a:ext cx="0" cy="0"/>
+          <a:chOff x="0" y="0"/>
+          <a:chExt cx="0" cy="0"/>
+        </a:xfrm>
+      </p:grpSpPr>
+      <p:grpSp>
+        <p:nvGrpSpPr>
+          <p:cNvPr id="34" name="Group 22">
+            <a:extLst>
+              <a:ext uri="{FF2B5EF4-FFF2-40B4-BE49-F238E27FC236}">
+                <a16:creationId xmlns:a16="http://schemas.microsoft.com/office/drawing/2014/main" id="{4091D54B-59AB-4A5E-8E9E-0421BD66D4FB}"/>
+              </a:ext>
+              <a:ext uri="{C183D7F6-B498-43B3-948B-1728B52AA6E4}">
+                <adec:decorative xmlns:adec="http://schemas.microsoft.com/office/drawing/2017/decorative" val="1"/>
+              </a:ext>
+            </a:extLst>
+          </p:cNvPr>
+          <p:cNvGrpSpPr>
+            <a:grpSpLocks noGrp="1" noUngrp="1" noRot="1" noChangeAspect="1" noMove="1" noResize="1"/>
+          </p:cNvGrpSpPr>
+          <p:nvPr>
+            <p:extLst>
+              <p:ext uri="{386F3935-93C4-4BCD-93E2-E3B085C9AB24}">
+                <p16:designElem xmlns:p16="http://schemas.microsoft.com/office/powerpoint/2015/main" val="1"/>
+              </p:ext>
+            </p:extLst>
+          </p:nvPr>
+        </p:nvGrpSpPr>
+        <p:grpSpPr>
+          <a:xfrm>
+            <a:off x="0" y="0"/>
+            <a:ext cx="12192000" cy="6858000"/>
+            <a:chOff x="0" y="0"/>
+            <a:chExt cx="12192000" cy="6858000"/>
+          </a:xfrm>
+        </p:grpSpPr>
+        <p:sp>
+          <p:nvSpPr>
+            <p:cNvPr id="24" name="Rectangle 23">
+              <a:extLst>
+                <a:ext uri="{FF2B5EF4-FFF2-40B4-BE49-F238E27FC236}">
+                  <a16:creationId xmlns:a16="http://schemas.microsoft.com/office/drawing/2014/main" id="{547CE62E-FFFD-4A1F-BA78-C3B89C36FCA5}"/>
+                </a:ext>
+                <a:ext uri="{C183D7F6-B498-43B3-948B-1728B52AA6E4}">
+                  <adec:decorative xmlns:adec="http://schemas.microsoft.com/office/drawing/2017/decorative" val="1"/>
+                </a:ext>
+              </a:extLst>
+            </p:cNvPr>
+            <p:cNvSpPr/>
+            <p:nvPr>
+              <p:extLst>
+                <p:ext uri="{386F3935-93C4-4BCD-93E2-E3B085C9AB24}">
+                  <p16:designElem xmlns:p16="http://schemas.microsoft.com/office/powerpoint/2015/main" val="1"/>
+                </p:ext>
+              </p:extLst>
+            </p:nvPr>
+          </p:nvSpPr>
+          <p:spPr>
+            <a:xfrm>
+              <a:off x="0" y="0"/>
+              <a:ext cx="12192000" cy="6858000"/>
+            </a:xfrm>
+            <a:prstGeom prst="rect">
+              <a:avLst/>
+            </a:prstGeom>
+            <a:blipFill>
+              <a:blip r:embed="rId2">
+                <a:duotone>
+                  <a:schemeClr val="dk2">
+                    <a:shade val="69000"/>
+                    <a:hueMod val="91000"/>
+                    <a:satMod val="164000"/>
+                    <a:lumMod val="74000"/>
+                  </a:schemeClr>
+                  <a:schemeClr val="dk2">
+                    <a:hueMod val="124000"/>
+                    <a:satMod val="140000"/>
+                    <a:lumMod val="142000"/>
+                  </a:schemeClr>
+                </a:duotone>
+              </a:blip>
+              <a:stretch>
+                <a:fillRect/>
+              </a:stretch>
+            </a:blipFill>
+            <a:ln>
+              <a:noFill/>
+            </a:ln>
+          </p:spPr>
+          <p:style>
+            <a:lnRef idx="2">
+              <a:schemeClr val="accent1">
+                <a:shade val="50000"/>
+              </a:schemeClr>
+            </a:lnRef>
+            <a:fillRef idx="1">
+              <a:schemeClr val="accent1"/>
+            </a:fillRef>
+            <a:effectRef idx="0">
+              <a:schemeClr val="accent1"/>
+            </a:effectRef>
+            <a:fontRef idx="minor">
+              <a:schemeClr val="lt1"/>
+            </a:fontRef>
+          </p:style>
+        </p:sp>
+        <p:sp>
+          <p:nvSpPr>
+            <p:cNvPr id="25" name="Freeform 5">
+              <a:extLst>
+                <a:ext uri="{FF2B5EF4-FFF2-40B4-BE49-F238E27FC236}">
+                  <a16:creationId xmlns:a16="http://schemas.microsoft.com/office/drawing/2014/main" id="{AE51FD27-6B6A-4D21-BF22-245DA9BD0B3E}"/>
+                </a:ext>
+                <a:ext uri="{C183D7F6-B498-43B3-948B-1728B52AA6E4}">
+                  <adec:decorative xmlns:adec="http://schemas.microsoft.com/office/drawing/2017/decorative" val="1"/>
+                </a:ext>
+              </a:extLst>
+            </p:cNvPr>
+            <p:cNvSpPr>
+              <a:spLocks noEditPoints="1"/>
+            </p:cNvSpPr>
+            <p:nvPr>
+              <p:extLst>
+                <p:ext uri="{386F3935-93C4-4BCD-93E2-E3B085C9AB24}">
+                  <p16:designElem xmlns:p16="http://schemas.microsoft.com/office/powerpoint/2015/main" val="1"/>
+                </p:ext>
+              </p:extLst>
+            </p:nvPr>
+          </p:nvSpPr>
+          <p:spPr bwMode="gray">
+            <a:xfrm>
+              <a:off x="0" y="1587"/>
+              <a:ext cx="12192000" cy="6856413"/>
+            </a:xfrm>
+            <a:custGeom>
+              <a:avLst/>
+              <a:gdLst/>
+              <a:ahLst/>
+              <a:cxnLst/>
+              <a:rect l="0" t="0" r="r" b="b"/>
+              <a:pathLst>
+                <a:path w="15356" h="8638">
+                  <a:moveTo>
+                    <a:pt x="0" y="0"/>
+                  </a:moveTo>
+                  <a:lnTo>
+                    <a:pt x="0" y="8638"/>
+                  </a:lnTo>
+                  <a:lnTo>
+                    <a:pt x="15356" y="8638"/>
+                  </a:lnTo>
+                  <a:lnTo>
+                    <a:pt x="15356" y="0"/>
+                  </a:lnTo>
+                  <a:lnTo>
+                    <a:pt x="0" y="0"/>
+                  </a:lnTo>
+                  <a:close/>
+                  <a:moveTo>
+                    <a:pt x="14748" y="8038"/>
+                  </a:moveTo>
+                  <a:lnTo>
+                    <a:pt x="600" y="8038"/>
+                  </a:lnTo>
+                  <a:lnTo>
+                    <a:pt x="600" y="592"/>
+                  </a:lnTo>
+                  <a:lnTo>
+                    <a:pt x="14748" y="592"/>
+                  </a:lnTo>
+                  <a:lnTo>
+                    <a:pt x="14748" y="8038"/>
+                  </a:lnTo>
+                  <a:close/>
+                </a:path>
+              </a:pathLst>
+            </a:custGeom>
+            <a:solidFill>
+              <a:schemeClr val="bg1"/>
+            </a:solidFill>
+            <a:ln>
+              <a:noFill/>
+            </a:ln>
+          </p:spPr>
+        </p:sp>
+      </p:grpSp>
+      <p:sp>
+        <p:nvSpPr>
+          <p:cNvPr id="35" name="Rectangle 26">
+            <a:extLst>
+              <a:ext uri="{FF2B5EF4-FFF2-40B4-BE49-F238E27FC236}">
+                <a16:creationId xmlns:a16="http://schemas.microsoft.com/office/drawing/2014/main" id="{B8144315-1C5A-4185-A952-25D98D303D46}"/>
+              </a:ext>
+              <a:ext uri="{C183D7F6-B498-43B3-948B-1728B52AA6E4}">
+                <adec:decorative xmlns:adec="http://schemas.microsoft.com/office/drawing/2017/decorative" val="1"/>
+              </a:ext>
+            </a:extLst>
+          </p:cNvPr>
+          <p:cNvSpPr>
+            <a:spLocks noGrp="1" noRot="1" noChangeAspect="1" noMove="1" noResize="1" noEditPoints="1" noAdjustHandles="1" noChangeArrowheads="1" noChangeShapeType="1" noTextEdit="1"/>
+          </p:cNvSpPr>
+          <p:nvPr>
+            <p:extLst>
+              <p:ext uri="{386F3935-93C4-4BCD-93E2-E3B085C9AB24}">
+                <p16:designElem xmlns:p16="http://schemas.microsoft.com/office/powerpoint/2015/main" val="1"/>
+              </p:ext>
+            </p:extLst>
+          </p:nvPr>
+        </p:nvSpPr>
+        <p:spPr>
+          <a:xfrm>
+            <a:off x="10437812" y="0"/>
+            <a:ext cx="685800" cy="1143000"/>
+          </a:xfrm>
+          <a:prstGeom prst="rect">
+            <a:avLst/>
+          </a:prstGeom>
+          <a:solidFill>
+            <a:schemeClr val="accent1"/>
+          </a:solidFill>
+          <a:ln>
+            <a:noFill/>
+          </a:ln>
+        </p:spPr>
+        <p:style>
+          <a:lnRef idx="1">
+            <a:schemeClr val="accent1"/>
+          </a:lnRef>
+          <a:fillRef idx="3">
+            <a:schemeClr val="accent1"/>
+          </a:fillRef>
+          <a:effectRef idx="2">
+            <a:schemeClr val="accent1"/>
+          </a:effectRef>
+          <a:fontRef idx="minor">
+            <a:schemeClr val="lt1"/>
+          </a:fontRef>
+        </p:style>
+      </p:sp>
+      <p:sp>
+        <p:nvSpPr>
+          <p:cNvPr id="36" name="Rectangle 28">
+            <a:extLst>
+              <a:ext uri="{FF2B5EF4-FFF2-40B4-BE49-F238E27FC236}">
+                <a16:creationId xmlns:a16="http://schemas.microsoft.com/office/drawing/2014/main" id="{2B109C5B-3B98-48EB-A942-8D11CEA374B6}"/>
+              </a:ext>
+              <a:ext uri="{C183D7F6-B498-43B3-948B-1728B52AA6E4}">
+                <adec:decorative xmlns:adec="http://schemas.microsoft.com/office/drawing/2017/decorative" val="1"/>
+              </a:ext>
+            </a:extLst>
+          </p:cNvPr>
+          <p:cNvSpPr>
+            <a:spLocks noGrp="1" noRot="1" noChangeAspect="1" noMove="1" noResize="1" noEditPoints="1" noAdjustHandles="1" noChangeArrowheads="1" noChangeShapeType="1" noTextEdit="1"/>
+          </p:cNvSpPr>
+          <p:nvPr>
+            <p:extLst>
+              <p:ext uri="{386F3935-93C4-4BCD-93E2-E3B085C9AB24}">
+                <p16:designElem xmlns:p16="http://schemas.microsoft.com/office/powerpoint/2015/main" val="1"/>
+              </p:ext>
+            </p:extLst>
+          </p:nvPr>
+        </p:nvSpPr>
+        <p:spPr>
+          <a:xfrm>
+            <a:off x="0" y="793"/>
+            <a:ext cx="12192000" cy="6858000"/>
+          </a:xfrm>
+          <a:prstGeom prst="rect">
+            <a:avLst/>
+          </a:prstGeom>
+          <a:ln>
+            <a:noFill/>
+          </a:ln>
+        </p:spPr>
+        <p:style>
+          <a:lnRef idx="2">
+            <a:schemeClr val="accent1">
+              <a:shade val="50000"/>
+            </a:schemeClr>
+          </a:lnRef>
+          <a:fillRef idx="1003">
+            <a:schemeClr val="dk2"/>
+          </a:fillRef>
+          <a:effectRef idx="0">
+            <a:schemeClr val="accent1"/>
+          </a:effectRef>
+          <a:fontRef idx="minor">
+            <a:schemeClr val="lt1"/>
+          </a:fontRef>
+        </p:style>
+      </p:sp>
+      <p:sp>
+        <p:nvSpPr>
+          <p:cNvPr id="37" name="Freeform 5">
+            <a:extLst>
+              <a:ext uri="{FF2B5EF4-FFF2-40B4-BE49-F238E27FC236}">
+                <a16:creationId xmlns:a16="http://schemas.microsoft.com/office/drawing/2014/main" id="{A9C389E4-003E-40C9-AC9E-ED821C16F525}"/>
+              </a:ext>
+              <a:ext uri="{C183D7F6-B498-43B3-948B-1728B52AA6E4}">
+                <adec:decorative xmlns:adec="http://schemas.microsoft.com/office/drawing/2017/decorative" val="1"/>
+              </a:ext>
+            </a:extLst>
+          </p:cNvPr>
+          <p:cNvSpPr>
+            <a:spLocks noGrp="1" noRot="1" noChangeAspect="1" noMove="1" noResize="1" noEditPoints="1" noAdjustHandles="1" noChangeArrowheads="1" noChangeShapeType="1" noTextEdit="1"/>
+          </p:cNvSpPr>
+          <p:nvPr>
+            <p:extLst>
+              <p:ext uri="{386F3935-93C4-4BCD-93E2-E3B085C9AB24}">
+                <p16:designElem xmlns:p16="http://schemas.microsoft.com/office/powerpoint/2015/main" val="1"/>
+              </p:ext>
+            </p:extLst>
+          </p:nvPr>
+        </p:nvSpPr>
+        <p:spPr bwMode="gray">
+          <a:xfrm>
+            <a:off x="0" y="1587"/>
+            <a:ext cx="12192000" cy="6856413"/>
+          </a:xfrm>
+          <a:custGeom>
+            <a:avLst/>
+            <a:gdLst/>
+            <a:ahLst/>
+            <a:cxnLst/>
+            <a:rect l="0" t="0" r="r" b="b"/>
+            <a:pathLst>
+              <a:path w="15356" h="8638">
+                <a:moveTo>
+                  <a:pt x="0" y="0"/>
+                </a:moveTo>
+                <a:lnTo>
+                  <a:pt x="0" y="8638"/>
+                </a:lnTo>
+                <a:lnTo>
+                  <a:pt x="15356" y="8638"/>
+                </a:lnTo>
+                <a:lnTo>
+                  <a:pt x="15356" y="0"/>
+                </a:lnTo>
+                <a:lnTo>
+                  <a:pt x="0" y="0"/>
+                </a:lnTo>
+                <a:close/>
+                <a:moveTo>
+                  <a:pt x="14748" y="8038"/>
+                </a:moveTo>
+                <a:lnTo>
+                  <a:pt x="600" y="8038"/>
+                </a:lnTo>
+                <a:lnTo>
+                  <a:pt x="600" y="592"/>
+                </a:lnTo>
+                <a:lnTo>
+                  <a:pt x="14748" y="592"/>
+                </a:lnTo>
+                <a:lnTo>
+                  <a:pt x="14748" y="8038"/>
+                </a:lnTo>
+                <a:close/>
+              </a:path>
+            </a:pathLst>
+          </a:custGeom>
+          <a:solidFill>
+            <a:schemeClr val="tx1"/>
+          </a:solidFill>
+          <a:ln>
+            <a:noFill/>
+          </a:ln>
+        </p:spPr>
+      </p:sp>
+      <p:sp>
+        <p:nvSpPr>
+          <p:cNvPr id="33" name="Rectangle 32">
+            <a:extLst>
+              <a:ext uri="{FF2B5EF4-FFF2-40B4-BE49-F238E27FC236}">
+                <a16:creationId xmlns:a16="http://schemas.microsoft.com/office/drawing/2014/main" id="{6C042684-2705-40BD-9104-A6B24CE1CA45}"/>
+              </a:ext>
+              <a:ext uri="{C183D7F6-B498-43B3-948B-1728B52AA6E4}">
+                <adec:decorative xmlns:adec="http://schemas.microsoft.com/office/drawing/2017/decorative" val="1"/>
+              </a:ext>
+            </a:extLst>
+          </p:cNvPr>
+          <p:cNvSpPr>
+            <a:spLocks noGrp="1" noRot="1" noChangeAspect="1" noMove="1" noResize="1" noEditPoints="1" noAdjustHandles="1" noChangeArrowheads="1" noChangeShapeType="1" noTextEdit="1"/>
+          </p:cNvSpPr>
+          <p:nvPr>
+            <p:extLst>
+              <p:ext uri="{386F3935-93C4-4BCD-93E2-E3B085C9AB24}">
+                <p16:designElem xmlns:p16="http://schemas.microsoft.com/office/powerpoint/2015/main" val="1"/>
+              </p:ext>
+            </p:extLst>
+          </p:nvPr>
+        </p:nvSpPr>
+        <p:spPr>
+          <a:xfrm>
+            <a:off x="10437812" y="0"/>
+            <a:ext cx="685800" cy="1143000"/>
+          </a:xfrm>
+          <a:prstGeom prst="rect">
+            <a:avLst/>
+          </a:prstGeom>
+          <a:solidFill>
+            <a:schemeClr val="accent1"/>
+          </a:solidFill>
+          <a:ln>
+            <a:noFill/>
+          </a:ln>
+        </p:spPr>
+        <p:style>
+          <a:lnRef idx="1">
+            <a:schemeClr val="accent1"/>
+          </a:lnRef>
+          <a:fillRef idx="3">
+            <a:schemeClr val="accent1"/>
+          </a:fillRef>
+          <a:effectRef idx="2">
+            <a:schemeClr val="accent1"/>
+          </a:effectRef>
+          <a:fontRef idx="minor">
+            <a:schemeClr val="lt1"/>
+          </a:fontRef>
+        </p:style>
+      </p:sp>
+      <p:sp>
+        <p:nvSpPr>
+          <p:cNvPr id="2" name="Title 1">
+            <a:extLst>
+              <a:ext uri="{FF2B5EF4-FFF2-40B4-BE49-F238E27FC236}">
+                <a16:creationId xmlns:a16="http://schemas.microsoft.com/office/drawing/2014/main" id="{D9E97A7D-005C-447E-8034-4A62E11C54FF}"/>
+              </a:ext>
+            </a:extLst>
+          </p:cNvPr>
+          <p:cNvSpPr>
+            <a:spLocks noGrp="1"/>
+          </p:cNvSpPr>
+          <p:nvPr>
+            <p:ph type="title"/>
+          </p:nvPr>
+        </p:nvSpPr>
+        <p:spPr>
+          <a:xfrm>
+            <a:off x="3101178" y="701118"/>
+            <a:ext cx="6268246" cy="883763"/>
+          </a:xfrm>
+        </p:spPr>
+        <p:txBody>
+          <a:bodyPr vert="horz" lIns="91440" tIns="45720" rIns="91440" bIns="45720" rtlCol="0" anchor="b">
+            <a:normAutofit fontScale="90000"/>
+          </a:bodyPr>
+          <a:lstStyle/>
+          <a:p>
+            <a:r>
+              <a:rPr lang="en-US" sz="5600" b="0" i="0" kern="1200" dirty="0">
+                <a:solidFill>
+                  <a:srgbClr val="EBEBEB"/>
+                </a:solidFill>
+                <a:latin typeface="+mj-lt"/>
+                <a:ea typeface="+mj-ea"/>
+                <a:cs typeface="+mj-cs"/>
+              </a:rPr>
+              <a:t>References/Links</a:t>
+            </a:r>
+          </a:p>
+        </p:txBody>
+      </p:sp>
+      <p:pic>
+        <p:nvPicPr>
+          <p:cNvPr id="5" name="Graphic 4" descr="Link">
+            <a:extLst>
+              <a:ext uri="{FF2B5EF4-FFF2-40B4-BE49-F238E27FC236}">
+                <a16:creationId xmlns:a16="http://schemas.microsoft.com/office/drawing/2014/main" id="{6121FB05-4B2B-4AB5-BFFC-82566DC77FCE}"/>
+              </a:ext>
+            </a:extLst>
+          </p:cNvPr>
+          <p:cNvPicPr>
+            <a:picLocks noChangeAspect="1"/>
+          </p:cNvPicPr>
+          <p:nvPr/>
+        </p:nvPicPr>
+        <p:blipFill>
+          <a:blip r:embed="rId3">
+            <a:extLst>
+              <a:ext uri="{28A0092B-C50C-407E-A947-70E740481C1C}">
+                <a14:useLocalDpi xmlns:a14="http://schemas.microsoft.com/office/drawing/2010/main" val="0"/>
+              </a:ext>
+              <a:ext uri="{96DAC541-7B7A-43D3-8B79-37D633B846F1}">
+                <asvg:svgBlip xmlns:asvg="http://schemas.microsoft.com/office/drawing/2016/SVG/main" r:embed="rId4"/>
+              </a:ext>
+            </a:extLst>
+          </a:blip>
+          <a:stretch>
+            <a:fillRect/>
+          </a:stretch>
+        </p:blipFill>
+        <p:spPr>
+          <a:xfrm>
+            <a:off x="308486" y="325103"/>
+            <a:ext cx="2519555" cy="2519555"/>
+          </a:xfrm>
+          <a:prstGeom prst="roundRect">
+            <a:avLst>
+              <a:gd name="adj" fmla="val 1858"/>
+            </a:avLst>
+          </a:prstGeom>
+          <a:effectLst>
+            <a:outerShdw blurRad="50800" dist="50800" dir="5400000" algn="tl" rotWithShape="0">
+              <a:srgbClr val="000000">
+                <a:alpha val="43000"/>
+              </a:srgbClr>
+            </a:outerShdw>
+          </a:effectLst>
+        </p:spPr>
+      </p:pic>
+      <p:sp>
+        <p:nvSpPr>
+          <p:cNvPr id="7" name="TextBox 6">
+            <a:extLst>
+              <a:ext uri="{FF2B5EF4-FFF2-40B4-BE49-F238E27FC236}">
+                <a16:creationId xmlns:a16="http://schemas.microsoft.com/office/drawing/2014/main" id="{1EFBCC83-4FE1-46D6-9842-7D1F1B71FC3A}"/>
+              </a:ext>
+            </a:extLst>
+          </p:cNvPr>
+          <p:cNvSpPr txBox="1"/>
+          <p:nvPr/>
+        </p:nvSpPr>
+        <p:spPr>
+          <a:xfrm>
+            <a:off x="2828041" y="1584880"/>
+            <a:ext cx="8498048" cy="5078313"/>
+          </a:xfrm>
+          <a:prstGeom prst="rect">
+            <a:avLst/>
+          </a:prstGeom>
+          <a:noFill/>
+        </p:spPr>
+        <p:txBody>
+          <a:bodyPr wrap="square" rtlCol="0">
+            <a:spAutoFit/>
+          </a:bodyPr>
+          <a:lstStyle/>
+          <a:p>
+            <a:pPr marL="285750" indent="-285750">
+              <a:buFont typeface="Arial" panose="020B0604020202020204" pitchFamily="34" charset="0"/>
+              <a:buChar char="•"/>
+            </a:pPr>
+            <a:r>
+              <a:rPr lang="en-US" dirty="0">
+                <a:hlinkClick r:id="rId5"/>
+              </a:rPr>
+              <a:t>https://www.iro.umontreal.ca/~vincentp/ift3395/lectures/backprop_old.pdf</a:t>
+            </a:r>
+            <a:r>
+              <a:rPr lang="en-US" dirty="0"/>
+              <a:t> </a:t>
+            </a:r>
+          </a:p>
+          <a:p>
+            <a:pPr marL="285750" indent="-285750">
+              <a:buFont typeface="Arial" panose="020B0604020202020204" pitchFamily="34" charset="0"/>
+              <a:buChar char="•"/>
+            </a:pPr>
+            <a:endParaRPr lang="en-US" dirty="0"/>
+          </a:p>
+          <a:p>
+            <a:pPr marL="285750" indent="-285750">
+              <a:buFont typeface="Arial" panose="020B0604020202020204" pitchFamily="34" charset="0"/>
+              <a:buChar char="•"/>
+            </a:pPr>
+            <a:r>
+              <a:rPr lang="en-US" dirty="0">
+                <a:hlinkClick r:id="rId6"/>
+              </a:rPr>
+              <a:t>https://s3.us-east-2.amazonaws.com/hkg-website-assets/static/pages/files/DeepLearning.pdf</a:t>
+            </a:r>
+            <a:r>
+              <a:rPr lang="en-US" dirty="0"/>
+              <a:t> </a:t>
+            </a:r>
+          </a:p>
+          <a:p>
+            <a:endParaRPr lang="en-US" dirty="0"/>
+          </a:p>
+          <a:p>
+            <a:pPr marL="285750" indent="-285750">
+              <a:buFont typeface="Arial" panose="020B0604020202020204" pitchFamily="34" charset="0"/>
+              <a:buChar char="•"/>
+            </a:pPr>
+            <a:r>
+              <a:rPr lang="en-US" dirty="0">
+                <a:hlinkClick r:id="rId7"/>
+              </a:rPr>
+              <a:t>https://www.researchgate.net/profile/Yann_Lecun/publication/2453996_Convolutional_Networks_for_Images_Speech_and_Time-Series/links/0deec519dfa2325502000000.pdf</a:t>
+            </a:r>
+            <a:r>
+              <a:rPr lang="en-US" dirty="0"/>
+              <a:t> </a:t>
+            </a:r>
+          </a:p>
+          <a:p>
+            <a:endParaRPr lang="en-US" dirty="0"/>
+          </a:p>
+          <a:p>
+            <a:pPr marL="285750" indent="-285750">
+              <a:buFont typeface="Arial" panose="020B0604020202020204" pitchFamily="34" charset="0"/>
+              <a:buChar char="•"/>
+            </a:pPr>
+            <a:r>
+              <a:rPr lang="en-US" dirty="0"/>
+              <a:t>Y. </a:t>
+            </a:r>
+            <a:r>
+              <a:rPr lang="en-US" dirty="0" err="1"/>
+              <a:t>Lecun</a:t>
+            </a:r>
+            <a:r>
+              <a:rPr lang="en-US" dirty="0"/>
+              <a:t>, L. </a:t>
+            </a:r>
+            <a:r>
+              <a:rPr lang="en-US" dirty="0" err="1"/>
+              <a:t>Bottou</a:t>
+            </a:r>
+            <a:r>
+              <a:rPr lang="en-US" dirty="0"/>
+              <a:t>, Y. </a:t>
+            </a:r>
+            <a:r>
+              <a:rPr lang="en-US" dirty="0" err="1"/>
+              <a:t>Bengio</a:t>
+            </a:r>
+            <a:r>
+              <a:rPr lang="en-US" dirty="0"/>
+              <a:t> and P. Haffner, "Gradient-based learning applied to document recognition," in </a:t>
+            </a:r>
+            <a:r>
+              <a:rPr lang="en-US" i="1" dirty="0"/>
+              <a:t>Proceedings of the IEEE</a:t>
+            </a:r>
+            <a:r>
+              <a:rPr lang="en-US" dirty="0"/>
+              <a:t>, vol. 86, no. 11, pp. 2278-2324, Nov. 1998, </a:t>
+            </a:r>
+            <a:r>
+              <a:rPr lang="en-US" dirty="0" err="1"/>
+              <a:t>doi</a:t>
+            </a:r>
+            <a:r>
+              <a:rPr lang="en-US" dirty="0"/>
+              <a:t>: 10.1109/5.726791.</a:t>
+            </a:r>
+          </a:p>
+          <a:p>
+            <a:r>
+              <a:rPr lang="en-US" dirty="0"/>
+              <a:t> </a:t>
+            </a:r>
+          </a:p>
+          <a:p>
+            <a:pPr marL="285750" indent="-285750">
+              <a:buFont typeface="Arial" panose="020B0604020202020204" pitchFamily="34" charset="0"/>
+              <a:buChar char="•"/>
+            </a:pPr>
+            <a:r>
+              <a:rPr lang="en-US" dirty="0">
+                <a:hlinkClick r:id="rId8"/>
+              </a:rPr>
+              <a:t>https://amturing.acm.org/award_winners/lecun_6017366.cfm</a:t>
+            </a:r>
+            <a:endParaRPr lang="en-US" dirty="0"/>
+          </a:p>
+          <a:p>
+            <a:pPr marL="285750" indent="-285750">
+              <a:buFont typeface="Arial" panose="020B0604020202020204" pitchFamily="34" charset="0"/>
+              <a:buChar char="•"/>
+            </a:pPr>
+            <a:r>
+              <a:rPr lang="en-US" dirty="0">
+                <a:hlinkClick r:id="rId9"/>
+              </a:rPr>
+              <a:t>https://amturing.acm.org/award_winners/hinton_4791679.cfm</a:t>
+            </a:r>
+            <a:endParaRPr lang="en-US" dirty="0"/>
+          </a:p>
+          <a:p>
+            <a:pPr marL="285750" indent="-285750">
+              <a:buFont typeface="Arial" panose="020B0604020202020204" pitchFamily="34" charset="0"/>
+              <a:buChar char="•"/>
+            </a:pPr>
+            <a:r>
+              <a:rPr lang="en-US" dirty="0">
+                <a:hlinkClick r:id="rId10"/>
+              </a:rPr>
+              <a:t>https://amturing.acm.org/award_winners/bengio_3406375.cfm</a:t>
+            </a:r>
+            <a:endParaRPr lang="en-US" dirty="0"/>
+          </a:p>
+          <a:p>
+            <a:endParaRPr lang="en-US" dirty="0"/>
+          </a:p>
+        </p:txBody>
+      </p:sp>
+    </p:spTree>
+    <p:extLst>
+      <p:ext uri="{BB962C8B-B14F-4D97-AF65-F5344CB8AC3E}">
+        <p14:creationId xmlns:p14="http://schemas.microsoft.com/office/powerpoint/2010/main" val="3611818033"/>
+      </p:ext>
+    </p:extLst>
+  </p:cSld>
+  <p:clrMapOvr>
+    <a:overrideClrMapping bg1="dk1" tx1="lt1" bg2="dk2" tx2="lt2" accent1="accent1" accent2="accent2" accent3="accent3" accent4="accent4" accent5="accent5" accent6="accent6" hlink="hlink" folHlink="folHlink"/>
+  </p:clrMapOvr>
+</p:sld>
+</file>
+
+<file path=ppt/slides/slide8.xml><?xml version="1.0" encoding="utf-8"?>
 <p:sld xmlns:a="http://schemas.openxmlformats.org/drawingml/2006/main" xmlns:r="http://schemas.openxmlformats.org/officeDocument/2006/relationships" xmlns:p="http://schemas.openxmlformats.org/presentationml/2006/main">
   <p:cSld>
     <p:bg>

</xml_diff>